<commit_message>
feat: update for demo
Signed-off-by: Guillaume Chervet <guillaume.chervet@gmail.com>
</commit_message>
<xml_diff>
--- a/documentation/slimfaas.pptx
+++ b/documentation/slimfaas.pptx
@@ -5,17 +5,16 @@
     <p:sldMasterId id="2147483648" r:id="rId4"/>
   </p:sldMasterIdLst>
   <p:notesMasterIdLst>
-    <p:notesMasterId r:id="rId10"/>
+    <p:notesMasterId r:id="rId9"/>
   </p:notesMasterIdLst>
   <p:handoutMasterIdLst>
-    <p:handoutMasterId r:id="rId11"/>
+    <p:handoutMasterId r:id="rId10"/>
   </p:handoutMasterIdLst>
   <p:sldIdLst>
     <p:sldId id="892" r:id="rId5"/>
     <p:sldId id="891" r:id="rId6"/>
     <p:sldId id="893" r:id="rId7"/>
-    <p:sldId id="894" r:id="rId8"/>
-    <p:sldId id="898" r:id="rId9"/>
+    <p:sldId id="898" r:id="rId8"/>
   </p:sldIdLst>
   <p:sldSz cx="12192000" cy="6858000"/>
   <p:notesSz cx="6858000" cy="9144000"/>
@@ -122,7 +121,6 @@
             <p14:sldId id="892"/>
             <p14:sldId id="891"/>
             <p14:sldId id="893"/>
-            <p14:sldId id="894"/>
             <p14:sldId id="898"/>
           </p14:sldIdLst>
         </p14:section>
@@ -240,7 +238,7 @@
           <a:p>
             <a:fld id="{F60FFC85-34C0-4167-8801-71D65E4D986C}" type="datetimeFigureOut">
               <a:rPr lang="fr-FR" smtClean="0"/>
-              <a:t>08/10/2024</a:t>
+              <a:t>18/03/2025</a:t>
             </a:fld>
             <a:endParaRPr lang="fr-FR"/>
           </a:p>
@@ -417,7 +415,7 @@
           <a:p>
             <a:fld id="{F2EE8696-3B2B-7D49-B212-A8F746F3A84B}" type="datetimeFigureOut">
               <a:rPr lang="es-ES_tradnl" smtClean="0"/>
-              <a:t>08/10/2024</a:t>
+              <a:t>18/03/2025</a:t>
             </a:fld>
             <a:endParaRPr lang="es-ES_tradnl"/>
           </a:p>
@@ -1114,7 +1112,7 @@
           <a:p>
             <a:fld id="{80160E5B-2E24-B941-8DE0-C0A90C36B7C5}" type="datetimeFigureOut">
               <a:rPr lang="en-GB" smtClean="0"/>
-              <a:t>08/10/2024</a:t>
+              <a:t>18/03/2025</a:t>
             </a:fld>
             <a:endParaRPr lang="en-GB"/>
           </a:p>
@@ -1312,7 +1310,7 @@
           <a:p>
             <a:fld id="{80160E5B-2E24-B941-8DE0-C0A90C36B7C5}" type="datetimeFigureOut">
               <a:rPr lang="en-GB" smtClean="0"/>
-              <a:t>08/10/2024</a:t>
+              <a:t>18/03/2025</a:t>
             </a:fld>
             <a:endParaRPr lang="en-GB"/>
           </a:p>
@@ -1559,7 +1557,7 @@
           <a:p>
             <a:fld id="{80160E5B-2E24-B941-8DE0-C0A90C36B7C5}" type="datetimeFigureOut">
               <a:rPr lang="en-GB" smtClean="0"/>
-              <a:t>08/10/2024</a:t>
+              <a:t>18/03/2025</a:t>
             </a:fld>
             <a:endParaRPr lang="en-GB"/>
           </a:p>
@@ -1778,7 +1776,7 @@
           <a:p>
             <a:fld id="{80160E5B-2E24-B941-8DE0-C0A90C36B7C5}" type="datetimeFigureOut">
               <a:rPr lang="en-GB" smtClean="0"/>
-              <a:t>08/10/2024</a:t>
+              <a:t>18/03/2025</a:t>
             </a:fld>
             <a:endParaRPr lang="en-GB"/>
           </a:p>
@@ -2053,7 +2051,7 @@
           <a:p>
             <a:fld id="{80160E5B-2E24-B941-8DE0-C0A90C36B7C5}" type="datetimeFigureOut">
               <a:rPr lang="en-GB" smtClean="0"/>
-              <a:t>08/10/2024</a:t>
+              <a:t>18/03/2025</a:t>
             </a:fld>
             <a:endParaRPr lang="en-GB"/>
           </a:p>
@@ -2357,7 +2355,7 @@
           <a:p>
             <a:fld id="{80160E5B-2E24-B941-8DE0-C0A90C36B7C5}" type="datetimeFigureOut">
               <a:rPr lang="en-GB" smtClean="0"/>
-              <a:t>08/10/2024</a:t>
+              <a:t>18/03/2025</a:t>
             </a:fld>
             <a:endParaRPr lang="en-GB"/>
           </a:p>
@@ -2808,7 +2806,7 @@
           <a:p>
             <a:fld id="{80160E5B-2E24-B941-8DE0-C0A90C36B7C5}" type="datetimeFigureOut">
               <a:rPr lang="en-GB" smtClean="0"/>
-              <a:t>08/10/2024</a:t>
+              <a:t>18/03/2025</a:t>
             </a:fld>
             <a:endParaRPr lang="en-GB"/>
           </a:p>
@@ -2988,7 +2986,7 @@
           <a:p>
             <a:fld id="{80160E5B-2E24-B941-8DE0-C0A90C36B7C5}" type="datetimeFigureOut">
               <a:rPr lang="en-GB" smtClean="0"/>
-              <a:t>08/10/2024</a:t>
+              <a:t>18/03/2025</a:t>
             </a:fld>
             <a:endParaRPr lang="en-GB"/>
           </a:p>
@@ -3140,7 +3138,7 @@
           <a:p>
             <a:fld id="{80160E5B-2E24-B941-8DE0-C0A90C36B7C5}" type="datetimeFigureOut">
               <a:rPr lang="en-GB" smtClean="0"/>
-              <a:t>08/10/2024</a:t>
+              <a:t>18/03/2025</a:t>
             </a:fld>
             <a:endParaRPr lang="en-GB"/>
           </a:p>
@@ -3490,7 +3488,7 @@
           <a:p>
             <a:fld id="{80160E5B-2E24-B941-8DE0-C0A90C36B7C5}" type="datetimeFigureOut">
               <a:rPr lang="en-GB" smtClean="0"/>
-              <a:t>08/10/2024</a:t>
+              <a:t>18/03/2025</a:t>
             </a:fld>
             <a:endParaRPr lang="en-GB"/>
           </a:p>
@@ -3817,7 +3815,7 @@
           <a:p>
             <a:fld id="{80160E5B-2E24-B941-8DE0-C0A90C36B7C5}" type="datetimeFigureOut">
               <a:rPr lang="en-GB" smtClean="0"/>
-              <a:t>08/10/2024</a:t>
+              <a:t>18/03/2025</a:t>
             </a:fld>
             <a:endParaRPr lang="en-GB"/>
           </a:p>
@@ -4097,7 +4095,7 @@
           <a:p>
             <a:fld id="{80160E5B-2E24-B941-8DE0-C0A90C36B7C5}" type="datetimeFigureOut">
               <a:rPr lang="en-GB" smtClean="0"/>
-              <a:t>08/10/2024</a:t>
+              <a:t>18/03/2025</a:t>
             </a:fld>
             <a:endParaRPr lang="en-GB"/>
           </a:p>
@@ -4624,8 +4622,8 @@
         </p:nvSpPr>
         <p:spPr>
           <a:xfrm>
-            <a:off x="3926528" y="2223970"/>
-            <a:ext cx="3341145" cy="3514653"/>
+            <a:off x="4065424" y="2860803"/>
+            <a:ext cx="3341145" cy="2190158"/>
           </a:xfrm>
           <a:prstGeom prst="roundRect">
             <a:avLst/>
@@ -4697,7 +4695,7 @@
         </p:blipFill>
         <p:spPr bwMode="auto">
           <a:xfrm>
-            <a:off x="6738009" y="1908836"/>
+            <a:off x="6910852" y="2659498"/>
             <a:ext cx="588793" cy="572693"/>
           </a:xfrm>
           <a:prstGeom prst="rect">
@@ -4781,15 +4779,13 @@
         </p:nvSpPr>
         <p:spPr>
           <a:xfrm>
-            <a:off x="4679484" y="2886177"/>
-            <a:ext cx="1858037" cy="923330"/>
+            <a:off x="4363700" y="3139866"/>
+            <a:ext cx="2807601" cy="1640183"/>
           </a:xfrm>
           <a:prstGeom prst="roundRect">
             <a:avLst/>
           </a:prstGeom>
-          <a:solidFill>
-            <a:srgbClr val="7030A0"/>
-          </a:solidFill>
+          <a:noFill/>
           <a:ln>
             <a:noFill/>
           </a:ln>
@@ -4837,15 +4833,15 @@
           </p:cNvPr>
           <p:cNvCxnSpPr>
             <a:cxnSpLocks/>
-            <a:stCxn id="2" idx="2"/>
+            <a:stCxn id="2" idx="3"/>
             <a:endCxn id="5" idx="1"/>
           </p:cNvCxnSpPr>
           <p:nvPr/>
         </p:nvCxnSpPr>
         <p:spPr>
-          <a:xfrm>
-            <a:off x="3635557" y="1606148"/>
-            <a:ext cx="1043927" cy="1741694"/>
+          <a:xfrm flipV="1">
+            <a:off x="3675101" y="3959958"/>
+            <a:ext cx="688599" cy="2904"/>
           </a:xfrm>
           <a:prstGeom prst="straightConnector1">
             <a:avLst/>
@@ -4888,8 +4884,8 @@
         </p:nvSpPr>
         <p:spPr>
           <a:xfrm>
-            <a:off x="8653554" y="3756681"/>
-            <a:ext cx="3145551" cy="2247742"/>
+            <a:off x="9597964" y="2860802"/>
+            <a:ext cx="2467886" cy="2190158"/>
           </a:xfrm>
           <a:prstGeom prst="roundRect">
             <a:avLst/>
@@ -4925,14 +4921,14 @@
           <a:p>
             <a:pPr algn="ctr"/>
             <a:r>
-              <a:rPr lang="fr-FR" sz="4000" dirty="0">
+              <a:rPr lang="fr-FR" sz="2800" dirty="0">
                 <a:solidFill>
                   <a:schemeClr val="bg1"/>
                 </a:solidFill>
               </a:rPr>
               <a:t>function « fibonacci »</a:t>
             </a:r>
-            <a:endParaRPr lang="en-FR" sz="4000" dirty="0">
+            <a:endParaRPr lang="en-FR" sz="2800" dirty="0">
               <a:solidFill>
                 <a:schemeClr val="bg1"/>
               </a:solidFill>
@@ -4969,7 +4965,7 @@
         </p:blipFill>
         <p:spPr bwMode="auto">
           <a:xfrm>
-            <a:off x="11210312" y="3441547"/>
+            <a:off x="11603207" y="2673279"/>
             <a:ext cx="588793" cy="572693"/>
           </a:xfrm>
           <a:prstGeom prst="rect">
@@ -5004,9 +5000,9 @@
           <p:nvPr/>
         </p:nvCxnSpPr>
         <p:spPr>
-          <a:xfrm>
-            <a:off x="6537521" y="3347842"/>
-            <a:ext cx="2116033" cy="1532710"/>
+          <a:xfrm flipV="1">
+            <a:off x="7171301" y="3955881"/>
+            <a:ext cx="2426663" cy="4077"/>
           </a:xfrm>
           <a:prstGeom prst="straightConnector1">
             <a:avLst/>
@@ -5049,8 +5045,8 @@
         </p:nvSpPr>
         <p:spPr>
           <a:xfrm>
-            <a:off x="5004417" y="4325969"/>
-            <a:ext cx="1208169" cy="1258899"/>
+            <a:off x="6539696" y="4007671"/>
+            <a:ext cx="538223" cy="649047"/>
           </a:xfrm>
           <a:prstGeom prst="can">
             <a:avLst/>
@@ -5076,59 +5072,13 @@
           <a:p>
             <a:pPr algn="ctr"/>
             <a:r>
-              <a:rPr lang="fr-FR" sz="2000" dirty="0"/>
+              <a:rPr lang="fr-FR" sz="1200" dirty="0"/>
               <a:t>SlimData</a:t>
             </a:r>
-            <a:endParaRPr lang="fr-FR" sz="1400" dirty="0"/>
-          </a:p>
-        </p:txBody>
-      </p:sp>
-      <p:cxnSp>
-        <p:nvCxnSpPr>
-          <p:cNvPr id="1034" name="Connecteur droit avec flèche 1033">
-            <a:extLst>
-              <a:ext uri="{FF2B5EF4-FFF2-40B4-BE49-F238E27FC236}">
-                <a16:creationId xmlns:a16="http://schemas.microsoft.com/office/drawing/2014/main" id="{C97FA525-2FE2-BE58-B3CE-7494FA2825DA}"/>
-              </a:ext>
-            </a:extLst>
-          </p:cNvPr>
-          <p:cNvCxnSpPr>
-            <a:cxnSpLocks/>
-            <a:stCxn id="5" idx="2"/>
-            <a:endCxn id="20" idx="1"/>
-          </p:cNvCxnSpPr>
-          <p:nvPr/>
-        </p:nvCxnSpPr>
-        <p:spPr>
-          <a:xfrm flipH="1">
-            <a:off x="5608502" y="3809507"/>
-            <a:ext cx="1" cy="516462"/>
-          </a:xfrm>
-          <a:prstGeom prst="straightConnector1">
-            <a:avLst/>
-          </a:prstGeom>
-          <a:ln w="127000">
-            <a:solidFill>
-              <a:srgbClr val="0070C0"/>
-            </a:solidFill>
-            <a:tailEnd type="triangle"/>
-          </a:ln>
-        </p:spPr>
-        <p:style>
-          <a:lnRef idx="1">
-            <a:schemeClr val="accent1"/>
-          </a:lnRef>
-          <a:fillRef idx="0">
-            <a:schemeClr val="accent1"/>
-          </a:fillRef>
-          <a:effectRef idx="0">
-            <a:schemeClr val="accent1"/>
-          </a:effectRef>
-          <a:fontRef idx="minor">
-            <a:schemeClr val="tx1"/>
-          </a:fontRef>
-        </p:style>
-      </p:cxnSp>
+            <a:endParaRPr lang="fr-FR" sz="1000" dirty="0"/>
+          </a:p>
+        </p:txBody>
+      </p:sp>
       <p:sp>
         <p:nvSpPr>
           <p:cNvPr id="2" name="ZoneTexte 1">
@@ -5143,8 +5093,8 @@
         </p:nvSpPr>
         <p:spPr>
           <a:xfrm>
-            <a:off x="95250" y="405819"/>
-            <a:ext cx="7080613" cy="1200329"/>
+            <a:off x="95250" y="3593530"/>
+            <a:ext cx="3579851" cy="738664"/>
           </a:xfrm>
           <a:prstGeom prst="rect">
             <a:avLst/>
@@ -5158,19 +5108,19 @@
           <a:lstStyle/>
           <a:p>
             <a:r>
-              <a:rPr lang="fr-FR" sz="2400" dirty="0"/>
+              <a:rPr lang="fr-FR" sz="1400" dirty="0"/>
               <a:t>HTTP POST</a:t>
             </a:r>
           </a:p>
           <a:p>
             <a:r>
-              <a:rPr lang="fr-FR" sz="2400" dirty="0">
+              <a:rPr lang="fr-FR" sz="1400" dirty="0">
                 <a:hlinkClick r:id="rId4"/>
               </a:rPr>
               <a:t>http://slimfaas/</a:t>
             </a:r>
             <a:r>
-              <a:rPr lang="fr-FR" sz="2400" dirty="0">
+              <a:rPr lang="fr-FR" sz="1400" dirty="0">
                 <a:highlight>
                   <a:srgbClr val="FFFF00"/>
                 </a:highlight>
@@ -5179,13 +5129,13 @@
               <a:t>function</a:t>
             </a:r>
             <a:r>
-              <a:rPr lang="fr-FR" sz="2400" dirty="0">
+              <a:rPr lang="fr-FR" sz="1400" dirty="0">
                 <a:hlinkClick r:id="rId4"/>
               </a:rPr>
               <a:t>/</a:t>
             </a:r>
             <a:r>
-              <a:rPr lang="fr-FR" sz="2400" dirty="0">
+              <a:rPr lang="fr-FR" sz="1400" dirty="0">
                 <a:highlight>
                   <a:srgbClr val="00FF00"/>
                 </a:highlight>
@@ -5194,51 +5144,38 @@
               <a:t>fibonacci</a:t>
             </a:r>
             <a:r>
-              <a:rPr lang="fr-FR" sz="2400" dirty="0">
+              <a:rPr lang="fr-FR" sz="1400" dirty="0">
                 <a:hlinkClick r:id="rId4"/>
               </a:rPr>
-              <a:t>/</a:t>
-            </a:r>
-            <a:r>
-              <a:rPr lang="fr-FR" sz="2400" dirty="0">
-                <a:highlight>
-                  <a:srgbClr val="FF6C45"/>
-                </a:highlight>
-                <a:hlinkClick r:id="rId4"/>
-              </a:rPr>
-              <a:t>hello/guillaume</a:t>
-            </a:r>
-            <a:endParaRPr lang="fr-FR" sz="2400" dirty="0">
-              <a:highlight>
-                <a:srgbClr val="FF6C45"/>
-              </a:highlight>
-            </a:endParaRPr>
-          </a:p>
-          <a:p>
-            <a:r>
-              <a:rPr lang="fr-FR" sz="2400" dirty="0"/>
+              <a:t>/compute</a:t>
+            </a:r>
+            <a:endParaRPr lang="fr-FR" sz="1400" dirty="0"/>
+          </a:p>
+          <a:p>
+            <a:r>
+              <a:rPr lang="fr-FR" sz="1400" dirty="0"/>
               <a:t>{</a:t>
             </a:r>
             <a:r>
-              <a:rPr lang="fr-FR" sz="2400" b="0" i="0" dirty="0">
+              <a:rPr lang="fr-FR" sz="1400" b="0" i="0" dirty="0">
                 <a:effectLst/>
                 <a:latin typeface="-apple-system"/>
               </a:rPr>
               <a:t>"</a:t>
             </a:r>
             <a:r>
-              <a:rPr lang="fr-FR" sz="2400" dirty="0"/>
+              <a:rPr lang="fr-FR" sz="1400" dirty="0"/>
               <a:t>input</a:t>
             </a:r>
             <a:r>
-              <a:rPr lang="fr-FR" sz="2400" b="0" i="0" dirty="0">
+              <a:rPr lang="fr-FR" sz="1400" b="0" i="0" dirty="0">
                 <a:effectLst/>
                 <a:latin typeface="-apple-system"/>
               </a:rPr>
               <a:t>"</a:t>
             </a:r>
             <a:r>
-              <a:rPr lang="fr-FR" sz="2400" dirty="0"/>
+              <a:rPr lang="fr-FR" sz="1400" dirty="0"/>
               <a:t>:42}</a:t>
             </a:r>
           </a:p>
@@ -5258,8 +5195,8 @@
         </p:nvSpPr>
         <p:spPr>
           <a:xfrm>
-            <a:off x="7558644" y="2137261"/>
-            <a:ext cx="4438754" cy="1200329"/>
+            <a:off x="7465698" y="4176273"/>
+            <a:ext cx="2207393" cy="738664"/>
           </a:xfrm>
           <a:prstGeom prst="rect">
             <a:avLst/>
@@ -5273,19 +5210,19 @@
           <a:lstStyle/>
           <a:p>
             <a:r>
-              <a:rPr lang="fr-FR" sz="2400" dirty="0"/>
+              <a:rPr lang="fr-FR" sz="1400" dirty="0"/>
               <a:t>HTTP POST</a:t>
             </a:r>
           </a:p>
           <a:p>
             <a:r>
-              <a:rPr lang="fr-FR" sz="2400" dirty="0">
+              <a:rPr lang="fr-FR" sz="1400" dirty="0">
                 <a:hlinkClick r:id="rId5"/>
               </a:rPr>
               <a:t>http://</a:t>
             </a:r>
             <a:r>
-              <a:rPr lang="fr-FR" sz="2400" dirty="0">
+              <a:rPr lang="fr-FR" sz="1400" dirty="0">
                 <a:highlight>
                   <a:srgbClr val="00FF00"/>
                 </a:highlight>
@@ -5294,47 +5231,51 @@
               <a:t>fibonacci</a:t>
             </a:r>
             <a:r>
-              <a:rPr lang="fr-FR" sz="2400" dirty="0">
+              <a:rPr lang="fr-FR" sz="1400" dirty="0">
                 <a:hlinkClick r:id="rId5"/>
               </a:rPr>
               <a:t>/</a:t>
             </a:r>
             <a:r>
-              <a:rPr lang="fr-FR" sz="2400" dirty="0">
+              <a:rPr lang="fr-FR" sz="1400" dirty="0">
                 <a:highlight>
                   <a:srgbClr val="FF6C45"/>
                 </a:highlight>
                 <a:hlinkClick r:id="rId5"/>
               </a:rPr>
-              <a:t>hello/guillaume</a:t>
+              <a:t>compute</a:t>
             </a:r>
             <a:br>
-              <a:rPr lang="fr-FR" sz="2400" dirty="0"/>
+              <a:rPr lang="fr-FR" sz="1400" dirty="0">
+                <a:highlight>
+                  <a:srgbClr val="FF6C45"/>
+                </a:highlight>
+              </a:rPr>
             </a:br>
             <a:r>
-              <a:rPr lang="fr-FR" sz="2400" dirty="0"/>
+              <a:rPr lang="fr-FR" sz="1400" dirty="0"/>
               <a:t>{</a:t>
             </a:r>
             <a:r>
-              <a:rPr lang="fr-FR" sz="2400" b="0" i="0" dirty="0">
+              <a:rPr lang="fr-FR" sz="1400" b="0" i="0" dirty="0">
                 <a:effectLst/>
                 <a:latin typeface="-apple-system"/>
               </a:rPr>
               <a:t>"</a:t>
             </a:r>
             <a:r>
-              <a:rPr lang="fr-FR" sz="2400" dirty="0"/>
+              <a:rPr lang="fr-FR" sz="1400" dirty="0"/>
               <a:t>input</a:t>
             </a:r>
             <a:r>
-              <a:rPr lang="fr-FR" sz="2400" b="0" i="0" dirty="0">
+              <a:rPr lang="fr-FR" sz="1400" b="0" i="0" dirty="0">
                 <a:effectLst/>
                 <a:latin typeface="-apple-system"/>
               </a:rPr>
               <a:t>"</a:t>
             </a:r>
             <a:r>
-              <a:rPr lang="fr-FR" sz="2400" dirty="0"/>
+              <a:rPr lang="fr-FR" sz="1400" dirty="0"/>
               <a:t>:42}</a:t>
             </a:r>
           </a:p>
@@ -5719,9 +5660,7 @@
           <a:prstGeom prst="roundRect">
             <a:avLst/>
           </a:prstGeom>
-          <a:solidFill>
-            <a:srgbClr val="7030A0"/>
-          </a:solidFill>
+          <a:noFill/>
           <a:ln>
             <a:noFill/>
           </a:ln>
@@ -5778,9 +5717,7 @@
           <a:prstGeom prst="roundRect">
             <a:avLst/>
           </a:prstGeom>
-          <a:solidFill>
-            <a:srgbClr val="7030A0"/>
-          </a:solidFill>
+          <a:noFill/>
           <a:ln>
             <a:noFill/>
           </a:ln>
@@ -5942,7 +5879,7 @@
                 </a:highlight>
                 <a:hlinkClick r:id="rId4"/>
               </a:rPr>
-              <a:t>hello/guillaume</a:t>
+              <a:t>compute</a:t>
             </a:r>
             <a:endParaRPr lang="fr-FR" sz="1600" dirty="0">
               <a:highlight>
@@ -5994,8 +5931,8 @@
         </p:nvSpPr>
         <p:spPr>
           <a:xfrm>
-            <a:off x="6096000" y="3302938"/>
-            <a:ext cx="4920343" cy="1200329"/>
+            <a:off x="6096001" y="3302938"/>
+            <a:ext cx="2701198" cy="830997"/>
           </a:xfrm>
           <a:prstGeom prst="rect">
             <a:avLst/>
@@ -6009,19 +5946,19 @@
           <a:lstStyle/>
           <a:p>
             <a:r>
-              <a:rPr lang="fr-FR" sz="2400" dirty="0"/>
+              <a:rPr lang="fr-FR" sz="1600" dirty="0"/>
               <a:t>HTTP POST</a:t>
             </a:r>
           </a:p>
           <a:p>
             <a:r>
-              <a:rPr lang="fr-FR" sz="2400" dirty="0">
+              <a:rPr lang="fr-FR" sz="1600" dirty="0">
                 <a:hlinkClick r:id="rId5"/>
               </a:rPr>
               <a:t>http://</a:t>
             </a:r>
             <a:r>
-              <a:rPr lang="fr-FR" sz="2400" dirty="0">
+              <a:rPr lang="fr-FR" sz="1600" dirty="0">
                 <a:highlight>
                   <a:srgbClr val="00FF00"/>
                 </a:highlight>
@@ -6030,47 +5967,51 @@
               <a:t>fibonacci</a:t>
             </a:r>
             <a:r>
-              <a:rPr lang="fr-FR" sz="2400" dirty="0">
+              <a:rPr lang="fr-FR" sz="1600" dirty="0">
                 <a:hlinkClick r:id="rId5"/>
               </a:rPr>
               <a:t>/</a:t>
             </a:r>
             <a:r>
-              <a:rPr lang="fr-FR" sz="2400" dirty="0">
+              <a:rPr lang="fr-FR" sz="1600" dirty="0">
                 <a:highlight>
                   <a:srgbClr val="FF6C45"/>
                 </a:highlight>
                 <a:hlinkClick r:id="rId5"/>
               </a:rPr>
-              <a:t>hello/guillaume</a:t>
+              <a:t>compute</a:t>
             </a:r>
             <a:br>
-              <a:rPr lang="fr-FR" sz="2400" dirty="0"/>
+              <a:rPr lang="fr-FR" sz="1600" dirty="0">
+                <a:highlight>
+                  <a:srgbClr val="FF6C45"/>
+                </a:highlight>
+              </a:rPr>
             </a:br>
             <a:r>
-              <a:rPr lang="fr-FR" sz="2400" dirty="0"/>
+              <a:rPr lang="fr-FR" sz="1600" dirty="0"/>
               <a:t>{</a:t>
             </a:r>
             <a:r>
-              <a:rPr lang="fr-FR" sz="2400" b="0" i="0" dirty="0">
+              <a:rPr lang="fr-FR" sz="1600" b="0" i="0" dirty="0">
                 <a:effectLst/>
                 <a:latin typeface="-apple-system"/>
               </a:rPr>
               <a:t>"</a:t>
             </a:r>
             <a:r>
-              <a:rPr lang="fr-FR" sz="2400" dirty="0"/>
+              <a:rPr lang="fr-FR" sz="1600" dirty="0"/>
               <a:t>input</a:t>
             </a:r>
             <a:r>
-              <a:rPr lang="fr-FR" sz="2400" b="0" i="0" dirty="0">
+              <a:rPr lang="fr-FR" sz="1600" b="0" i="0" dirty="0">
                 <a:effectLst/>
                 <a:latin typeface="-apple-system"/>
               </a:rPr>
               <a:t>"</a:t>
             </a:r>
             <a:r>
-              <a:rPr lang="fr-FR" sz="2400" dirty="0"/>
+              <a:rPr lang="fr-FR" sz="1600" dirty="0"/>
               <a:t>:42}</a:t>
             </a:r>
           </a:p>
@@ -6539,8 +6480,8 @@
         </p:nvSpPr>
         <p:spPr>
           <a:xfrm>
-            <a:off x="5814767" y="3822474"/>
-            <a:ext cx="1659171" cy="543302"/>
+            <a:off x="5814767" y="3632460"/>
+            <a:ext cx="1659171" cy="923330"/>
           </a:xfrm>
           <a:prstGeom prst="roundRect">
             <a:avLst/>
@@ -7816,7 +7757,7 @@
           <p:cNvPr id="3" name="Espace réservé du contenu 2">
             <a:extLst>
               <a:ext uri="{FF2B5EF4-FFF2-40B4-BE49-F238E27FC236}">
-                <a16:creationId xmlns:a16="http://schemas.microsoft.com/office/drawing/2014/main" id="{FC72177F-6E5E-241E-BA74-8D91DC6E05F3}"/>
+                <a16:creationId xmlns:a16="http://schemas.microsoft.com/office/drawing/2014/main" id="{F808C092-CC0D-57C7-0901-F8EB72559CF1}"/>
               </a:ext>
             </a:extLst>
           </p:cNvPr>
@@ -7829,26 +7770,24 @@
         </p:nvSpPr>
         <p:spPr>
           <a:xfrm>
-            <a:off x="0" y="6391656"/>
-            <a:ext cx="12192000" cy="466343"/>
-          </a:xfrm>
-        </p:spPr>
-        <p:txBody>
-          <a:bodyPr>
-            <a:normAutofit lnSpcReduction="10000"/>
-          </a:bodyPr>
+            <a:off x="0" y="6301962"/>
+            <a:ext cx="12192000" cy="556038"/>
+          </a:xfrm>
+        </p:spPr>
+        <p:txBody>
+          <a:bodyPr/>
           <a:lstStyle/>
           <a:p>
-            <a:endParaRPr lang="fr-FR" dirty="0"/>
-          </a:p>
-        </p:txBody>
-      </p:sp>
-      <p:sp>
-        <p:nvSpPr>
-          <p:cNvPr id="6" name="Rounded Rectangle 44">
-            <a:extLst>
-              <a:ext uri="{FF2B5EF4-FFF2-40B4-BE49-F238E27FC236}">
-                <a16:creationId xmlns:a16="http://schemas.microsoft.com/office/drawing/2014/main" id="{DDD08BA0-70BB-583F-312D-C1BE714A89E8}"/>
+            <a:endParaRPr lang="fr-FR"/>
+          </a:p>
+        </p:txBody>
+      </p:sp>
+      <p:sp>
+        <p:nvSpPr>
+          <p:cNvPr id="4" name="Rectangle : coins arrondis 3">
+            <a:extLst>
+              <a:ext uri="{FF2B5EF4-FFF2-40B4-BE49-F238E27FC236}">
+                <a16:creationId xmlns:a16="http://schemas.microsoft.com/office/drawing/2014/main" id="{F9FDB491-B3FC-051D-11E0-E5F1546F9A17}"/>
               </a:ext>
             </a:extLst>
           </p:cNvPr>
@@ -7857,8 +7796,8 @@
         </p:nvSpPr>
         <p:spPr>
           <a:xfrm>
-            <a:off x="4275182" y="2785207"/>
-            <a:ext cx="2245224" cy="1125268"/>
+            <a:off x="6487884" y="4781006"/>
+            <a:ext cx="2621281" cy="1137502"/>
           </a:xfrm>
           <a:prstGeom prst="roundRect">
             <a:avLst/>
@@ -7893,287 +7832,7 @@
           <a:lstStyle/>
           <a:p>
             <a:pPr algn="ctr"/>
-            <a:r>
-              <a:rPr lang="en-US" sz="2400" dirty="0">
-                <a:solidFill>
-                  <a:schemeClr val="bg1"/>
-                </a:solidFill>
-              </a:rPr>
-              <a:t>SlimFaas</a:t>
-            </a:r>
-          </a:p>
-        </p:txBody>
-      </p:sp>
-      <p:cxnSp>
-        <p:nvCxnSpPr>
-          <p:cNvPr id="7" name="Connecteur droit avec flèche 6">
-            <a:extLst>
-              <a:ext uri="{FF2B5EF4-FFF2-40B4-BE49-F238E27FC236}">
-                <a16:creationId xmlns:a16="http://schemas.microsoft.com/office/drawing/2014/main" id="{2846A4F1-5F1E-1B4A-EAEC-F51C758D93A6}"/>
-              </a:ext>
-            </a:extLst>
-          </p:cNvPr>
-          <p:cNvCxnSpPr>
-            <a:cxnSpLocks/>
-            <a:stCxn id="8" idx="3"/>
-            <a:endCxn id="6" idx="1"/>
-          </p:cNvCxnSpPr>
-          <p:nvPr/>
-        </p:nvCxnSpPr>
-        <p:spPr>
-          <a:xfrm flipV="1">
-            <a:off x="3699119" y="3347841"/>
-            <a:ext cx="576063" cy="4215"/>
-          </a:xfrm>
-          <a:prstGeom prst="straightConnector1">
-            <a:avLst/>
-          </a:prstGeom>
-          <a:ln w="127000">
-            <a:solidFill>
-              <a:schemeClr val="accent6">
-                <a:lumMod val="75000"/>
-              </a:schemeClr>
-            </a:solidFill>
-            <a:tailEnd type="triangle"/>
-          </a:ln>
-        </p:spPr>
-        <p:style>
-          <a:lnRef idx="1">
-            <a:schemeClr val="accent1"/>
-          </a:lnRef>
-          <a:fillRef idx="0">
-            <a:schemeClr val="accent1"/>
-          </a:fillRef>
-          <a:effectRef idx="0">
-            <a:schemeClr val="accent1"/>
-          </a:effectRef>
-          <a:fontRef idx="minor">
-            <a:schemeClr val="tx1"/>
-          </a:fontRef>
-        </p:style>
-      </p:cxnSp>
-      <p:sp>
-        <p:nvSpPr>
-          <p:cNvPr id="8" name="ZoneTexte 7">
-            <a:extLst>
-              <a:ext uri="{FF2B5EF4-FFF2-40B4-BE49-F238E27FC236}">
-                <a16:creationId xmlns:a16="http://schemas.microsoft.com/office/drawing/2014/main" id="{AC32730B-6D07-37BE-5E05-17826CC33CC8}"/>
-              </a:ext>
-            </a:extLst>
-          </p:cNvPr>
-          <p:cNvSpPr txBox="1"/>
-          <p:nvPr/>
-        </p:nvSpPr>
-        <p:spPr>
-          <a:xfrm>
-            <a:off x="61124" y="2936557"/>
-            <a:ext cx="3637995" cy="830997"/>
-          </a:xfrm>
-          <a:prstGeom prst="rect">
-            <a:avLst/>
-          </a:prstGeom>
-          <a:noFill/>
-        </p:spPr>
-        <p:txBody>
-          <a:bodyPr wrap="square" rtlCol="0">
-            <a:spAutoFit/>
-          </a:bodyPr>
-          <a:lstStyle/>
-          <a:p>
-            <a:r>
-              <a:rPr lang="fr-FR" sz="1600" dirty="0"/>
-              <a:t>HTTP POST</a:t>
-            </a:r>
-          </a:p>
-          <a:p>
-            <a:r>
-              <a:rPr lang="fr-FR" sz="1600" dirty="0">
-                <a:hlinkClick r:id="rId2"/>
-              </a:rPr>
-              <a:t>http://slimfaas/</a:t>
-            </a:r>
-            <a:r>
-              <a:rPr lang="fr-FR" sz="1600" dirty="0">
-                <a:highlight>
-                  <a:srgbClr val="FFFF00"/>
-                </a:highlight>
-                <a:hlinkClick r:id="rId2"/>
-              </a:rPr>
-              <a:t>async-publish</a:t>
-            </a:r>
-            <a:r>
-              <a:rPr lang="fr-FR" sz="1600" dirty="0">
-                <a:hlinkClick r:id="rId2"/>
-              </a:rPr>
-              <a:t>/fibonacci</a:t>
-            </a:r>
-            <a:endParaRPr lang="fr-FR" sz="1600" dirty="0"/>
-          </a:p>
-          <a:p>
-            <a:r>
-              <a:rPr lang="fr-FR" sz="1600" dirty="0"/>
-              <a:t>{</a:t>
-            </a:r>
-            <a:r>
-              <a:rPr lang="fr-FR" sz="1600" b="0" i="0" dirty="0">
-                <a:effectLst/>
-                <a:latin typeface="-apple-system"/>
-              </a:rPr>
-              <a:t>"</a:t>
-            </a:r>
-            <a:r>
-              <a:rPr lang="fr-FR" sz="1600" dirty="0"/>
-              <a:t>input</a:t>
-            </a:r>
-            <a:r>
-              <a:rPr lang="fr-FR" sz="1600" b="0" i="0" dirty="0">
-                <a:effectLst/>
-                <a:latin typeface="-apple-system"/>
-              </a:rPr>
-              <a:t>"</a:t>
-            </a:r>
-            <a:r>
-              <a:rPr lang="fr-FR" sz="1600" dirty="0"/>
-              <a:t>:42}</a:t>
-            </a:r>
-          </a:p>
-        </p:txBody>
-      </p:sp>
-      <p:sp>
-        <p:nvSpPr>
-          <p:cNvPr id="9" name="ZoneTexte 8">
-            <a:extLst>
-              <a:ext uri="{FF2B5EF4-FFF2-40B4-BE49-F238E27FC236}">
-                <a16:creationId xmlns:a16="http://schemas.microsoft.com/office/drawing/2014/main" id="{6611272C-28EE-7524-CD4D-AAE3B72A1A73}"/>
-              </a:ext>
-            </a:extLst>
-          </p:cNvPr>
-          <p:cNvSpPr txBox="1"/>
-          <p:nvPr/>
-        </p:nvSpPr>
-        <p:spPr>
-          <a:xfrm>
-            <a:off x="6542729" y="997387"/>
-            <a:ext cx="1659171" cy="830997"/>
-          </a:xfrm>
-          <a:prstGeom prst="rect">
-            <a:avLst/>
-          </a:prstGeom>
-          <a:noFill/>
-        </p:spPr>
-        <p:txBody>
-          <a:bodyPr wrap="square" rtlCol="0">
-            <a:spAutoFit/>
-          </a:bodyPr>
-          <a:lstStyle/>
-          <a:p>
-            <a:r>
-              <a:rPr lang="fr-FR" sz="1600" dirty="0"/>
-              <a:t>HTTP POST</a:t>
-            </a:r>
-          </a:p>
-          <a:p>
-            <a:r>
-              <a:rPr lang="fr-FR" sz="1600" dirty="0">
-                <a:hlinkClick r:id="rId3"/>
-              </a:rPr>
-              <a:t>http://fibonacci</a:t>
-            </a:r>
-            <a:r>
-              <a:rPr lang="fr-FR" sz="1600" dirty="0"/>
-              <a:t> </a:t>
-            </a:r>
-            <a:br>
-              <a:rPr lang="fr-FR" sz="1600" dirty="0"/>
-            </a:br>
-            <a:r>
-              <a:rPr lang="fr-FR" sz="1600" dirty="0"/>
-              <a:t>{</a:t>
-            </a:r>
-            <a:r>
-              <a:rPr lang="fr-FR" sz="1600" b="0" i="0" dirty="0">
-                <a:effectLst/>
-                <a:latin typeface="-apple-system"/>
-              </a:rPr>
-              <a:t>"</a:t>
-            </a:r>
-            <a:r>
-              <a:rPr lang="fr-FR" sz="1600" dirty="0"/>
-              <a:t>input</a:t>
-            </a:r>
-            <a:r>
-              <a:rPr lang="fr-FR" sz="1600" b="0" i="0" dirty="0">
-                <a:effectLst/>
-                <a:latin typeface="-apple-system"/>
-              </a:rPr>
-              <a:t>"</a:t>
-            </a:r>
-            <a:r>
-              <a:rPr lang="fr-FR" sz="1600" dirty="0"/>
-              <a:t>:42}</a:t>
-            </a:r>
-          </a:p>
-        </p:txBody>
-      </p:sp>
-      <p:sp>
-        <p:nvSpPr>
-          <p:cNvPr id="10" name="Rounded Rectangle 45">
-            <a:extLst>
-              <a:ext uri="{FF2B5EF4-FFF2-40B4-BE49-F238E27FC236}">
-                <a16:creationId xmlns:a16="http://schemas.microsoft.com/office/drawing/2014/main" id="{D79C9965-A2CD-C2C1-A01C-697EABB121C8}"/>
-              </a:ext>
-            </a:extLst>
-          </p:cNvPr>
-          <p:cNvSpPr/>
-          <p:nvPr/>
-        </p:nvSpPr>
-        <p:spPr>
-          <a:xfrm>
-            <a:off x="8812333" y="509182"/>
-            <a:ext cx="3040144" cy="1540322"/>
-          </a:xfrm>
-          <a:prstGeom prst="roundRect">
-            <a:avLst/>
-          </a:prstGeom>
-          <a:solidFill>
-            <a:schemeClr val="bg2">
-              <a:lumMod val="25000"/>
-            </a:schemeClr>
-          </a:solidFill>
-          <a:ln>
-            <a:noFill/>
-          </a:ln>
-        </p:spPr>
-        <p:style>
-          <a:lnRef idx="2">
-            <a:schemeClr val="accent1">
-              <a:shade val="50000"/>
-            </a:schemeClr>
-          </a:lnRef>
-          <a:fillRef idx="1">
-            <a:schemeClr val="accent1"/>
-          </a:fillRef>
-          <a:effectRef idx="0">
-            <a:schemeClr val="accent1"/>
-          </a:effectRef>
-          <a:fontRef idx="minor">
-            <a:schemeClr val="lt1"/>
-          </a:fontRef>
-        </p:style>
-        <p:txBody>
-          <a:bodyPr rtlCol="0" anchor="ctr"/>
-          <a:lstStyle/>
-          <a:p>
-            <a:pPr algn="ctr"/>
-            <a:r>
-              <a:rPr lang="fr-FR" sz="2400" dirty="0">
-                <a:solidFill>
-                  <a:schemeClr val="bg1"/>
-                </a:solidFill>
-              </a:rPr>
-              <a:t>function « fibonacci » instance 1</a:t>
-            </a:r>
-            <a:endParaRPr lang="en-FR" sz="2400" dirty="0">
+            <a:endParaRPr lang="fr-FR" sz="4000">
               <a:solidFill>
                 <a:schemeClr val="bg1"/>
               </a:solidFill>
@@ -8183,10 +7842,10 @@
       </p:sp>
       <p:pic>
         <p:nvPicPr>
-          <p:cNvPr id="11" name="Picture 2" descr="Afficher l’image source">
-            <a:extLst>
-              <a:ext uri="{FF2B5EF4-FFF2-40B4-BE49-F238E27FC236}">
-                <a16:creationId xmlns:a16="http://schemas.microsoft.com/office/drawing/2014/main" id="{B80A9736-02F1-1190-8A3C-F71D0B8C1D08}"/>
+          <p:cNvPr id="6" name="Picture 2" descr="Afficher l’image source">
+            <a:extLst>
+              <a:ext uri="{FF2B5EF4-FFF2-40B4-BE49-F238E27FC236}">
+                <a16:creationId xmlns:a16="http://schemas.microsoft.com/office/drawing/2014/main" id="{86FC0B2B-0EA9-9828-9A73-E62E8C8C11FB}"/>
               </a:ext>
             </a:extLst>
           </p:cNvPr>
@@ -8196,7 +7855,7 @@
           <p:nvPr/>
         </p:nvPicPr>
         <p:blipFill>
-          <a:blip r:embed="rId4">
+          <a:blip r:embed="rId2">
             <a:extLst>
               <a:ext uri="{28A0092B-C50C-407E-A947-70E740481C1C}">
                 <a14:useLocalDpi xmlns:a14="http://schemas.microsoft.com/office/drawing/2010/main" val="0"/>
@@ -8210,8 +7869,8 @@
         </p:blipFill>
         <p:spPr bwMode="auto">
           <a:xfrm>
-            <a:off x="8618142" y="206059"/>
-            <a:ext cx="588793" cy="572693"/>
+            <a:off x="8837789" y="4620991"/>
+            <a:ext cx="421692" cy="410161"/>
           </a:xfrm>
           <a:prstGeom prst="rect">
             <a:avLst/>
@@ -8228,136 +7887,12 @@
           </a:extLst>
         </p:spPr>
       </p:pic>
-      <p:cxnSp>
-        <p:nvCxnSpPr>
-          <p:cNvPr id="12" name="Connecteur droit avec flèche 11">
-            <a:extLst>
-              <a:ext uri="{FF2B5EF4-FFF2-40B4-BE49-F238E27FC236}">
-                <a16:creationId xmlns:a16="http://schemas.microsoft.com/office/drawing/2014/main" id="{3AFE1186-6876-1E2D-BB90-BFA726C0ACA3}"/>
-              </a:ext>
-            </a:extLst>
-          </p:cNvPr>
-          <p:cNvCxnSpPr>
-            <a:cxnSpLocks/>
-            <a:stCxn id="6" idx="3"/>
-            <a:endCxn id="10" idx="1"/>
-          </p:cNvCxnSpPr>
-          <p:nvPr/>
-        </p:nvCxnSpPr>
-        <p:spPr>
-          <a:xfrm flipV="1">
-            <a:off x="6520406" y="1279343"/>
-            <a:ext cx="2291927" cy="2068498"/>
-          </a:xfrm>
-          <a:prstGeom prst="straightConnector1">
-            <a:avLst/>
-          </a:prstGeom>
-          <a:ln w="127000">
-            <a:solidFill>
-              <a:schemeClr val="accent6">
-                <a:lumMod val="75000"/>
-              </a:schemeClr>
-            </a:solidFill>
-            <a:tailEnd type="triangle"/>
-          </a:ln>
-        </p:spPr>
-        <p:style>
-          <a:lnRef idx="1">
-            <a:schemeClr val="accent1"/>
-          </a:lnRef>
-          <a:fillRef idx="0">
-            <a:schemeClr val="accent1"/>
-          </a:fillRef>
-          <a:effectRef idx="0">
-            <a:schemeClr val="accent1"/>
-          </a:effectRef>
-          <a:fontRef idx="minor">
-            <a:schemeClr val="tx1"/>
-          </a:fontRef>
-        </p:style>
-      </p:cxnSp>
-      <p:sp>
-        <p:nvSpPr>
-          <p:cNvPr id="22" name="ZoneTexte 21">
-            <a:extLst>
-              <a:ext uri="{FF2B5EF4-FFF2-40B4-BE49-F238E27FC236}">
-                <a16:creationId xmlns:a16="http://schemas.microsoft.com/office/drawing/2014/main" id="{B20F6461-EFC4-60A1-6479-F83792C4E189}"/>
-              </a:ext>
-            </a:extLst>
-          </p:cNvPr>
-          <p:cNvSpPr txBox="1"/>
-          <p:nvPr/>
-        </p:nvSpPr>
-        <p:spPr>
-          <a:xfrm>
-            <a:off x="7304194" y="3284661"/>
-            <a:ext cx="1659171" cy="830997"/>
-          </a:xfrm>
-          <a:prstGeom prst="rect">
-            <a:avLst/>
-          </a:prstGeom>
-          <a:noFill/>
-        </p:spPr>
-        <p:txBody>
-          <a:bodyPr wrap="square" rtlCol="0">
-            <a:spAutoFit/>
-          </a:bodyPr>
-          <a:lstStyle/>
-          <a:p>
-            <a:r>
-              <a:rPr lang="fr-FR" sz="1600" dirty="0"/>
-              <a:t>HTTP POST</a:t>
-            </a:r>
-          </a:p>
-          <a:p>
-            <a:r>
-              <a:rPr lang="fr-FR" sz="1600" dirty="0">
-                <a:hlinkClick r:id="rId3"/>
-              </a:rPr>
-              <a:t>http://fibonacci</a:t>
-            </a:r>
-            <a:r>
-              <a:rPr lang="fr-FR" sz="1600" dirty="0"/>
-              <a:t> </a:t>
-            </a:r>
-            <a:br>
-              <a:rPr lang="fr-FR" sz="1600" dirty="0"/>
-            </a:br>
-            <a:r>
-              <a:rPr lang="fr-FR" sz="1600" dirty="0"/>
-              <a:t>{</a:t>
-            </a:r>
-            <a:r>
-              <a:rPr lang="fr-FR" sz="1600" b="0" i="0" dirty="0">
-                <a:effectLst/>
-                <a:latin typeface="-apple-system"/>
-              </a:rPr>
-              <a:t>"</a:t>
-            </a:r>
-            <a:r>
-              <a:rPr lang="fr-FR" sz="1600" dirty="0"/>
-              <a:t>input</a:t>
-            </a:r>
-            <a:r>
-              <a:rPr lang="fr-FR" sz="1600" b="0" i="0" dirty="0">
-                <a:effectLst/>
-                <a:latin typeface="-apple-system"/>
-              </a:rPr>
-              <a:t>"</a:t>
-            </a:r>
-            <a:r>
-              <a:rPr lang="fr-FR" sz="1600" dirty="0"/>
-              <a:t>:42}</a:t>
-            </a:r>
-          </a:p>
-        </p:txBody>
-      </p:sp>
-      <p:sp>
-        <p:nvSpPr>
-          <p:cNvPr id="23" name="Rounded Rectangle 45">
-            <a:extLst>
-              <a:ext uri="{FF2B5EF4-FFF2-40B4-BE49-F238E27FC236}">
-                <a16:creationId xmlns:a16="http://schemas.microsoft.com/office/drawing/2014/main" id="{02CDF874-6617-192D-7FBF-DFCDF050DE8B}"/>
+      <p:sp>
+        <p:nvSpPr>
+          <p:cNvPr id="13" name="Rectangle : coins arrondis 12">
+            <a:extLst>
+              <a:ext uri="{FF2B5EF4-FFF2-40B4-BE49-F238E27FC236}">
+                <a16:creationId xmlns:a16="http://schemas.microsoft.com/office/drawing/2014/main" id="{286E557E-9D2D-E39E-7BAA-470B8AA24E84}"/>
               </a:ext>
             </a:extLst>
           </p:cNvPr>
@@ -8366,8 +7901,8 @@
         </p:nvSpPr>
         <p:spPr>
           <a:xfrm>
-            <a:off x="8858733" y="2401822"/>
-            <a:ext cx="3040144" cy="1540322"/>
+            <a:off x="9030787" y="2914738"/>
+            <a:ext cx="2621281" cy="1137502"/>
           </a:xfrm>
           <a:prstGeom prst="roundRect">
             <a:avLst/>
@@ -8402,23 +7937,20 @@
           <a:lstStyle/>
           <a:p>
             <a:pPr algn="ctr"/>
-            <a:r>
-              <a:rPr lang="fr-FR" sz="2400" dirty="0">
-                <a:solidFill>
-                  <a:schemeClr val="bg1"/>
-                </a:solidFill>
-              </a:rPr>
-              <a:t>function « fibonacci » instance 2</a:t>
-            </a:r>
+            <a:endParaRPr lang="fr-FR" sz="4000">
+              <a:solidFill>
+                <a:schemeClr val="bg1"/>
+              </a:solidFill>
+            </a:endParaRPr>
           </a:p>
         </p:txBody>
       </p:sp>
       <p:pic>
         <p:nvPicPr>
-          <p:cNvPr id="24" name="Picture 2" descr="Afficher l’image source">
-            <a:extLst>
-              <a:ext uri="{FF2B5EF4-FFF2-40B4-BE49-F238E27FC236}">
-                <a16:creationId xmlns:a16="http://schemas.microsoft.com/office/drawing/2014/main" id="{6367FF6E-BE42-9237-982C-7249BC298201}"/>
+          <p:cNvPr id="15" name="Picture 2" descr="Afficher l’image source">
+            <a:extLst>
+              <a:ext uri="{FF2B5EF4-FFF2-40B4-BE49-F238E27FC236}">
+                <a16:creationId xmlns:a16="http://schemas.microsoft.com/office/drawing/2014/main" id="{88ED471D-D11B-63C5-CD2D-4DECE1E35849}"/>
               </a:ext>
             </a:extLst>
           </p:cNvPr>
@@ -8428,7 +7960,7 @@
           <p:nvPr/>
         </p:nvPicPr>
         <p:blipFill>
-          <a:blip r:embed="rId4">
+          <a:blip r:embed="rId2">
             <a:extLst>
               <a:ext uri="{28A0092B-C50C-407E-A947-70E740481C1C}">
                 <a14:useLocalDpi xmlns:a14="http://schemas.microsoft.com/office/drawing/2010/main" val="0"/>
@@ -8442,8 +7974,8 @@
         </p:blipFill>
         <p:spPr bwMode="auto">
           <a:xfrm>
-            <a:off x="8799603" y="2111546"/>
-            <a:ext cx="588793" cy="572693"/>
+            <a:off x="11380692" y="2754723"/>
+            <a:ext cx="421692" cy="410161"/>
           </a:xfrm>
           <a:prstGeom prst="rect">
             <a:avLst/>
@@ -8460,60 +7992,12 @@
           </a:extLst>
         </p:spPr>
       </p:pic>
-      <p:cxnSp>
-        <p:nvCxnSpPr>
-          <p:cNvPr id="25" name="Connecteur droit avec flèche 24">
-            <a:extLst>
-              <a:ext uri="{FF2B5EF4-FFF2-40B4-BE49-F238E27FC236}">
-                <a16:creationId xmlns:a16="http://schemas.microsoft.com/office/drawing/2014/main" id="{47CCB34C-BDE9-83E6-DBE9-369CE229F27F}"/>
-              </a:ext>
-            </a:extLst>
-          </p:cNvPr>
-          <p:cNvCxnSpPr>
-            <a:cxnSpLocks/>
-            <a:stCxn id="6" idx="3"/>
-            <a:endCxn id="23" idx="1"/>
-          </p:cNvCxnSpPr>
-          <p:nvPr/>
-        </p:nvCxnSpPr>
-        <p:spPr>
-          <a:xfrm flipV="1">
-            <a:off x="6520406" y="3171983"/>
-            <a:ext cx="2338327" cy="175858"/>
-          </a:xfrm>
-          <a:prstGeom prst="straightConnector1">
-            <a:avLst/>
-          </a:prstGeom>
-          <a:ln w="127000">
-            <a:solidFill>
-              <a:schemeClr val="accent6">
-                <a:lumMod val="75000"/>
-              </a:schemeClr>
-            </a:solidFill>
-            <a:tailEnd type="triangle"/>
-          </a:ln>
-        </p:spPr>
-        <p:style>
-          <a:lnRef idx="1">
-            <a:schemeClr val="accent1"/>
-          </a:lnRef>
-          <a:fillRef idx="0">
-            <a:schemeClr val="accent1"/>
-          </a:fillRef>
-          <a:effectRef idx="0">
-            <a:schemeClr val="accent1"/>
-          </a:effectRef>
-          <a:fontRef idx="minor">
-            <a:schemeClr val="tx1"/>
-          </a:fontRef>
-        </p:style>
-      </p:cxnSp>
-      <p:sp>
-        <p:nvSpPr>
-          <p:cNvPr id="28" name="Rounded Rectangle 45">
-            <a:extLst>
-              <a:ext uri="{FF2B5EF4-FFF2-40B4-BE49-F238E27FC236}">
-                <a16:creationId xmlns:a16="http://schemas.microsoft.com/office/drawing/2014/main" id="{38FF5A4C-559C-1D52-9476-314AAD56BECB}"/>
+      <p:sp>
+        <p:nvSpPr>
+          <p:cNvPr id="17" name="Rectangle : coins arrondis 16">
+            <a:extLst>
+              <a:ext uri="{FF2B5EF4-FFF2-40B4-BE49-F238E27FC236}">
+                <a16:creationId xmlns:a16="http://schemas.microsoft.com/office/drawing/2014/main" id="{FA892C96-9746-CAD2-5A8F-2877A3233167}"/>
               </a:ext>
             </a:extLst>
           </p:cNvPr>
@@ -8522,8 +8006,8 @@
         </p:nvSpPr>
         <p:spPr>
           <a:xfrm>
-            <a:off x="8822212" y="4493355"/>
-            <a:ext cx="3040144" cy="1540322"/>
+            <a:off x="6337568" y="1231306"/>
+            <a:ext cx="2621281" cy="1137502"/>
           </a:xfrm>
           <a:prstGeom prst="roundRect">
             <a:avLst/>
@@ -8558,23 +8042,77 @@
           <a:lstStyle/>
           <a:p>
             <a:pPr algn="ctr"/>
-            <a:r>
-              <a:rPr lang="fr-FR" sz="2400" dirty="0">
+            <a:endParaRPr lang="fr-FR" sz="4000">
+              <a:solidFill>
+                <a:schemeClr val="bg1"/>
+              </a:solidFill>
+            </a:endParaRPr>
+          </a:p>
+        </p:txBody>
+      </p:sp>
+      <p:sp>
+        <p:nvSpPr>
+          <p:cNvPr id="18" name="Rounded Rectangle 44">
+            <a:extLst>
+              <a:ext uri="{FF2B5EF4-FFF2-40B4-BE49-F238E27FC236}">
+                <a16:creationId xmlns:a16="http://schemas.microsoft.com/office/drawing/2014/main" id="{2AD36C36-BFA5-B972-A126-EDA1BAD396E0}"/>
+              </a:ext>
+            </a:extLst>
+          </p:cNvPr>
+          <p:cNvSpPr/>
+          <p:nvPr/>
+        </p:nvSpPr>
+        <p:spPr>
+          <a:xfrm>
+            <a:off x="6656105" y="1423364"/>
+            <a:ext cx="1863194" cy="776491"/>
+          </a:xfrm>
+          <a:prstGeom prst="roundRect">
+            <a:avLst/>
+          </a:prstGeom>
+          <a:noFill/>
+          <a:ln>
+            <a:noFill/>
+          </a:ln>
+        </p:spPr>
+        <p:style>
+          <a:lnRef idx="2">
+            <a:schemeClr val="accent1">
+              <a:shade val="50000"/>
+            </a:schemeClr>
+          </a:lnRef>
+          <a:fillRef idx="1">
+            <a:schemeClr val="accent1"/>
+          </a:fillRef>
+          <a:effectRef idx="0">
+            <a:schemeClr val="accent1"/>
+          </a:effectRef>
+          <a:fontRef idx="minor">
+            <a:schemeClr val="lt1"/>
+          </a:fontRef>
+        </p:style>
+        <p:txBody>
+          <a:bodyPr rtlCol="0" anchor="ctr"/>
+          <a:lstStyle/>
+          <a:p>
+            <a:pPr algn="ctr"/>
+            <a:r>
+              <a:rPr lang="en-US" sz="1400" dirty="0">
                 <a:solidFill>
                   <a:schemeClr val="bg1"/>
                 </a:solidFill>
               </a:rPr>
-              <a:t>function « fibonacci » instance 3</a:t>
+              <a:t>SlimFaas</a:t>
             </a:r>
           </a:p>
         </p:txBody>
       </p:sp>
       <p:pic>
         <p:nvPicPr>
-          <p:cNvPr id="29" name="Picture 2" descr="Afficher l’image source">
-            <a:extLst>
-              <a:ext uri="{FF2B5EF4-FFF2-40B4-BE49-F238E27FC236}">
-                <a16:creationId xmlns:a16="http://schemas.microsoft.com/office/drawing/2014/main" id="{5C2C929B-DD3A-D402-D3D0-47B59BB4F807}"/>
+          <p:cNvPr id="19" name="Picture 2" descr="Afficher l’image source">
+            <a:extLst>
+              <a:ext uri="{FF2B5EF4-FFF2-40B4-BE49-F238E27FC236}">
+                <a16:creationId xmlns:a16="http://schemas.microsoft.com/office/drawing/2014/main" id="{A69EEC02-815C-3D73-8D5E-E235B608C8FA}"/>
               </a:ext>
             </a:extLst>
           </p:cNvPr>
@@ -8584,7 +8122,7 @@
           <p:nvPr/>
         </p:nvPicPr>
         <p:blipFill>
-          <a:blip r:embed="rId4">
+          <a:blip r:embed="rId2">
             <a:extLst>
               <a:ext uri="{28A0092B-C50C-407E-A947-70E740481C1C}">
                 <a14:useLocalDpi xmlns:a14="http://schemas.microsoft.com/office/drawing/2010/main" val="0"/>
@@ -8598,8 +8136,8 @@
         </p:blipFill>
         <p:spPr bwMode="auto">
           <a:xfrm>
-            <a:off x="8753203" y="4252319"/>
-            <a:ext cx="588793" cy="572693"/>
+            <a:off x="8687473" y="1071291"/>
+            <a:ext cx="421692" cy="410161"/>
           </a:xfrm>
           <a:prstGeom prst="rect">
             <a:avLst/>
@@ -8616,243 +8154,12 @@
           </a:extLst>
         </p:spPr>
       </p:pic>
-      <p:cxnSp>
-        <p:nvCxnSpPr>
-          <p:cNvPr id="30" name="Connecteur droit avec flèche 29">
-            <a:extLst>
-              <a:ext uri="{FF2B5EF4-FFF2-40B4-BE49-F238E27FC236}">
-                <a16:creationId xmlns:a16="http://schemas.microsoft.com/office/drawing/2014/main" id="{3C17D7D9-AD0C-3CB9-E9C2-8FE52952EA0A}"/>
-              </a:ext>
-            </a:extLst>
-          </p:cNvPr>
-          <p:cNvCxnSpPr>
-            <a:cxnSpLocks/>
-            <a:stCxn id="6" idx="3"/>
-            <a:endCxn id="28" idx="1"/>
-          </p:cNvCxnSpPr>
-          <p:nvPr/>
-        </p:nvCxnSpPr>
-        <p:spPr>
-          <a:xfrm>
-            <a:off x="6520406" y="3347841"/>
-            <a:ext cx="2301806" cy="1915675"/>
-          </a:xfrm>
-          <a:prstGeom prst="straightConnector1">
-            <a:avLst/>
-          </a:prstGeom>
-          <a:ln w="127000">
-            <a:solidFill>
-              <a:schemeClr val="accent6">
-                <a:lumMod val="75000"/>
-              </a:schemeClr>
-            </a:solidFill>
-            <a:tailEnd type="triangle"/>
-          </a:ln>
-        </p:spPr>
-        <p:style>
-          <a:lnRef idx="1">
-            <a:schemeClr val="accent1"/>
-          </a:lnRef>
-          <a:fillRef idx="0">
-            <a:schemeClr val="accent1"/>
-          </a:fillRef>
-          <a:effectRef idx="0">
-            <a:schemeClr val="accent1"/>
-          </a:effectRef>
-          <a:fontRef idx="minor">
-            <a:schemeClr val="tx1"/>
-          </a:fontRef>
-        </p:style>
-      </p:cxnSp>
-      <p:sp>
-        <p:nvSpPr>
-          <p:cNvPr id="38" name="ZoneTexte 37">
-            <a:extLst>
-              <a:ext uri="{FF2B5EF4-FFF2-40B4-BE49-F238E27FC236}">
-                <a16:creationId xmlns:a16="http://schemas.microsoft.com/office/drawing/2014/main" id="{3E51368A-C3EC-DCF9-2D42-54C522F99A21}"/>
-              </a:ext>
-            </a:extLst>
-          </p:cNvPr>
-          <p:cNvSpPr txBox="1"/>
-          <p:nvPr/>
-        </p:nvSpPr>
-        <p:spPr>
-          <a:xfrm>
-            <a:off x="7218978" y="5412088"/>
-            <a:ext cx="1659171" cy="830997"/>
-          </a:xfrm>
-          <a:prstGeom prst="rect">
-            <a:avLst/>
-          </a:prstGeom>
-          <a:noFill/>
-        </p:spPr>
-        <p:txBody>
-          <a:bodyPr wrap="square" rtlCol="0">
-            <a:spAutoFit/>
-          </a:bodyPr>
-          <a:lstStyle/>
-          <a:p>
-            <a:r>
-              <a:rPr lang="fr-FR" sz="1600" dirty="0"/>
-              <a:t>HTTP POST</a:t>
-            </a:r>
-          </a:p>
-          <a:p>
-            <a:r>
-              <a:rPr lang="fr-FR" sz="1600" dirty="0">
-                <a:hlinkClick r:id="rId3"/>
-              </a:rPr>
-              <a:t>http://fibonacci</a:t>
-            </a:r>
-            <a:r>
-              <a:rPr lang="fr-FR" sz="1600" dirty="0"/>
-              <a:t> </a:t>
-            </a:r>
-            <a:br>
-              <a:rPr lang="fr-FR" sz="1600" dirty="0"/>
-            </a:br>
-            <a:r>
-              <a:rPr lang="fr-FR" sz="1600" dirty="0"/>
-              <a:t>{</a:t>
-            </a:r>
-            <a:r>
-              <a:rPr lang="fr-FR" sz="1600" b="0" i="0" dirty="0">
-                <a:effectLst/>
-                <a:latin typeface="-apple-system"/>
-              </a:rPr>
-              <a:t>"</a:t>
-            </a:r>
-            <a:r>
-              <a:rPr lang="fr-FR" sz="1600" dirty="0"/>
-              <a:t>input</a:t>
-            </a:r>
-            <a:r>
-              <a:rPr lang="fr-FR" sz="1600" b="0" i="0" dirty="0">
-                <a:effectLst/>
-                <a:latin typeface="-apple-system"/>
-              </a:rPr>
-              <a:t>"</a:t>
-            </a:r>
-            <a:r>
-              <a:rPr lang="fr-FR" sz="1600" dirty="0"/>
-              <a:t>:42}</a:t>
-            </a:r>
-          </a:p>
-        </p:txBody>
-      </p:sp>
-      <p:pic>
-        <p:nvPicPr>
-          <p:cNvPr id="5" name="Picture 2" descr="Afficher l’image source">
-            <a:extLst>
-              <a:ext uri="{FF2B5EF4-FFF2-40B4-BE49-F238E27FC236}">
-                <a16:creationId xmlns:a16="http://schemas.microsoft.com/office/drawing/2014/main" id="{9CF92849-9C7F-61C9-32C2-F99F37E01F43}"/>
-              </a:ext>
-            </a:extLst>
-          </p:cNvPr>
-          <p:cNvPicPr>
-            <a:picLocks noChangeAspect="1" noChangeArrowheads="1"/>
-          </p:cNvPicPr>
-          <p:nvPr/>
-        </p:nvPicPr>
-        <p:blipFill>
-          <a:blip r:embed="rId4">
-            <a:extLst>
-              <a:ext uri="{28A0092B-C50C-407E-A947-70E740481C1C}">
-                <a14:useLocalDpi xmlns:a14="http://schemas.microsoft.com/office/drawing/2010/main" val="0"/>
-              </a:ext>
-            </a:extLst>
-          </a:blip>
-          <a:srcRect/>
-          <a:stretch>
-            <a:fillRect/>
-          </a:stretch>
-        </p:blipFill>
-        <p:spPr bwMode="auto">
-          <a:xfrm>
-            <a:off x="4066798" y="2514707"/>
-            <a:ext cx="588793" cy="572693"/>
-          </a:xfrm>
-          <a:prstGeom prst="rect">
-            <a:avLst/>
-          </a:prstGeom>
-          <a:noFill/>
-          <a:extLst>
-            <a:ext uri="{909E8E84-426E-40DD-AFC4-6F175D3DCCD1}">
-              <a14:hiddenFill xmlns:a14="http://schemas.microsoft.com/office/drawing/2010/main">
-                <a:solidFill>
-                  <a:srgbClr val="FFFFFF"/>
-                </a:solidFill>
-              </a14:hiddenFill>
-            </a:ext>
-          </a:extLst>
-        </p:spPr>
-      </p:pic>
-    </p:spTree>
-    <p:extLst>
-      <p:ext uri="{BB962C8B-B14F-4D97-AF65-F5344CB8AC3E}">
-        <p14:creationId xmlns:p14="http://schemas.microsoft.com/office/powerpoint/2010/main" val="1816212992"/>
-      </p:ext>
-    </p:extLst>
-  </p:cSld>
-  <p:clrMapOvr>
-    <a:masterClrMapping/>
-  </p:clrMapOvr>
-</p:sld>
-</file>
-
-<file path=ppt/slides/slide5.xml><?xml version="1.0" encoding="utf-8"?>
-<p:sld xmlns:a="http://schemas.openxmlformats.org/drawingml/2006/main" xmlns:r="http://schemas.openxmlformats.org/officeDocument/2006/relationships" xmlns:p="http://schemas.openxmlformats.org/presentationml/2006/main">
-  <p:cSld>
-    <p:spTree>
-      <p:nvGrpSpPr>
-        <p:cNvPr id="1" name=""/>
-        <p:cNvGrpSpPr/>
-        <p:nvPr/>
-      </p:nvGrpSpPr>
-      <p:grpSpPr>
-        <a:xfrm>
-          <a:off x="0" y="0"/>
-          <a:ext cx="0" cy="0"/>
-          <a:chOff x="0" y="0"/>
-          <a:chExt cx="0" cy="0"/>
-        </a:xfrm>
-      </p:grpSpPr>
-      <p:sp>
-        <p:nvSpPr>
-          <p:cNvPr id="3" name="Espace réservé du contenu 2">
-            <a:extLst>
-              <a:ext uri="{FF2B5EF4-FFF2-40B4-BE49-F238E27FC236}">
-                <a16:creationId xmlns:a16="http://schemas.microsoft.com/office/drawing/2014/main" id="{F808C092-CC0D-57C7-0901-F8EB72559CF1}"/>
-              </a:ext>
-            </a:extLst>
-          </p:cNvPr>
-          <p:cNvSpPr>
-            <a:spLocks noGrp="1"/>
-          </p:cNvSpPr>
-          <p:nvPr>
-            <p:ph idx="1"/>
-          </p:nvPr>
-        </p:nvSpPr>
-        <p:spPr>
-          <a:xfrm>
-            <a:off x="0" y="6301962"/>
-            <a:ext cx="12192000" cy="556038"/>
-          </a:xfrm>
-        </p:spPr>
-        <p:txBody>
-          <a:bodyPr/>
-          <a:lstStyle/>
-          <a:p>
-            <a:endParaRPr lang="fr-FR"/>
-          </a:p>
-        </p:txBody>
-      </p:sp>
-      <p:sp>
-        <p:nvSpPr>
-          <p:cNvPr id="4" name="Rectangle : coins arrondis 3">
-            <a:extLst>
-              <a:ext uri="{FF2B5EF4-FFF2-40B4-BE49-F238E27FC236}">
-                <a16:creationId xmlns:a16="http://schemas.microsoft.com/office/drawing/2014/main" id="{F9FDB491-B3FC-051D-11E0-E5F1546F9A17}"/>
+      <p:sp>
+        <p:nvSpPr>
+          <p:cNvPr id="20" name="Cylindre 19">
+            <a:extLst>
+              <a:ext uri="{FF2B5EF4-FFF2-40B4-BE49-F238E27FC236}">
+                <a16:creationId xmlns:a16="http://schemas.microsoft.com/office/drawing/2014/main" id="{9AA8AB1F-9667-FC25-A1EA-CE17557BDC77}"/>
               </a:ext>
             </a:extLst>
           </p:cNvPr>
@@ -8861,172 +8168,8 @@
         </p:nvSpPr>
         <p:spPr>
           <a:xfrm>
-            <a:off x="6487884" y="4781006"/>
-            <a:ext cx="2621281" cy="1137502"/>
-          </a:xfrm>
-          <a:prstGeom prst="roundRect">
-            <a:avLst/>
-          </a:prstGeom>
-          <a:solidFill>
-            <a:schemeClr val="bg2">
-              <a:lumMod val="25000"/>
-            </a:schemeClr>
-          </a:solidFill>
-          <a:ln>
-            <a:noFill/>
-          </a:ln>
-        </p:spPr>
-        <p:style>
-          <a:lnRef idx="2">
-            <a:schemeClr val="accent1">
-              <a:shade val="50000"/>
-            </a:schemeClr>
-          </a:lnRef>
-          <a:fillRef idx="1">
-            <a:schemeClr val="accent1"/>
-          </a:fillRef>
-          <a:effectRef idx="0">
-            <a:schemeClr val="accent1"/>
-          </a:effectRef>
-          <a:fontRef idx="minor">
-            <a:schemeClr val="lt1"/>
-          </a:fontRef>
-        </p:style>
-        <p:txBody>
-          <a:bodyPr rtlCol="0" anchor="ctr"/>
-          <a:lstStyle/>
-          <a:p>
-            <a:pPr algn="ctr"/>
-            <a:endParaRPr lang="fr-FR" sz="4000">
-              <a:solidFill>
-                <a:schemeClr val="bg1"/>
-              </a:solidFill>
-            </a:endParaRPr>
-          </a:p>
-        </p:txBody>
-      </p:sp>
-      <p:sp>
-        <p:nvSpPr>
-          <p:cNvPr id="5" name="Rounded Rectangle 44">
-            <a:extLst>
-              <a:ext uri="{FF2B5EF4-FFF2-40B4-BE49-F238E27FC236}">
-                <a16:creationId xmlns:a16="http://schemas.microsoft.com/office/drawing/2014/main" id="{1CA3DB76-45FF-F2C4-05A6-2001F38BCAFA}"/>
-              </a:ext>
-            </a:extLst>
-          </p:cNvPr>
-          <p:cNvSpPr/>
-          <p:nvPr/>
-        </p:nvSpPr>
-        <p:spPr>
-          <a:xfrm>
-            <a:off x="6751655" y="5250742"/>
-            <a:ext cx="1103476" cy="344358"/>
-          </a:xfrm>
-          <a:prstGeom prst="roundRect">
-            <a:avLst/>
-          </a:prstGeom>
-          <a:solidFill>
-            <a:srgbClr val="7030A0"/>
-          </a:solidFill>
-          <a:ln>
-            <a:noFill/>
-          </a:ln>
-        </p:spPr>
-        <p:style>
-          <a:lnRef idx="2">
-            <a:schemeClr val="accent1">
-              <a:shade val="50000"/>
-            </a:schemeClr>
-          </a:lnRef>
-          <a:fillRef idx="1">
-            <a:schemeClr val="accent1"/>
-          </a:fillRef>
-          <a:effectRef idx="0">
-            <a:schemeClr val="accent1"/>
-          </a:effectRef>
-          <a:fontRef idx="minor">
-            <a:schemeClr val="lt1"/>
-          </a:fontRef>
-        </p:style>
-        <p:txBody>
-          <a:bodyPr rtlCol="0" anchor="ctr"/>
-          <a:lstStyle/>
-          <a:p>
-            <a:pPr algn="ctr"/>
-            <a:r>
-              <a:rPr lang="en-US" sz="1400" dirty="0">
-                <a:solidFill>
-                  <a:schemeClr val="bg1"/>
-                </a:solidFill>
-              </a:rPr>
-              <a:t>SlimFaas</a:t>
-            </a:r>
-          </a:p>
-        </p:txBody>
-      </p:sp>
-      <p:pic>
-        <p:nvPicPr>
-          <p:cNvPr id="6" name="Picture 2" descr="Afficher l’image source">
-            <a:extLst>
-              <a:ext uri="{FF2B5EF4-FFF2-40B4-BE49-F238E27FC236}">
-                <a16:creationId xmlns:a16="http://schemas.microsoft.com/office/drawing/2014/main" id="{86FC0B2B-0EA9-9828-9A73-E62E8C8C11FB}"/>
-              </a:ext>
-            </a:extLst>
-          </p:cNvPr>
-          <p:cNvPicPr>
-            <a:picLocks noChangeAspect="1" noChangeArrowheads="1"/>
-          </p:cNvPicPr>
-          <p:nvPr/>
-        </p:nvPicPr>
-        <p:blipFill>
-          <a:blip r:embed="rId2">
-            <a:extLst>
-              <a:ext uri="{28A0092B-C50C-407E-A947-70E740481C1C}">
-                <a14:useLocalDpi xmlns:a14="http://schemas.microsoft.com/office/drawing/2010/main" val="0"/>
-              </a:ext>
-            </a:extLst>
-          </a:blip>
-          <a:srcRect/>
-          <a:stretch>
-            <a:fillRect/>
-          </a:stretch>
-        </p:blipFill>
-        <p:spPr bwMode="auto">
-          <a:xfrm>
-            <a:off x="8837789" y="4620991"/>
-            <a:ext cx="421692" cy="410161"/>
-          </a:xfrm>
-          <a:prstGeom prst="rect">
-            <a:avLst/>
-          </a:prstGeom>
-          <a:noFill/>
-          <a:extLst>
-            <a:ext uri="{909E8E84-426E-40DD-AFC4-6F175D3DCCD1}">
-              <a14:hiddenFill xmlns:a14="http://schemas.microsoft.com/office/drawing/2010/main">
-                <a:solidFill>
-                  <a:srgbClr val="FFFFFF"/>
-                </a:solidFill>
-              </a14:hiddenFill>
-            </a:ext>
-          </a:extLst>
-        </p:spPr>
-      </p:pic>
-      <p:sp>
-        <p:nvSpPr>
-          <p:cNvPr id="7" name="Cylindre 6">
-            <a:extLst>
-              <a:ext uri="{FF2B5EF4-FFF2-40B4-BE49-F238E27FC236}">
-                <a16:creationId xmlns:a16="http://schemas.microsoft.com/office/drawing/2014/main" id="{9734965A-C108-A6DD-1AA6-E711131D6227}"/>
-              </a:ext>
-            </a:extLst>
-          </p:cNvPr>
-          <p:cNvSpPr/>
-          <p:nvPr/>
-        </p:nvSpPr>
-        <p:spPr>
-          <a:xfrm>
-            <a:off x="7953437" y="5111992"/>
-            <a:ext cx="884352" cy="621858"/>
+            <a:off x="7988617" y="1577639"/>
+            <a:ext cx="444247" cy="545343"/>
           </a:xfrm>
           <a:prstGeom prst="can">
             <a:avLst/>
@@ -9052,434 +8195,10 @@
           <a:p>
             <a:pPr algn="ctr"/>
             <a:r>
-              <a:rPr lang="fr-FR" sz="1400" dirty="0"/>
+              <a:rPr lang="fr-FR" sz="900" dirty="0"/>
               <a:t>SlimData</a:t>
             </a:r>
-            <a:endParaRPr lang="fr-FR" sz="1050" dirty="0"/>
-          </a:p>
-        </p:txBody>
-      </p:sp>
-      <p:sp>
-        <p:nvSpPr>
-          <p:cNvPr id="13" name="Rectangle : coins arrondis 12">
-            <a:extLst>
-              <a:ext uri="{FF2B5EF4-FFF2-40B4-BE49-F238E27FC236}">
-                <a16:creationId xmlns:a16="http://schemas.microsoft.com/office/drawing/2014/main" id="{286E557E-9D2D-E39E-7BAA-470B8AA24E84}"/>
-              </a:ext>
-            </a:extLst>
-          </p:cNvPr>
-          <p:cNvSpPr/>
-          <p:nvPr/>
-        </p:nvSpPr>
-        <p:spPr>
-          <a:xfrm>
-            <a:off x="9030787" y="2914738"/>
-            <a:ext cx="2621281" cy="1137502"/>
-          </a:xfrm>
-          <a:prstGeom prst="roundRect">
-            <a:avLst/>
-          </a:prstGeom>
-          <a:solidFill>
-            <a:schemeClr val="bg2">
-              <a:lumMod val="25000"/>
-            </a:schemeClr>
-          </a:solidFill>
-          <a:ln>
-            <a:noFill/>
-          </a:ln>
-        </p:spPr>
-        <p:style>
-          <a:lnRef idx="2">
-            <a:schemeClr val="accent1">
-              <a:shade val="50000"/>
-            </a:schemeClr>
-          </a:lnRef>
-          <a:fillRef idx="1">
-            <a:schemeClr val="accent1"/>
-          </a:fillRef>
-          <a:effectRef idx="0">
-            <a:schemeClr val="accent1"/>
-          </a:effectRef>
-          <a:fontRef idx="minor">
-            <a:schemeClr val="lt1"/>
-          </a:fontRef>
-        </p:style>
-        <p:txBody>
-          <a:bodyPr rtlCol="0" anchor="ctr"/>
-          <a:lstStyle/>
-          <a:p>
-            <a:pPr algn="ctr"/>
-            <a:endParaRPr lang="fr-FR" sz="4000">
-              <a:solidFill>
-                <a:schemeClr val="bg1"/>
-              </a:solidFill>
-            </a:endParaRPr>
-          </a:p>
-        </p:txBody>
-      </p:sp>
-      <p:sp>
-        <p:nvSpPr>
-          <p:cNvPr id="14" name="Rounded Rectangle 44">
-            <a:extLst>
-              <a:ext uri="{FF2B5EF4-FFF2-40B4-BE49-F238E27FC236}">
-                <a16:creationId xmlns:a16="http://schemas.microsoft.com/office/drawing/2014/main" id="{6E477DDA-1E6D-9A03-7191-54FABBE60642}"/>
-              </a:ext>
-            </a:extLst>
-          </p:cNvPr>
-          <p:cNvSpPr/>
-          <p:nvPr/>
-        </p:nvSpPr>
-        <p:spPr>
-          <a:xfrm>
-            <a:off x="9294558" y="3384474"/>
-            <a:ext cx="1103476" cy="344358"/>
-          </a:xfrm>
-          <a:prstGeom prst="roundRect">
-            <a:avLst/>
-          </a:prstGeom>
-          <a:solidFill>
-            <a:srgbClr val="7030A0"/>
-          </a:solidFill>
-          <a:ln>
-            <a:noFill/>
-          </a:ln>
-        </p:spPr>
-        <p:style>
-          <a:lnRef idx="2">
-            <a:schemeClr val="accent1">
-              <a:shade val="50000"/>
-            </a:schemeClr>
-          </a:lnRef>
-          <a:fillRef idx="1">
-            <a:schemeClr val="accent1"/>
-          </a:fillRef>
-          <a:effectRef idx="0">
-            <a:schemeClr val="accent1"/>
-          </a:effectRef>
-          <a:fontRef idx="minor">
-            <a:schemeClr val="lt1"/>
-          </a:fontRef>
-        </p:style>
-        <p:txBody>
-          <a:bodyPr rtlCol="0" anchor="ctr"/>
-          <a:lstStyle/>
-          <a:p>
-            <a:pPr algn="ctr"/>
-            <a:r>
-              <a:rPr lang="en-US" sz="1400" dirty="0">
-                <a:solidFill>
-                  <a:schemeClr val="bg1"/>
-                </a:solidFill>
-              </a:rPr>
-              <a:t>SlimFaas</a:t>
-            </a:r>
-          </a:p>
-        </p:txBody>
-      </p:sp>
-      <p:pic>
-        <p:nvPicPr>
-          <p:cNvPr id="15" name="Picture 2" descr="Afficher l’image source">
-            <a:extLst>
-              <a:ext uri="{FF2B5EF4-FFF2-40B4-BE49-F238E27FC236}">
-                <a16:creationId xmlns:a16="http://schemas.microsoft.com/office/drawing/2014/main" id="{88ED471D-D11B-63C5-CD2D-4DECE1E35849}"/>
-              </a:ext>
-            </a:extLst>
-          </p:cNvPr>
-          <p:cNvPicPr>
-            <a:picLocks noChangeAspect="1" noChangeArrowheads="1"/>
-          </p:cNvPicPr>
-          <p:nvPr/>
-        </p:nvPicPr>
-        <p:blipFill>
-          <a:blip r:embed="rId2">
-            <a:extLst>
-              <a:ext uri="{28A0092B-C50C-407E-A947-70E740481C1C}">
-                <a14:useLocalDpi xmlns:a14="http://schemas.microsoft.com/office/drawing/2010/main" val="0"/>
-              </a:ext>
-            </a:extLst>
-          </a:blip>
-          <a:srcRect/>
-          <a:stretch>
-            <a:fillRect/>
-          </a:stretch>
-        </p:blipFill>
-        <p:spPr bwMode="auto">
-          <a:xfrm>
-            <a:off x="11380692" y="2754723"/>
-            <a:ext cx="421692" cy="410161"/>
-          </a:xfrm>
-          <a:prstGeom prst="rect">
-            <a:avLst/>
-          </a:prstGeom>
-          <a:noFill/>
-          <a:extLst>
-            <a:ext uri="{909E8E84-426E-40DD-AFC4-6F175D3DCCD1}">
-              <a14:hiddenFill xmlns:a14="http://schemas.microsoft.com/office/drawing/2010/main">
-                <a:solidFill>
-                  <a:srgbClr val="FFFFFF"/>
-                </a:solidFill>
-              </a14:hiddenFill>
-            </a:ext>
-          </a:extLst>
-        </p:spPr>
-      </p:pic>
-      <p:sp>
-        <p:nvSpPr>
-          <p:cNvPr id="16" name="Cylindre 15">
-            <a:extLst>
-              <a:ext uri="{FF2B5EF4-FFF2-40B4-BE49-F238E27FC236}">
-                <a16:creationId xmlns:a16="http://schemas.microsoft.com/office/drawing/2014/main" id="{36C1722F-F481-386A-71BC-DA17893D6A1E}"/>
-              </a:ext>
-            </a:extLst>
-          </p:cNvPr>
-          <p:cNvSpPr/>
-          <p:nvPr/>
-        </p:nvSpPr>
-        <p:spPr>
-          <a:xfrm>
-            <a:off x="10496340" y="3245724"/>
-            <a:ext cx="884352" cy="621858"/>
-          </a:xfrm>
-          <a:prstGeom prst="can">
-            <a:avLst/>
-          </a:prstGeom>
-        </p:spPr>
-        <p:style>
-          <a:lnRef idx="0">
-            <a:schemeClr val="accent5"/>
-          </a:lnRef>
-          <a:fillRef idx="3">
-            <a:schemeClr val="accent5"/>
-          </a:fillRef>
-          <a:effectRef idx="3">
-            <a:schemeClr val="accent5"/>
-          </a:effectRef>
-          <a:fontRef idx="minor">
-            <a:schemeClr val="lt1"/>
-          </a:fontRef>
-        </p:style>
-        <p:txBody>
-          <a:bodyPr rtlCol="0" anchor="b"/>
-          <a:lstStyle/>
-          <a:p>
-            <a:pPr algn="ctr"/>
-            <a:r>
-              <a:rPr lang="fr-FR" sz="1400" dirty="0"/>
-              <a:t>SlimData</a:t>
-            </a:r>
-            <a:endParaRPr lang="fr-FR" sz="1050" dirty="0"/>
-          </a:p>
-        </p:txBody>
-      </p:sp>
-      <p:sp>
-        <p:nvSpPr>
-          <p:cNvPr id="17" name="Rectangle : coins arrondis 16">
-            <a:extLst>
-              <a:ext uri="{FF2B5EF4-FFF2-40B4-BE49-F238E27FC236}">
-                <a16:creationId xmlns:a16="http://schemas.microsoft.com/office/drawing/2014/main" id="{FA892C96-9746-CAD2-5A8F-2877A3233167}"/>
-              </a:ext>
-            </a:extLst>
-          </p:cNvPr>
-          <p:cNvSpPr/>
-          <p:nvPr/>
-        </p:nvSpPr>
-        <p:spPr>
-          <a:xfrm>
-            <a:off x="6337568" y="1231306"/>
-            <a:ext cx="2621281" cy="1137502"/>
-          </a:xfrm>
-          <a:prstGeom prst="roundRect">
-            <a:avLst/>
-          </a:prstGeom>
-          <a:solidFill>
-            <a:schemeClr val="bg2">
-              <a:lumMod val="25000"/>
-            </a:schemeClr>
-          </a:solidFill>
-          <a:ln>
-            <a:noFill/>
-          </a:ln>
-        </p:spPr>
-        <p:style>
-          <a:lnRef idx="2">
-            <a:schemeClr val="accent1">
-              <a:shade val="50000"/>
-            </a:schemeClr>
-          </a:lnRef>
-          <a:fillRef idx="1">
-            <a:schemeClr val="accent1"/>
-          </a:fillRef>
-          <a:effectRef idx="0">
-            <a:schemeClr val="accent1"/>
-          </a:effectRef>
-          <a:fontRef idx="minor">
-            <a:schemeClr val="lt1"/>
-          </a:fontRef>
-        </p:style>
-        <p:txBody>
-          <a:bodyPr rtlCol="0" anchor="ctr"/>
-          <a:lstStyle/>
-          <a:p>
-            <a:pPr algn="ctr"/>
-            <a:endParaRPr lang="fr-FR" sz="4000">
-              <a:solidFill>
-                <a:schemeClr val="bg1"/>
-              </a:solidFill>
-            </a:endParaRPr>
-          </a:p>
-        </p:txBody>
-      </p:sp>
-      <p:sp>
-        <p:nvSpPr>
-          <p:cNvPr id="18" name="Rounded Rectangle 44">
-            <a:extLst>
-              <a:ext uri="{FF2B5EF4-FFF2-40B4-BE49-F238E27FC236}">
-                <a16:creationId xmlns:a16="http://schemas.microsoft.com/office/drawing/2014/main" id="{2AD36C36-BFA5-B972-A126-EDA1BAD396E0}"/>
-              </a:ext>
-            </a:extLst>
-          </p:cNvPr>
-          <p:cNvSpPr/>
-          <p:nvPr/>
-        </p:nvSpPr>
-        <p:spPr>
-          <a:xfrm>
-            <a:off x="6601339" y="1701042"/>
-            <a:ext cx="1103476" cy="344358"/>
-          </a:xfrm>
-          <a:prstGeom prst="roundRect">
-            <a:avLst/>
-          </a:prstGeom>
-          <a:solidFill>
-            <a:srgbClr val="7030A0"/>
-          </a:solidFill>
-          <a:ln>
-            <a:noFill/>
-          </a:ln>
-        </p:spPr>
-        <p:style>
-          <a:lnRef idx="2">
-            <a:schemeClr val="accent1">
-              <a:shade val="50000"/>
-            </a:schemeClr>
-          </a:lnRef>
-          <a:fillRef idx="1">
-            <a:schemeClr val="accent1"/>
-          </a:fillRef>
-          <a:effectRef idx="0">
-            <a:schemeClr val="accent1"/>
-          </a:effectRef>
-          <a:fontRef idx="minor">
-            <a:schemeClr val="lt1"/>
-          </a:fontRef>
-        </p:style>
-        <p:txBody>
-          <a:bodyPr rtlCol="0" anchor="ctr"/>
-          <a:lstStyle/>
-          <a:p>
-            <a:pPr algn="ctr"/>
-            <a:r>
-              <a:rPr lang="en-US" sz="1400" dirty="0">
-                <a:solidFill>
-                  <a:schemeClr val="bg1"/>
-                </a:solidFill>
-              </a:rPr>
-              <a:t>SlimFaas</a:t>
-            </a:r>
-          </a:p>
-        </p:txBody>
-      </p:sp>
-      <p:pic>
-        <p:nvPicPr>
-          <p:cNvPr id="19" name="Picture 2" descr="Afficher l’image source">
-            <a:extLst>
-              <a:ext uri="{FF2B5EF4-FFF2-40B4-BE49-F238E27FC236}">
-                <a16:creationId xmlns:a16="http://schemas.microsoft.com/office/drawing/2014/main" id="{A69EEC02-815C-3D73-8D5E-E235B608C8FA}"/>
-              </a:ext>
-            </a:extLst>
-          </p:cNvPr>
-          <p:cNvPicPr>
-            <a:picLocks noChangeAspect="1" noChangeArrowheads="1"/>
-          </p:cNvPicPr>
-          <p:nvPr/>
-        </p:nvPicPr>
-        <p:blipFill>
-          <a:blip r:embed="rId2">
-            <a:extLst>
-              <a:ext uri="{28A0092B-C50C-407E-A947-70E740481C1C}">
-                <a14:useLocalDpi xmlns:a14="http://schemas.microsoft.com/office/drawing/2010/main" val="0"/>
-              </a:ext>
-            </a:extLst>
-          </a:blip>
-          <a:srcRect/>
-          <a:stretch>
-            <a:fillRect/>
-          </a:stretch>
-        </p:blipFill>
-        <p:spPr bwMode="auto">
-          <a:xfrm>
-            <a:off x="8687473" y="1071291"/>
-            <a:ext cx="421692" cy="410161"/>
-          </a:xfrm>
-          <a:prstGeom prst="rect">
-            <a:avLst/>
-          </a:prstGeom>
-          <a:noFill/>
-          <a:extLst>
-            <a:ext uri="{909E8E84-426E-40DD-AFC4-6F175D3DCCD1}">
-              <a14:hiddenFill xmlns:a14="http://schemas.microsoft.com/office/drawing/2010/main">
-                <a:solidFill>
-                  <a:srgbClr val="FFFFFF"/>
-                </a:solidFill>
-              </a14:hiddenFill>
-            </a:ext>
-          </a:extLst>
-        </p:spPr>
-      </p:pic>
-      <p:sp>
-        <p:nvSpPr>
-          <p:cNvPr id="20" name="Cylindre 19">
-            <a:extLst>
-              <a:ext uri="{FF2B5EF4-FFF2-40B4-BE49-F238E27FC236}">
-                <a16:creationId xmlns:a16="http://schemas.microsoft.com/office/drawing/2014/main" id="{9AA8AB1F-9667-FC25-A1EA-CE17557BDC77}"/>
-              </a:ext>
-            </a:extLst>
-          </p:cNvPr>
-          <p:cNvSpPr/>
-          <p:nvPr/>
-        </p:nvSpPr>
-        <p:spPr>
-          <a:xfrm>
-            <a:off x="7803121" y="1562292"/>
-            <a:ext cx="884352" cy="621858"/>
-          </a:xfrm>
-          <a:prstGeom prst="can">
-            <a:avLst/>
-          </a:prstGeom>
-        </p:spPr>
-        <p:style>
-          <a:lnRef idx="0">
-            <a:schemeClr val="accent5"/>
-          </a:lnRef>
-          <a:fillRef idx="3">
-            <a:schemeClr val="accent5"/>
-          </a:fillRef>
-          <a:effectRef idx="3">
-            <a:schemeClr val="accent5"/>
-          </a:effectRef>
-          <a:fontRef idx="minor">
-            <a:schemeClr val="lt1"/>
-          </a:fontRef>
-        </p:style>
-        <p:txBody>
-          <a:bodyPr rtlCol="0" anchor="b"/>
-          <a:lstStyle/>
-          <a:p>
-            <a:pPr algn="ctr"/>
-            <a:r>
-              <a:rPr lang="fr-FR" sz="1400" dirty="0"/>
-              <a:t>SlimData</a:t>
-            </a:r>
-            <a:endParaRPr lang="fr-FR" sz="1050" dirty="0"/>
+            <a:endParaRPr lang="fr-FR" sz="600" dirty="0"/>
           </a:p>
         </p:txBody>
       </p:sp>
@@ -9876,7 +8595,7 @@
         <p:spPr>
           <a:xfrm>
             <a:off x="165249" y="3204084"/>
-            <a:ext cx="4223206" cy="1323439"/>
+            <a:ext cx="4566166" cy="923330"/>
           </a:xfrm>
           <a:prstGeom prst="rect">
             <a:avLst/>
@@ -9890,44 +8609,44 @@
           <a:lstStyle/>
           <a:p>
             <a:r>
-              <a:rPr lang="fr-FR" sz="2000" dirty="0"/>
+              <a:rPr lang="fr-FR" dirty="0"/>
               <a:t>HTTP POST</a:t>
             </a:r>
           </a:p>
           <a:p>
             <a:r>
-              <a:rPr lang="fr-FR" sz="2000" dirty="0">
+              <a:rPr lang="fr-FR" dirty="0">
                 <a:hlinkClick r:id="rId3"/>
               </a:rPr>
-              <a:t>http://slimfaas/async-function/fibonacci/hello/guillaume</a:t>
-            </a:r>
-            <a:endParaRPr lang="fr-FR" sz="2000" dirty="0"/>
-          </a:p>
-          <a:p>
-            <a:r>
-              <a:rPr lang="fr-FR" sz="2000" dirty="0"/>
+              <a:t>http://slimfaas/function/fibonacci/compute</a:t>
+            </a:r>
+            <a:br>
+              <a:rPr lang="fr-FR" dirty="0"/>
+            </a:br>
+            <a:r>
+              <a:rPr lang="fr-FR" dirty="0"/>
               <a:t>{</a:t>
             </a:r>
             <a:r>
-              <a:rPr lang="fr-FR" sz="2000" b="0" i="0" dirty="0">
+              <a:rPr lang="fr-FR" b="0" i="0" dirty="0">
                 <a:effectLst/>
                 <a:latin typeface="-apple-system"/>
               </a:rPr>
               <a:t>"</a:t>
             </a:r>
             <a:r>
-              <a:rPr lang="fr-FR" sz="2000" dirty="0"/>
+              <a:rPr lang="fr-FR" dirty="0"/>
               <a:t>input</a:t>
             </a:r>
             <a:r>
-              <a:rPr lang="fr-FR" sz="2000" b="0" i="0" dirty="0">
+              <a:rPr lang="fr-FR" b="0" i="0" dirty="0">
                 <a:effectLst/>
                 <a:latin typeface="-apple-system"/>
               </a:rPr>
               <a:t>"</a:t>
             </a:r>
             <a:r>
-              <a:rPr lang="fr-FR" sz="2000" dirty="0"/>
+              <a:rPr lang="fr-FR" dirty="0"/>
               <a:t>:42}</a:t>
             </a:r>
           </a:p>
@@ -9951,8 +8670,8 @@
         </p:nvCxnSpPr>
         <p:spPr>
           <a:xfrm>
-            <a:off x="4388455" y="3865804"/>
-            <a:ext cx="2343550" cy="879029"/>
+            <a:off x="4731415" y="3665749"/>
+            <a:ext cx="2000590" cy="1079084"/>
           </a:xfrm>
           <a:prstGeom prst="straightConnector1">
             <a:avLst/>
@@ -10053,7 +8772,7 @@
         </p:nvSpPr>
         <p:spPr>
           <a:xfrm>
-            <a:off x="6673963" y="2307595"/>
+            <a:off x="6767414" y="2287570"/>
             <a:ext cx="150316" cy="162476"/>
           </a:xfrm>
           <a:prstGeom prst="ellipse">
@@ -10171,7 +8890,7 @@
         </p:nvSpPr>
         <p:spPr bwMode="auto">
           <a:xfrm>
-            <a:off x="5151898" y="3686005"/>
+            <a:off x="5386735" y="3645793"/>
             <a:ext cx="1784118" cy="369332"/>
           </a:xfrm>
           <a:prstGeom prst="rect">
@@ -10243,6 +8962,216 @@
               <a:effectLst/>
               <a:latin typeface="Arial" panose="020B0604020202020204" pitchFamily="34" charset="0"/>
             </a:endParaRPr>
+          </a:p>
+        </p:txBody>
+      </p:sp>
+      <p:sp>
+        <p:nvSpPr>
+          <p:cNvPr id="2" name="Rounded Rectangle 44">
+            <a:extLst>
+              <a:ext uri="{FF2B5EF4-FFF2-40B4-BE49-F238E27FC236}">
+                <a16:creationId xmlns:a16="http://schemas.microsoft.com/office/drawing/2014/main" id="{EB6F871C-647F-F69F-6CFD-258B44007885}"/>
+              </a:ext>
+            </a:extLst>
+          </p:cNvPr>
+          <p:cNvSpPr/>
+          <p:nvPr/>
+        </p:nvSpPr>
+        <p:spPr>
+          <a:xfrm>
+            <a:off x="9457623" y="3105876"/>
+            <a:ext cx="1824665" cy="820493"/>
+          </a:xfrm>
+          <a:prstGeom prst="roundRect">
+            <a:avLst/>
+          </a:prstGeom>
+          <a:noFill/>
+          <a:ln>
+            <a:noFill/>
+          </a:ln>
+        </p:spPr>
+        <p:style>
+          <a:lnRef idx="2">
+            <a:schemeClr val="accent1">
+              <a:shade val="50000"/>
+            </a:schemeClr>
+          </a:lnRef>
+          <a:fillRef idx="1">
+            <a:schemeClr val="accent1"/>
+          </a:fillRef>
+          <a:effectRef idx="0">
+            <a:schemeClr val="accent1"/>
+          </a:effectRef>
+          <a:fontRef idx="minor">
+            <a:schemeClr val="lt1"/>
+          </a:fontRef>
+        </p:style>
+        <p:txBody>
+          <a:bodyPr rtlCol="0" anchor="ctr"/>
+          <a:lstStyle/>
+          <a:p>
+            <a:pPr algn="ctr"/>
+            <a:r>
+              <a:rPr lang="en-US" sz="1400" dirty="0">
+                <a:solidFill>
+                  <a:schemeClr val="bg1"/>
+                </a:solidFill>
+              </a:rPr>
+              <a:t>SlimFaas</a:t>
+            </a:r>
+          </a:p>
+        </p:txBody>
+      </p:sp>
+      <p:sp>
+        <p:nvSpPr>
+          <p:cNvPr id="8" name="Cylindre 7">
+            <a:extLst>
+              <a:ext uri="{FF2B5EF4-FFF2-40B4-BE49-F238E27FC236}">
+                <a16:creationId xmlns:a16="http://schemas.microsoft.com/office/drawing/2014/main" id="{B1813FE3-8FB8-536C-87B7-BC11FD12A7C5}"/>
+              </a:ext>
+            </a:extLst>
+          </p:cNvPr>
+          <p:cNvSpPr/>
+          <p:nvPr/>
+        </p:nvSpPr>
+        <p:spPr>
+          <a:xfrm>
+            <a:off x="10772121" y="3341808"/>
+            <a:ext cx="444247" cy="545343"/>
+          </a:xfrm>
+          <a:prstGeom prst="can">
+            <a:avLst/>
+          </a:prstGeom>
+        </p:spPr>
+        <p:style>
+          <a:lnRef idx="0">
+            <a:schemeClr val="accent5"/>
+          </a:lnRef>
+          <a:fillRef idx="3">
+            <a:schemeClr val="accent5"/>
+          </a:fillRef>
+          <a:effectRef idx="3">
+            <a:schemeClr val="accent5"/>
+          </a:effectRef>
+          <a:fontRef idx="minor">
+            <a:schemeClr val="lt1"/>
+          </a:fontRef>
+        </p:style>
+        <p:txBody>
+          <a:bodyPr rtlCol="0" anchor="b"/>
+          <a:lstStyle/>
+          <a:p>
+            <a:pPr algn="ctr"/>
+            <a:r>
+              <a:rPr lang="fr-FR" sz="900" dirty="0"/>
+              <a:t>SlimData</a:t>
+            </a:r>
+            <a:endParaRPr lang="fr-FR" sz="600" dirty="0"/>
+          </a:p>
+        </p:txBody>
+      </p:sp>
+      <p:sp>
+        <p:nvSpPr>
+          <p:cNvPr id="9" name="Rounded Rectangle 44">
+            <a:extLst>
+              <a:ext uri="{FF2B5EF4-FFF2-40B4-BE49-F238E27FC236}">
+                <a16:creationId xmlns:a16="http://schemas.microsoft.com/office/drawing/2014/main" id="{94DCC847-92CB-463E-B9AF-4D70DC6D3222}"/>
+              </a:ext>
+            </a:extLst>
+          </p:cNvPr>
+          <p:cNvSpPr/>
+          <p:nvPr/>
+        </p:nvSpPr>
+        <p:spPr>
+          <a:xfrm>
+            <a:off x="6871794" y="4927635"/>
+            <a:ext cx="1901773" cy="853887"/>
+          </a:xfrm>
+          <a:prstGeom prst="roundRect">
+            <a:avLst/>
+          </a:prstGeom>
+          <a:noFill/>
+          <a:ln>
+            <a:noFill/>
+          </a:ln>
+        </p:spPr>
+        <p:style>
+          <a:lnRef idx="2">
+            <a:schemeClr val="accent1">
+              <a:shade val="50000"/>
+            </a:schemeClr>
+          </a:lnRef>
+          <a:fillRef idx="1">
+            <a:schemeClr val="accent1"/>
+          </a:fillRef>
+          <a:effectRef idx="0">
+            <a:schemeClr val="accent1"/>
+          </a:effectRef>
+          <a:fontRef idx="minor">
+            <a:schemeClr val="lt1"/>
+          </a:fontRef>
+        </p:style>
+        <p:txBody>
+          <a:bodyPr rtlCol="0" anchor="ctr"/>
+          <a:lstStyle/>
+          <a:p>
+            <a:pPr algn="ctr"/>
+            <a:r>
+              <a:rPr lang="en-US" sz="1400" dirty="0">
+                <a:solidFill>
+                  <a:schemeClr val="bg1"/>
+                </a:solidFill>
+              </a:rPr>
+              <a:t>SlimFaas</a:t>
+            </a:r>
+          </a:p>
+        </p:txBody>
+      </p:sp>
+      <p:sp>
+        <p:nvSpPr>
+          <p:cNvPr id="10" name="Cylindre 9">
+            <a:extLst>
+              <a:ext uri="{FF2B5EF4-FFF2-40B4-BE49-F238E27FC236}">
+                <a16:creationId xmlns:a16="http://schemas.microsoft.com/office/drawing/2014/main" id="{98F476E5-BF1A-D89D-9F69-BB3437C7EBE6}"/>
+              </a:ext>
+            </a:extLst>
+          </p:cNvPr>
+          <p:cNvSpPr/>
+          <p:nvPr/>
+        </p:nvSpPr>
+        <p:spPr>
+          <a:xfrm>
+            <a:off x="8228646" y="5158522"/>
+            <a:ext cx="444247" cy="545343"/>
+          </a:xfrm>
+          <a:prstGeom prst="can">
+            <a:avLst/>
+          </a:prstGeom>
+        </p:spPr>
+        <p:style>
+          <a:lnRef idx="0">
+            <a:schemeClr val="accent5"/>
+          </a:lnRef>
+          <a:fillRef idx="3">
+            <a:schemeClr val="accent5"/>
+          </a:fillRef>
+          <a:effectRef idx="3">
+            <a:schemeClr val="accent5"/>
+          </a:effectRef>
+          <a:fontRef idx="minor">
+            <a:schemeClr val="lt1"/>
+          </a:fontRef>
+        </p:style>
+        <p:txBody>
+          <a:bodyPr rtlCol="0" anchor="b"/>
+          <a:lstStyle/>
+          <a:p>
+            <a:pPr algn="ctr"/>
+            <a:r>
+              <a:rPr lang="fr-FR" sz="900" dirty="0"/>
+              <a:t>SlimData</a:t>
+            </a:r>
+            <a:endParaRPr lang="fr-FR" sz="600" dirty="0"/>
           </a:p>
         </p:txBody>
       </p:sp>

</xml_diff>

<commit_message>
feat(SlimFaas): More plug and play (release) (#102)
- Feature: Simplification of SlimFaas configuration. No need to configure any environment variables (namespace, internal pod URL, etc.).
   - SlimFaas can directly use IPs by default, or as before, go through your svc service.
    - In direct IP mode, SlimFaas handles call distribution among replicas.
- Fix: A major bug blocked messages whenever a pod had 2 replicas.
- Feature: Automatic deletion of successful jobs while keeping failed jobs visible for the duration specified in the configuration.
- Fix: All JSON-type configurations now work correctly in “prettifier” mode.
- Feature: Added a benchmark project with NBomber.
</commit_message>
<xml_diff>
--- a/documentation/slimfaas.pptx
+++ b/documentation/slimfaas.pptx
@@ -5,17 +5,16 @@
     <p:sldMasterId id="2147483648" r:id="rId4"/>
   </p:sldMasterIdLst>
   <p:notesMasterIdLst>
-    <p:notesMasterId r:id="rId10"/>
+    <p:notesMasterId r:id="rId9"/>
   </p:notesMasterIdLst>
   <p:handoutMasterIdLst>
-    <p:handoutMasterId r:id="rId11"/>
+    <p:handoutMasterId r:id="rId10"/>
   </p:handoutMasterIdLst>
   <p:sldIdLst>
     <p:sldId id="892" r:id="rId5"/>
     <p:sldId id="891" r:id="rId6"/>
     <p:sldId id="893" r:id="rId7"/>
-    <p:sldId id="894" r:id="rId8"/>
-    <p:sldId id="898" r:id="rId9"/>
+    <p:sldId id="898" r:id="rId8"/>
   </p:sldIdLst>
   <p:sldSz cx="12192000" cy="6858000"/>
   <p:notesSz cx="6858000" cy="9144000"/>
@@ -122,7 +121,6 @@
             <p14:sldId id="892"/>
             <p14:sldId id="891"/>
             <p14:sldId id="893"/>
-            <p14:sldId id="894"/>
             <p14:sldId id="898"/>
           </p14:sldIdLst>
         </p14:section>
@@ -240,7 +238,7 @@
           <a:p>
             <a:fld id="{F60FFC85-34C0-4167-8801-71D65E4D986C}" type="datetimeFigureOut">
               <a:rPr lang="fr-FR" smtClean="0"/>
-              <a:t>08/10/2024</a:t>
+              <a:t>18/03/2025</a:t>
             </a:fld>
             <a:endParaRPr lang="fr-FR"/>
           </a:p>
@@ -417,7 +415,7 @@
           <a:p>
             <a:fld id="{F2EE8696-3B2B-7D49-B212-A8F746F3A84B}" type="datetimeFigureOut">
               <a:rPr lang="es-ES_tradnl" smtClean="0"/>
-              <a:t>08/10/2024</a:t>
+              <a:t>18/03/2025</a:t>
             </a:fld>
             <a:endParaRPr lang="es-ES_tradnl"/>
           </a:p>
@@ -1114,7 +1112,7 @@
           <a:p>
             <a:fld id="{80160E5B-2E24-B941-8DE0-C0A90C36B7C5}" type="datetimeFigureOut">
               <a:rPr lang="en-GB" smtClean="0"/>
-              <a:t>08/10/2024</a:t>
+              <a:t>18/03/2025</a:t>
             </a:fld>
             <a:endParaRPr lang="en-GB"/>
           </a:p>
@@ -1312,7 +1310,7 @@
           <a:p>
             <a:fld id="{80160E5B-2E24-B941-8DE0-C0A90C36B7C5}" type="datetimeFigureOut">
               <a:rPr lang="en-GB" smtClean="0"/>
-              <a:t>08/10/2024</a:t>
+              <a:t>18/03/2025</a:t>
             </a:fld>
             <a:endParaRPr lang="en-GB"/>
           </a:p>
@@ -1559,7 +1557,7 @@
           <a:p>
             <a:fld id="{80160E5B-2E24-B941-8DE0-C0A90C36B7C5}" type="datetimeFigureOut">
               <a:rPr lang="en-GB" smtClean="0"/>
-              <a:t>08/10/2024</a:t>
+              <a:t>18/03/2025</a:t>
             </a:fld>
             <a:endParaRPr lang="en-GB"/>
           </a:p>
@@ -1778,7 +1776,7 @@
           <a:p>
             <a:fld id="{80160E5B-2E24-B941-8DE0-C0A90C36B7C5}" type="datetimeFigureOut">
               <a:rPr lang="en-GB" smtClean="0"/>
-              <a:t>08/10/2024</a:t>
+              <a:t>18/03/2025</a:t>
             </a:fld>
             <a:endParaRPr lang="en-GB"/>
           </a:p>
@@ -2053,7 +2051,7 @@
           <a:p>
             <a:fld id="{80160E5B-2E24-B941-8DE0-C0A90C36B7C5}" type="datetimeFigureOut">
               <a:rPr lang="en-GB" smtClean="0"/>
-              <a:t>08/10/2024</a:t>
+              <a:t>18/03/2025</a:t>
             </a:fld>
             <a:endParaRPr lang="en-GB"/>
           </a:p>
@@ -2357,7 +2355,7 @@
           <a:p>
             <a:fld id="{80160E5B-2E24-B941-8DE0-C0A90C36B7C5}" type="datetimeFigureOut">
               <a:rPr lang="en-GB" smtClean="0"/>
-              <a:t>08/10/2024</a:t>
+              <a:t>18/03/2025</a:t>
             </a:fld>
             <a:endParaRPr lang="en-GB"/>
           </a:p>
@@ -2808,7 +2806,7 @@
           <a:p>
             <a:fld id="{80160E5B-2E24-B941-8DE0-C0A90C36B7C5}" type="datetimeFigureOut">
               <a:rPr lang="en-GB" smtClean="0"/>
-              <a:t>08/10/2024</a:t>
+              <a:t>18/03/2025</a:t>
             </a:fld>
             <a:endParaRPr lang="en-GB"/>
           </a:p>
@@ -2988,7 +2986,7 @@
           <a:p>
             <a:fld id="{80160E5B-2E24-B941-8DE0-C0A90C36B7C5}" type="datetimeFigureOut">
               <a:rPr lang="en-GB" smtClean="0"/>
-              <a:t>08/10/2024</a:t>
+              <a:t>18/03/2025</a:t>
             </a:fld>
             <a:endParaRPr lang="en-GB"/>
           </a:p>
@@ -3140,7 +3138,7 @@
           <a:p>
             <a:fld id="{80160E5B-2E24-B941-8DE0-C0A90C36B7C5}" type="datetimeFigureOut">
               <a:rPr lang="en-GB" smtClean="0"/>
-              <a:t>08/10/2024</a:t>
+              <a:t>18/03/2025</a:t>
             </a:fld>
             <a:endParaRPr lang="en-GB"/>
           </a:p>
@@ -3490,7 +3488,7 @@
           <a:p>
             <a:fld id="{80160E5B-2E24-B941-8DE0-C0A90C36B7C5}" type="datetimeFigureOut">
               <a:rPr lang="en-GB" smtClean="0"/>
-              <a:t>08/10/2024</a:t>
+              <a:t>18/03/2025</a:t>
             </a:fld>
             <a:endParaRPr lang="en-GB"/>
           </a:p>
@@ -3817,7 +3815,7 @@
           <a:p>
             <a:fld id="{80160E5B-2E24-B941-8DE0-C0A90C36B7C5}" type="datetimeFigureOut">
               <a:rPr lang="en-GB" smtClean="0"/>
-              <a:t>08/10/2024</a:t>
+              <a:t>18/03/2025</a:t>
             </a:fld>
             <a:endParaRPr lang="en-GB"/>
           </a:p>
@@ -4097,7 +4095,7 @@
           <a:p>
             <a:fld id="{80160E5B-2E24-B941-8DE0-C0A90C36B7C5}" type="datetimeFigureOut">
               <a:rPr lang="en-GB" smtClean="0"/>
-              <a:t>08/10/2024</a:t>
+              <a:t>18/03/2025</a:t>
             </a:fld>
             <a:endParaRPr lang="en-GB"/>
           </a:p>
@@ -4624,8 +4622,8 @@
         </p:nvSpPr>
         <p:spPr>
           <a:xfrm>
-            <a:off x="3926528" y="2223970"/>
-            <a:ext cx="3341145" cy="3514653"/>
+            <a:off x="4065424" y="2860803"/>
+            <a:ext cx="3341145" cy="2190158"/>
           </a:xfrm>
           <a:prstGeom prst="roundRect">
             <a:avLst/>
@@ -4697,7 +4695,7 @@
         </p:blipFill>
         <p:spPr bwMode="auto">
           <a:xfrm>
-            <a:off x="6738009" y="1908836"/>
+            <a:off x="6910852" y="2659498"/>
             <a:ext cx="588793" cy="572693"/>
           </a:xfrm>
           <a:prstGeom prst="rect">
@@ -4781,15 +4779,13 @@
         </p:nvSpPr>
         <p:spPr>
           <a:xfrm>
-            <a:off x="4679484" y="2886177"/>
-            <a:ext cx="1858037" cy="923330"/>
+            <a:off x="4363700" y="3139866"/>
+            <a:ext cx="2807601" cy="1640183"/>
           </a:xfrm>
           <a:prstGeom prst="roundRect">
             <a:avLst/>
           </a:prstGeom>
-          <a:solidFill>
-            <a:srgbClr val="7030A0"/>
-          </a:solidFill>
+          <a:noFill/>
           <a:ln>
             <a:noFill/>
           </a:ln>
@@ -4837,15 +4833,15 @@
           </p:cNvPr>
           <p:cNvCxnSpPr>
             <a:cxnSpLocks/>
-            <a:stCxn id="2" idx="2"/>
+            <a:stCxn id="2" idx="3"/>
             <a:endCxn id="5" idx="1"/>
           </p:cNvCxnSpPr>
           <p:nvPr/>
         </p:nvCxnSpPr>
         <p:spPr>
-          <a:xfrm>
-            <a:off x="3635557" y="1606148"/>
-            <a:ext cx="1043927" cy="1741694"/>
+          <a:xfrm flipV="1">
+            <a:off x="3675101" y="3959958"/>
+            <a:ext cx="688599" cy="2904"/>
           </a:xfrm>
           <a:prstGeom prst="straightConnector1">
             <a:avLst/>
@@ -4888,8 +4884,8 @@
         </p:nvSpPr>
         <p:spPr>
           <a:xfrm>
-            <a:off x="8653554" y="3756681"/>
-            <a:ext cx="3145551" cy="2247742"/>
+            <a:off x="9597964" y="2860802"/>
+            <a:ext cx="2467886" cy="2190158"/>
           </a:xfrm>
           <a:prstGeom prst="roundRect">
             <a:avLst/>
@@ -4925,14 +4921,14 @@
           <a:p>
             <a:pPr algn="ctr"/>
             <a:r>
-              <a:rPr lang="fr-FR" sz="4000" dirty="0">
+              <a:rPr lang="fr-FR" sz="2800" dirty="0">
                 <a:solidFill>
                   <a:schemeClr val="bg1"/>
                 </a:solidFill>
               </a:rPr>
               <a:t>function « fibonacci »</a:t>
             </a:r>
-            <a:endParaRPr lang="en-FR" sz="4000" dirty="0">
+            <a:endParaRPr lang="en-FR" sz="2800" dirty="0">
               <a:solidFill>
                 <a:schemeClr val="bg1"/>
               </a:solidFill>
@@ -4969,7 +4965,7 @@
         </p:blipFill>
         <p:spPr bwMode="auto">
           <a:xfrm>
-            <a:off x="11210312" y="3441547"/>
+            <a:off x="11603207" y="2673279"/>
             <a:ext cx="588793" cy="572693"/>
           </a:xfrm>
           <a:prstGeom prst="rect">
@@ -5004,9 +5000,9 @@
           <p:nvPr/>
         </p:nvCxnSpPr>
         <p:spPr>
-          <a:xfrm>
-            <a:off x="6537521" y="3347842"/>
-            <a:ext cx="2116033" cy="1532710"/>
+          <a:xfrm flipV="1">
+            <a:off x="7171301" y="3955881"/>
+            <a:ext cx="2426663" cy="4077"/>
           </a:xfrm>
           <a:prstGeom prst="straightConnector1">
             <a:avLst/>
@@ -5049,8 +5045,8 @@
         </p:nvSpPr>
         <p:spPr>
           <a:xfrm>
-            <a:off x="5004417" y="4325969"/>
-            <a:ext cx="1208169" cy="1258899"/>
+            <a:off x="6539696" y="4007671"/>
+            <a:ext cx="538223" cy="649047"/>
           </a:xfrm>
           <a:prstGeom prst="can">
             <a:avLst/>
@@ -5076,59 +5072,13 @@
           <a:p>
             <a:pPr algn="ctr"/>
             <a:r>
-              <a:rPr lang="fr-FR" sz="2000" dirty="0"/>
+              <a:rPr lang="fr-FR" sz="1200" dirty="0"/>
               <a:t>SlimData</a:t>
             </a:r>
-            <a:endParaRPr lang="fr-FR" sz="1400" dirty="0"/>
-          </a:p>
-        </p:txBody>
-      </p:sp>
-      <p:cxnSp>
-        <p:nvCxnSpPr>
-          <p:cNvPr id="1034" name="Connecteur droit avec flèche 1033">
-            <a:extLst>
-              <a:ext uri="{FF2B5EF4-FFF2-40B4-BE49-F238E27FC236}">
-                <a16:creationId xmlns:a16="http://schemas.microsoft.com/office/drawing/2014/main" id="{C97FA525-2FE2-BE58-B3CE-7494FA2825DA}"/>
-              </a:ext>
-            </a:extLst>
-          </p:cNvPr>
-          <p:cNvCxnSpPr>
-            <a:cxnSpLocks/>
-            <a:stCxn id="5" idx="2"/>
-            <a:endCxn id="20" idx="1"/>
-          </p:cNvCxnSpPr>
-          <p:nvPr/>
-        </p:nvCxnSpPr>
-        <p:spPr>
-          <a:xfrm flipH="1">
-            <a:off x="5608502" y="3809507"/>
-            <a:ext cx="1" cy="516462"/>
-          </a:xfrm>
-          <a:prstGeom prst="straightConnector1">
-            <a:avLst/>
-          </a:prstGeom>
-          <a:ln w="127000">
-            <a:solidFill>
-              <a:srgbClr val="0070C0"/>
-            </a:solidFill>
-            <a:tailEnd type="triangle"/>
-          </a:ln>
-        </p:spPr>
-        <p:style>
-          <a:lnRef idx="1">
-            <a:schemeClr val="accent1"/>
-          </a:lnRef>
-          <a:fillRef idx="0">
-            <a:schemeClr val="accent1"/>
-          </a:fillRef>
-          <a:effectRef idx="0">
-            <a:schemeClr val="accent1"/>
-          </a:effectRef>
-          <a:fontRef idx="minor">
-            <a:schemeClr val="tx1"/>
-          </a:fontRef>
-        </p:style>
-      </p:cxnSp>
+            <a:endParaRPr lang="fr-FR" sz="1000" dirty="0"/>
+          </a:p>
+        </p:txBody>
+      </p:sp>
       <p:sp>
         <p:nvSpPr>
           <p:cNvPr id="2" name="ZoneTexte 1">
@@ -5143,8 +5093,8 @@
         </p:nvSpPr>
         <p:spPr>
           <a:xfrm>
-            <a:off x="95250" y="405819"/>
-            <a:ext cx="7080613" cy="1200329"/>
+            <a:off x="95250" y="3593530"/>
+            <a:ext cx="3579851" cy="738664"/>
           </a:xfrm>
           <a:prstGeom prst="rect">
             <a:avLst/>
@@ -5158,19 +5108,19 @@
           <a:lstStyle/>
           <a:p>
             <a:r>
-              <a:rPr lang="fr-FR" sz="2400" dirty="0"/>
+              <a:rPr lang="fr-FR" sz="1400" dirty="0"/>
               <a:t>HTTP POST</a:t>
             </a:r>
           </a:p>
           <a:p>
             <a:r>
-              <a:rPr lang="fr-FR" sz="2400" dirty="0">
+              <a:rPr lang="fr-FR" sz="1400" dirty="0">
                 <a:hlinkClick r:id="rId4"/>
               </a:rPr>
               <a:t>http://slimfaas/</a:t>
             </a:r>
             <a:r>
-              <a:rPr lang="fr-FR" sz="2400" dirty="0">
+              <a:rPr lang="fr-FR" sz="1400" dirty="0">
                 <a:highlight>
                   <a:srgbClr val="FFFF00"/>
                 </a:highlight>
@@ -5179,13 +5129,13 @@
               <a:t>function</a:t>
             </a:r>
             <a:r>
-              <a:rPr lang="fr-FR" sz="2400" dirty="0">
+              <a:rPr lang="fr-FR" sz="1400" dirty="0">
                 <a:hlinkClick r:id="rId4"/>
               </a:rPr>
               <a:t>/</a:t>
             </a:r>
             <a:r>
-              <a:rPr lang="fr-FR" sz="2400" dirty="0">
+              <a:rPr lang="fr-FR" sz="1400" dirty="0">
                 <a:highlight>
                   <a:srgbClr val="00FF00"/>
                 </a:highlight>
@@ -5194,51 +5144,38 @@
               <a:t>fibonacci</a:t>
             </a:r>
             <a:r>
-              <a:rPr lang="fr-FR" sz="2400" dirty="0">
+              <a:rPr lang="fr-FR" sz="1400" dirty="0">
                 <a:hlinkClick r:id="rId4"/>
               </a:rPr>
-              <a:t>/</a:t>
-            </a:r>
-            <a:r>
-              <a:rPr lang="fr-FR" sz="2400" dirty="0">
-                <a:highlight>
-                  <a:srgbClr val="FF6C45"/>
-                </a:highlight>
-                <a:hlinkClick r:id="rId4"/>
-              </a:rPr>
-              <a:t>hello/guillaume</a:t>
-            </a:r>
-            <a:endParaRPr lang="fr-FR" sz="2400" dirty="0">
-              <a:highlight>
-                <a:srgbClr val="FF6C45"/>
-              </a:highlight>
-            </a:endParaRPr>
-          </a:p>
-          <a:p>
-            <a:r>
-              <a:rPr lang="fr-FR" sz="2400" dirty="0"/>
+              <a:t>/compute</a:t>
+            </a:r>
+            <a:endParaRPr lang="fr-FR" sz="1400" dirty="0"/>
+          </a:p>
+          <a:p>
+            <a:r>
+              <a:rPr lang="fr-FR" sz="1400" dirty="0"/>
               <a:t>{</a:t>
             </a:r>
             <a:r>
-              <a:rPr lang="fr-FR" sz="2400" b="0" i="0" dirty="0">
+              <a:rPr lang="fr-FR" sz="1400" b="0" i="0" dirty="0">
                 <a:effectLst/>
                 <a:latin typeface="-apple-system"/>
               </a:rPr>
               <a:t>"</a:t>
             </a:r>
             <a:r>
-              <a:rPr lang="fr-FR" sz="2400" dirty="0"/>
+              <a:rPr lang="fr-FR" sz="1400" dirty="0"/>
               <a:t>input</a:t>
             </a:r>
             <a:r>
-              <a:rPr lang="fr-FR" sz="2400" b="0" i="0" dirty="0">
+              <a:rPr lang="fr-FR" sz="1400" b="0" i="0" dirty="0">
                 <a:effectLst/>
                 <a:latin typeface="-apple-system"/>
               </a:rPr>
               <a:t>"</a:t>
             </a:r>
             <a:r>
-              <a:rPr lang="fr-FR" sz="2400" dirty="0"/>
+              <a:rPr lang="fr-FR" sz="1400" dirty="0"/>
               <a:t>:42}</a:t>
             </a:r>
           </a:p>
@@ -5258,8 +5195,8 @@
         </p:nvSpPr>
         <p:spPr>
           <a:xfrm>
-            <a:off x="7558644" y="2137261"/>
-            <a:ext cx="4438754" cy="1200329"/>
+            <a:off x="7465698" y="4176273"/>
+            <a:ext cx="2207393" cy="738664"/>
           </a:xfrm>
           <a:prstGeom prst="rect">
             <a:avLst/>
@@ -5273,19 +5210,19 @@
           <a:lstStyle/>
           <a:p>
             <a:r>
-              <a:rPr lang="fr-FR" sz="2400" dirty="0"/>
+              <a:rPr lang="fr-FR" sz="1400" dirty="0"/>
               <a:t>HTTP POST</a:t>
             </a:r>
           </a:p>
           <a:p>
             <a:r>
-              <a:rPr lang="fr-FR" sz="2400" dirty="0">
+              <a:rPr lang="fr-FR" sz="1400" dirty="0">
                 <a:hlinkClick r:id="rId5"/>
               </a:rPr>
               <a:t>http://</a:t>
             </a:r>
             <a:r>
-              <a:rPr lang="fr-FR" sz="2400" dirty="0">
+              <a:rPr lang="fr-FR" sz="1400" dirty="0">
                 <a:highlight>
                   <a:srgbClr val="00FF00"/>
                 </a:highlight>
@@ -5294,47 +5231,51 @@
               <a:t>fibonacci</a:t>
             </a:r>
             <a:r>
-              <a:rPr lang="fr-FR" sz="2400" dirty="0">
+              <a:rPr lang="fr-FR" sz="1400" dirty="0">
                 <a:hlinkClick r:id="rId5"/>
               </a:rPr>
               <a:t>/</a:t>
             </a:r>
             <a:r>
-              <a:rPr lang="fr-FR" sz="2400" dirty="0">
+              <a:rPr lang="fr-FR" sz="1400" dirty="0">
                 <a:highlight>
                   <a:srgbClr val="FF6C45"/>
                 </a:highlight>
                 <a:hlinkClick r:id="rId5"/>
               </a:rPr>
-              <a:t>hello/guillaume</a:t>
+              <a:t>compute</a:t>
             </a:r>
             <a:br>
-              <a:rPr lang="fr-FR" sz="2400" dirty="0"/>
+              <a:rPr lang="fr-FR" sz="1400" dirty="0">
+                <a:highlight>
+                  <a:srgbClr val="FF6C45"/>
+                </a:highlight>
+              </a:rPr>
             </a:br>
             <a:r>
-              <a:rPr lang="fr-FR" sz="2400" dirty="0"/>
+              <a:rPr lang="fr-FR" sz="1400" dirty="0"/>
               <a:t>{</a:t>
             </a:r>
             <a:r>
-              <a:rPr lang="fr-FR" sz="2400" b="0" i="0" dirty="0">
+              <a:rPr lang="fr-FR" sz="1400" b="0" i="0" dirty="0">
                 <a:effectLst/>
                 <a:latin typeface="-apple-system"/>
               </a:rPr>
               <a:t>"</a:t>
             </a:r>
             <a:r>
-              <a:rPr lang="fr-FR" sz="2400" dirty="0"/>
+              <a:rPr lang="fr-FR" sz="1400" dirty="0"/>
               <a:t>input</a:t>
             </a:r>
             <a:r>
-              <a:rPr lang="fr-FR" sz="2400" b="0" i="0" dirty="0">
+              <a:rPr lang="fr-FR" sz="1400" b="0" i="0" dirty="0">
                 <a:effectLst/>
                 <a:latin typeface="-apple-system"/>
               </a:rPr>
               <a:t>"</a:t>
             </a:r>
             <a:r>
-              <a:rPr lang="fr-FR" sz="2400" dirty="0"/>
+              <a:rPr lang="fr-FR" sz="1400" dirty="0"/>
               <a:t>:42}</a:t>
             </a:r>
           </a:p>
@@ -5719,9 +5660,7 @@
           <a:prstGeom prst="roundRect">
             <a:avLst/>
           </a:prstGeom>
-          <a:solidFill>
-            <a:srgbClr val="7030A0"/>
-          </a:solidFill>
+          <a:noFill/>
           <a:ln>
             <a:noFill/>
           </a:ln>
@@ -5778,9 +5717,7 @@
           <a:prstGeom prst="roundRect">
             <a:avLst/>
           </a:prstGeom>
-          <a:solidFill>
-            <a:srgbClr val="7030A0"/>
-          </a:solidFill>
+          <a:noFill/>
           <a:ln>
             <a:noFill/>
           </a:ln>
@@ -5942,7 +5879,7 @@
                 </a:highlight>
                 <a:hlinkClick r:id="rId4"/>
               </a:rPr>
-              <a:t>hello/guillaume</a:t>
+              <a:t>compute</a:t>
             </a:r>
             <a:endParaRPr lang="fr-FR" sz="1600" dirty="0">
               <a:highlight>
@@ -5994,8 +5931,8 @@
         </p:nvSpPr>
         <p:spPr>
           <a:xfrm>
-            <a:off x="6096000" y="3302938"/>
-            <a:ext cx="4920343" cy="1200329"/>
+            <a:off x="6096001" y="3302938"/>
+            <a:ext cx="2701198" cy="830997"/>
           </a:xfrm>
           <a:prstGeom prst="rect">
             <a:avLst/>
@@ -6009,19 +5946,19 @@
           <a:lstStyle/>
           <a:p>
             <a:r>
-              <a:rPr lang="fr-FR" sz="2400" dirty="0"/>
+              <a:rPr lang="fr-FR" sz="1600" dirty="0"/>
               <a:t>HTTP POST</a:t>
             </a:r>
           </a:p>
           <a:p>
             <a:r>
-              <a:rPr lang="fr-FR" sz="2400" dirty="0">
+              <a:rPr lang="fr-FR" sz="1600" dirty="0">
                 <a:hlinkClick r:id="rId5"/>
               </a:rPr>
               <a:t>http://</a:t>
             </a:r>
             <a:r>
-              <a:rPr lang="fr-FR" sz="2400" dirty="0">
+              <a:rPr lang="fr-FR" sz="1600" dirty="0">
                 <a:highlight>
                   <a:srgbClr val="00FF00"/>
                 </a:highlight>
@@ -6030,47 +5967,51 @@
               <a:t>fibonacci</a:t>
             </a:r>
             <a:r>
-              <a:rPr lang="fr-FR" sz="2400" dirty="0">
+              <a:rPr lang="fr-FR" sz="1600" dirty="0">
                 <a:hlinkClick r:id="rId5"/>
               </a:rPr>
               <a:t>/</a:t>
             </a:r>
             <a:r>
-              <a:rPr lang="fr-FR" sz="2400" dirty="0">
+              <a:rPr lang="fr-FR" sz="1600" dirty="0">
                 <a:highlight>
                   <a:srgbClr val="FF6C45"/>
                 </a:highlight>
                 <a:hlinkClick r:id="rId5"/>
               </a:rPr>
-              <a:t>hello/guillaume</a:t>
+              <a:t>compute</a:t>
             </a:r>
             <a:br>
-              <a:rPr lang="fr-FR" sz="2400" dirty="0"/>
+              <a:rPr lang="fr-FR" sz="1600" dirty="0">
+                <a:highlight>
+                  <a:srgbClr val="FF6C45"/>
+                </a:highlight>
+              </a:rPr>
             </a:br>
             <a:r>
-              <a:rPr lang="fr-FR" sz="2400" dirty="0"/>
+              <a:rPr lang="fr-FR" sz="1600" dirty="0"/>
               <a:t>{</a:t>
             </a:r>
             <a:r>
-              <a:rPr lang="fr-FR" sz="2400" b="0" i="0" dirty="0">
+              <a:rPr lang="fr-FR" sz="1600" b="0" i="0" dirty="0">
                 <a:effectLst/>
                 <a:latin typeface="-apple-system"/>
               </a:rPr>
               <a:t>"</a:t>
             </a:r>
             <a:r>
-              <a:rPr lang="fr-FR" sz="2400" dirty="0"/>
+              <a:rPr lang="fr-FR" sz="1600" dirty="0"/>
               <a:t>input</a:t>
             </a:r>
             <a:r>
-              <a:rPr lang="fr-FR" sz="2400" b="0" i="0" dirty="0">
+              <a:rPr lang="fr-FR" sz="1600" b="0" i="0" dirty="0">
                 <a:effectLst/>
                 <a:latin typeface="-apple-system"/>
               </a:rPr>
               <a:t>"</a:t>
             </a:r>
             <a:r>
-              <a:rPr lang="fr-FR" sz="2400" dirty="0"/>
+              <a:rPr lang="fr-FR" sz="1600" dirty="0"/>
               <a:t>:42}</a:t>
             </a:r>
           </a:p>
@@ -6539,8 +6480,8 @@
         </p:nvSpPr>
         <p:spPr>
           <a:xfrm>
-            <a:off x="5814767" y="3822474"/>
-            <a:ext cx="1659171" cy="543302"/>
+            <a:off x="5814767" y="3632460"/>
+            <a:ext cx="1659171" cy="923330"/>
           </a:xfrm>
           <a:prstGeom prst="roundRect">
             <a:avLst/>
@@ -7816,7 +7757,7 @@
           <p:cNvPr id="3" name="Espace réservé du contenu 2">
             <a:extLst>
               <a:ext uri="{FF2B5EF4-FFF2-40B4-BE49-F238E27FC236}">
-                <a16:creationId xmlns:a16="http://schemas.microsoft.com/office/drawing/2014/main" id="{FC72177F-6E5E-241E-BA74-8D91DC6E05F3}"/>
+                <a16:creationId xmlns:a16="http://schemas.microsoft.com/office/drawing/2014/main" id="{F808C092-CC0D-57C7-0901-F8EB72559CF1}"/>
               </a:ext>
             </a:extLst>
           </p:cNvPr>
@@ -7829,26 +7770,24 @@
         </p:nvSpPr>
         <p:spPr>
           <a:xfrm>
-            <a:off x="0" y="6391656"/>
-            <a:ext cx="12192000" cy="466343"/>
-          </a:xfrm>
-        </p:spPr>
-        <p:txBody>
-          <a:bodyPr>
-            <a:normAutofit lnSpcReduction="10000"/>
-          </a:bodyPr>
+            <a:off x="0" y="6301962"/>
+            <a:ext cx="12192000" cy="556038"/>
+          </a:xfrm>
+        </p:spPr>
+        <p:txBody>
+          <a:bodyPr/>
           <a:lstStyle/>
           <a:p>
-            <a:endParaRPr lang="fr-FR" dirty="0"/>
-          </a:p>
-        </p:txBody>
-      </p:sp>
-      <p:sp>
-        <p:nvSpPr>
-          <p:cNvPr id="6" name="Rounded Rectangle 44">
-            <a:extLst>
-              <a:ext uri="{FF2B5EF4-FFF2-40B4-BE49-F238E27FC236}">
-                <a16:creationId xmlns:a16="http://schemas.microsoft.com/office/drawing/2014/main" id="{DDD08BA0-70BB-583F-312D-C1BE714A89E8}"/>
+            <a:endParaRPr lang="fr-FR"/>
+          </a:p>
+        </p:txBody>
+      </p:sp>
+      <p:sp>
+        <p:nvSpPr>
+          <p:cNvPr id="4" name="Rectangle : coins arrondis 3">
+            <a:extLst>
+              <a:ext uri="{FF2B5EF4-FFF2-40B4-BE49-F238E27FC236}">
+                <a16:creationId xmlns:a16="http://schemas.microsoft.com/office/drawing/2014/main" id="{F9FDB491-B3FC-051D-11E0-E5F1546F9A17}"/>
               </a:ext>
             </a:extLst>
           </p:cNvPr>
@@ -7857,8 +7796,8 @@
         </p:nvSpPr>
         <p:spPr>
           <a:xfrm>
-            <a:off x="4275182" y="2785207"/>
-            <a:ext cx="2245224" cy="1125268"/>
+            <a:off x="6487884" y="4781006"/>
+            <a:ext cx="2621281" cy="1137502"/>
           </a:xfrm>
           <a:prstGeom prst="roundRect">
             <a:avLst/>
@@ -7893,287 +7832,7 @@
           <a:lstStyle/>
           <a:p>
             <a:pPr algn="ctr"/>
-            <a:r>
-              <a:rPr lang="en-US" sz="2400" dirty="0">
-                <a:solidFill>
-                  <a:schemeClr val="bg1"/>
-                </a:solidFill>
-              </a:rPr>
-              <a:t>SlimFaas</a:t>
-            </a:r>
-          </a:p>
-        </p:txBody>
-      </p:sp>
-      <p:cxnSp>
-        <p:nvCxnSpPr>
-          <p:cNvPr id="7" name="Connecteur droit avec flèche 6">
-            <a:extLst>
-              <a:ext uri="{FF2B5EF4-FFF2-40B4-BE49-F238E27FC236}">
-                <a16:creationId xmlns:a16="http://schemas.microsoft.com/office/drawing/2014/main" id="{2846A4F1-5F1E-1B4A-EAEC-F51C758D93A6}"/>
-              </a:ext>
-            </a:extLst>
-          </p:cNvPr>
-          <p:cNvCxnSpPr>
-            <a:cxnSpLocks/>
-            <a:stCxn id="8" idx="3"/>
-            <a:endCxn id="6" idx="1"/>
-          </p:cNvCxnSpPr>
-          <p:nvPr/>
-        </p:nvCxnSpPr>
-        <p:spPr>
-          <a:xfrm flipV="1">
-            <a:off x="3699119" y="3347841"/>
-            <a:ext cx="576063" cy="4215"/>
-          </a:xfrm>
-          <a:prstGeom prst="straightConnector1">
-            <a:avLst/>
-          </a:prstGeom>
-          <a:ln w="127000">
-            <a:solidFill>
-              <a:schemeClr val="accent6">
-                <a:lumMod val="75000"/>
-              </a:schemeClr>
-            </a:solidFill>
-            <a:tailEnd type="triangle"/>
-          </a:ln>
-        </p:spPr>
-        <p:style>
-          <a:lnRef idx="1">
-            <a:schemeClr val="accent1"/>
-          </a:lnRef>
-          <a:fillRef idx="0">
-            <a:schemeClr val="accent1"/>
-          </a:fillRef>
-          <a:effectRef idx="0">
-            <a:schemeClr val="accent1"/>
-          </a:effectRef>
-          <a:fontRef idx="minor">
-            <a:schemeClr val="tx1"/>
-          </a:fontRef>
-        </p:style>
-      </p:cxnSp>
-      <p:sp>
-        <p:nvSpPr>
-          <p:cNvPr id="8" name="ZoneTexte 7">
-            <a:extLst>
-              <a:ext uri="{FF2B5EF4-FFF2-40B4-BE49-F238E27FC236}">
-                <a16:creationId xmlns:a16="http://schemas.microsoft.com/office/drawing/2014/main" id="{AC32730B-6D07-37BE-5E05-17826CC33CC8}"/>
-              </a:ext>
-            </a:extLst>
-          </p:cNvPr>
-          <p:cNvSpPr txBox="1"/>
-          <p:nvPr/>
-        </p:nvSpPr>
-        <p:spPr>
-          <a:xfrm>
-            <a:off x="61124" y="2936557"/>
-            <a:ext cx="3637995" cy="830997"/>
-          </a:xfrm>
-          <a:prstGeom prst="rect">
-            <a:avLst/>
-          </a:prstGeom>
-          <a:noFill/>
-        </p:spPr>
-        <p:txBody>
-          <a:bodyPr wrap="square" rtlCol="0">
-            <a:spAutoFit/>
-          </a:bodyPr>
-          <a:lstStyle/>
-          <a:p>
-            <a:r>
-              <a:rPr lang="fr-FR" sz="1600" dirty="0"/>
-              <a:t>HTTP POST</a:t>
-            </a:r>
-          </a:p>
-          <a:p>
-            <a:r>
-              <a:rPr lang="fr-FR" sz="1600" dirty="0">
-                <a:hlinkClick r:id="rId2"/>
-              </a:rPr>
-              <a:t>http://slimfaas/</a:t>
-            </a:r>
-            <a:r>
-              <a:rPr lang="fr-FR" sz="1600" dirty="0">
-                <a:highlight>
-                  <a:srgbClr val="FFFF00"/>
-                </a:highlight>
-                <a:hlinkClick r:id="rId2"/>
-              </a:rPr>
-              <a:t>async-publish</a:t>
-            </a:r>
-            <a:r>
-              <a:rPr lang="fr-FR" sz="1600" dirty="0">
-                <a:hlinkClick r:id="rId2"/>
-              </a:rPr>
-              <a:t>/fibonacci</a:t>
-            </a:r>
-            <a:endParaRPr lang="fr-FR" sz="1600" dirty="0"/>
-          </a:p>
-          <a:p>
-            <a:r>
-              <a:rPr lang="fr-FR" sz="1600" dirty="0"/>
-              <a:t>{</a:t>
-            </a:r>
-            <a:r>
-              <a:rPr lang="fr-FR" sz="1600" b="0" i="0" dirty="0">
-                <a:effectLst/>
-                <a:latin typeface="-apple-system"/>
-              </a:rPr>
-              <a:t>"</a:t>
-            </a:r>
-            <a:r>
-              <a:rPr lang="fr-FR" sz="1600" dirty="0"/>
-              <a:t>input</a:t>
-            </a:r>
-            <a:r>
-              <a:rPr lang="fr-FR" sz="1600" b="0" i="0" dirty="0">
-                <a:effectLst/>
-                <a:latin typeface="-apple-system"/>
-              </a:rPr>
-              <a:t>"</a:t>
-            </a:r>
-            <a:r>
-              <a:rPr lang="fr-FR" sz="1600" dirty="0"/>
-              <a:t>:42}</a:t>
-            </a:r>
-          </a:p>
-        </p:txBody>
-      </p:sp>
-      <p:sp>
-        <p:nvSpPr>
-          <p:cNvPr id="9" name="ZoneTexte 8">
-            <a:extLst>
-              <a:ext uri="{FF2B5EF4-FFF2-40B4-BE49-F238E27FC236}">
-                <a16:creationId xmlns:a16="http://schemas.microsoft.com/office/drawing/2014/main" id="{6611272C-28EE-7524-CD4D-AAE3B72A1A73}"/>
-              </a:ext>
-            </a:extLst>
-          </p:cNvPr>
-          <p:cNvSpPr txBox="1"/>
-          <p:nvPr/>
-        </p:nvSpPr>
-        <p:spPr>
-          <a:xfrm>
-            <a:off x="6542729" y="997387"/>
-            <a:ext cx="1659171" cy="830997"/>
-          </a:xfrm>
-          <a:prstGeom prst="rect">
-            <a:avLst/>
-          </a:prstGeom>
-          <a:noFill/>
-        </p:spPr>
-        <p:txBody>
-          <a:bodyPr wrap="square" rtlCol="0">
-            <a:spAutoFit/>
-          </a:bodyPr>
-          <a:lstStyle/>
-          <a:p>
-            <a:r>
-              <a:rPr lang="fr-FR" sz="1600" dirty="0"/>
-              <a:t>HTTP POST</a:t>
-            </a:r>
-          </a:p>
-          <a:p>
-            <a:r>
-              <a:rPr lang="fr-FR" sz="1600" dirty="0">
-                <a:hlinkClick r:id="rId3"/>
-              </a:rPr>
-              <a:t>http://fibonacci</a:t>
-            </a:r>
-            <a:r>
-              <a:rPr lang="fr-FR" sz="1600" dirty="0"/>
-              <a:t> </a:t>
-            </a:r>
-            <a:br>
-              <a:rPr lang="fr-FR" sz="1600" dirty="0"/>
-            </a:br>
-            <a:r>
-              <a:rPr lang="fr-FR" sz="1600" dirty="0"/>
-              <a:t>{</a:t>
-            </a:r>
-            <a:r>
-              <a:rPr lang="fr-FR" sz="1600" b="0" i="0" dirty="0">
-                <a:effectLst/>
-                <a:latin typeface="-apple-system"/>
-              </a:rPr>
-              <a:t>"</a:t>
-            </a:r>
-            <a:r>
-              <a:rPr lang="fr-FR" sz="1600" dirty="0"/>
-              <a:t>input</a:t>
-            </a:r>
-            <a:r>
-              <a:rPr lang="fr-FR" sz="1600" b="0" i="0" dirty="0">
-                <a:effectLst/>
-                <a:latin typeface="-apple-system"/>
-              </a:rPr>
-              <a:t>"</a:t>
-            </a:r>
-            <a:r>
-              <a:rPr lang="fr-FR" sz="1600" dirty="0"/>
-              <a:t>:42}</a:t>
-            </a:r>
-          </a:p>
-        </p:txBody>
-      </p:sp>
-      <p:sp>
-        <p:nvSpPr>
-          <p:cNvPr id="10" name="Rounded Rectangle 45">
-            <a:extLst>
-              <a:ext uri="{FF2B5EF4-FFF2-40B4-BE49-F238E27FC236}">
-                <a16:creationId xmlns:a16="http://schemas.microsoft.com/office/drawing/2014/main" id="{D79C9965-A2CD-C2C1-A01C-697EABB121C8}"/>
-              </a:ext>
-            </a:extLst>
-          </p:cNvPr>
-          <p:cNvSpPr/>
-          <p:nvPr/>
-        </p:nvSpPr>
-        <p:spPr>
-          <a:xfrm>
-            <a:off x="8812333" y="509182"/>
-            <a:ext cx="3040144" cy="1540322"/>
-          </a:xfrm>
-          <a:prstGeom prst="roundRect">
-            <a:avLst/>
-          </a:prstGeom>
-          <a:solidFill>
-            <a:schemeClr val="bg2">
-              <a:lumMod val="25000"/>
-            </a:schemeClr>
-          </a:solidFill>
-          <a:ln>
-            <a:noFill/>
-          </a:ln>
-        </p:spPr>
-        <p:style>
-          <a:lnRef idx="2">
-            <a:schemeClr val="accent1">
-              <a:shade val="50000"/>
-            </a:schemeClr>
-          </a:lnRef>
-          <a:fillRef idx="1">
-            <a:schemeClr val="accent1"/>
-          </a:fillRef>
-          <a:effectRef idx="0">
-            <a:schemeClr val="accent1"/>
-          </a:effectRef>
-          <a:fontRef idx="minor">
-            <a:schemeClr val="lt1"/>
-          </a:fontRef>
-        </p:style>
-        <p:txBody>
-          <a:bodyPr rtlCol="0" anchor="ctr"/>
-          <a:lstStyle/>
-          <a:p>
-            <a:pPr algn="ctr"/>
-            <a:r>
-              <a:rPr lang="fr-FR" sz="2400" dirty="0">
-                <a:solidFill>
-                  <a:schemeClr val="bg1"/>
-                </a:solidFill>
-              </a:rPr>
-              <a:t>function « fibonacci » instance 1</a:t>
-            </a:r>
-            <a:endParaRPr lang="en-FR" sz="2400" dirty="0">
+            <a:endParaRPr lang="fr-FR" sz="4000">
               <a:solidFill>
                 <a:schemeClr val="bg1"/>
               </a:solidFill>
@@ -8183,10 +7842,10 @@
       </p:sp>
       <p:pic>
         <p:nvPicPr>
-          <p:cNvPr id="11" name="Picture 2" descr="Afficher l’image source">
-            <a:extLst>
-              <a:ext uri="{FF2B5EF4-FFF2-40B4-BE49-F238E27FC236}">
-                <a16:creationId xmlns:a16="http://schemas.microsoft.com/office/drawing/2014/main" id="{B80A9736-02F1-1190-8A3C-F71D0B8C1D08}"/>
+          <p:cNvPr id="6" name="Picture 2" descr="Afficher l’image source">
+            <a:extLst>
+              <a:ext uri="{FF2B5EF4-FFF2-40B4-BE49-F238E27FC236}">
+                <a16:creationId xmlns:a16="http://schemas.microsoft.com/office/drawing/2014/main" id="{86FC0B2B-0EA9-9828-9A73-E62E8C8C11FB}"/>
               </a:ext>
             </a:extLst>
           </p:cNvPr>
@@ -8196,7 +7855,7 @@
           <p:nvPr/>
         </p:nvPicPr>
         <p:blipFill>
-          <a:blip r:embed="rId4">
+          <a:blip r:embed="rId2">
             <a:extLst>
               <a:ext uri="{28A0092B-C50C-407E-A947-70E740481C1C}">
                 <a14:useLocalDpi xmlns:a14="http://schemas.microsoft.com/office/drawing/2010/main" val="0"/>
@@ -8210,8 +7869,8 @@
         </p:blipFill>
         <p:spPr bwMode="auto">
           <a:xfrm>
-            <a:off x="8618142" y="206059"/>
-            <a:ext cx="588793" cy="572693"/>
+            <a:off x="8837789" y="4620991"/>
+            <a:ext cx="421692" cy="410161"/>
           </a:xfrm>
           <a:prstGeom prst="rect">
             <a:avLst/>
@@ -8228,136 +7887,12 @@
           </a:extLst>
         </p:spPr>
       </p:pic>
-      <p:cxnSp>
-        <p:nvCxnSpPr>
-          <p:cNvPr id="12" name="Connecteur droit avec flèche 11">
-            <a:extLst>
-              <a:ext uri="{FF2B5EF4-FFF2-40B4-BE49-F238E27FC236}">
-                <a16:creationId xmlns:a16="http://schemas.microsoft.com/office/drawing/2014/main" id="{3AFE1186-6876-1E2D-BB90-BFA726C0ACA3}"/>
-              </a:ext>
-            </a:extLst>
-          </p:cNvPr>
-          <p:cNvCxnSpPr>
-            <a:cxnSpLocks/>
-            <a:stCxn id="6" idx="3"/>
-            <a:endCxn id="10" idx="1"/>
-          </p:cNvCxnSpPr>
-          <p:nvPr/>
-        </p:nvCxnSpPr>
-        <p:spPr>
-          <a:xfrm flipV="1">
-            <a:off x="6520406" y="1279343"/>
-            <a:ext cx="2291927" cy="2068498"/>
-          </a:xfrm>
-          <a:prstGeom prst="straightConnector1">
-            <a:avLst/>
-          </a:prstGeom>
-          <a:ln w="127000">
-            <a:solidFill>
-              <a:schemeClr val="accent6">
-                <a:lumMod val="75000"/>
-              </a:schemeClr>
-            </a:solidFill>
-            <a:tailEnd type="triangle"/>
-          </a:ln>
-        </p:spPr>
-        <p:style>
-          <a:lnRef idx="1">
-            <a:schemeClr val="accent1"/>
-          </a:lnRef>
-          <a:fillRef idx="0">
-            <a:schemeClr val="accent1"/>
-          </a:fillRef>
-          <a:effectRef idx="0">
-            <a:schemeClr val="accent1"/>
-          </a:effectRef>
-          <a:fontRef idx="minor">
-            <a:schemeClr val="tx1"/>
-          </a:fontRef>
-        </p:style>
-      </p:cxnSp>
-      <p:sp>
-        <p:nvSpPr>
-          <p:cNvPr id="22" name="ZoneTexte 21">
-            <a:extLst>
-              <a:ext uri="{FF2B5EF4-FFF2-40B4-BE49-F238E27FC236}">
-                <a16:creationId xmlns:a16="http://schemas.microsoft.com/office/drawing/2014/main" id="{B20F6461-EFC4-60A1-6479-F83792C4E189}"/>
-              </a:ext>
-            </a:extLst>
-          </p:cNvPr>
-          <p:cNvSpPr txBox="1"/>
-          <p:nvPr/>
-        </p:nvSpPr>
-        <p:spPr>
-          <a:xfrm>
-            <a:off x="7304194" y="3284661"/>
-            <a:ext cx="1659171" cy="830997"/>
-          </a:xfrm>
-          <a:prstGeom prst="rect">
-            <a:avLst/>
-          </a:prstGeom>
-          <a:noFill/>
-        </p:spPr>
-        <p:txBody>
-          <a:bodyPr wrap="square" rtlCol="0">
-            <a:spAutoFit/>
-          </a:bodyPr>
-          <a:lstStyle/>
-          <a:p>
-            <a:r>
-              <a:rPr lang="fr-FR" sz="1600" dirty="0"/>
-              <a:t>HTTP POST</a:t>
-            </a:r>
-          </a:p>
-          <a:p>
-            <a:r>
-              <a:rPr lang="fr-FR" sz="1600" dirty="0">
-                <a:hlinkClick r:id="rId3"/>
-              </a:rPr>
-              <a:t>http://fibonacci</a:t>
-            </a:r>
-            <a:r>
-              <a:rPr lang="fr-FR" sz="1600" dirty="0"/>
-              <a:t> </a:t>
-            </a:r>
-            <a:br>
-              <a:rPr lang="fr-FR" sz="1600" dirty="0"/>
-            </a:br>
-            <a:r>
-              <a:rPr lang="fr-FR" sz="1600" dirty="0"/>
-              <a:t>{</a:t>
-            </a:r>
-            <a:r>
-              <a:rPr lang="fr-FR" sz="1600" b="0" i="0" dirty="0">
-                <a:effectLst/>
-                <a:latin typeface="-apple-system"/>
-              </a:rPr>
-              <a:t>"</a:t>
-            </a:r>
-            <a:r>
-              <a:rPr lang="fr-FR" sz="1600" dirty="0"/>
-              <a:t>input</a:t>
-            </a:r>
-            <a:r>
-              <a:rPr lang="fr-FR" sz="1600" b="0" i="0" dirty="0">
-                <a:effectLst/>
-                <a:latin typeface="-apple-system"/>
-              </a:rPr>
-              <a:t>"</a:t>
-            </a:r>
-            <a:r>
-              <a:rPr lang="fr-FR" sz="1600" dirty="0"/>
-              <a:t>:42}</a:t>
-            </a:r>
-          </a:p>
-        </p:txBody>
-      </p:sp>
-      <p:sp>
-        <p:nvSpPr>
-          <p:cNvPr id="23" name="Rounded Rectangle 45">
-            <a:extLst>
-              <a:ext uri="{FF2B5EF4-FFF2-40B4-BE49-F238E27FC236}">
-                <a16:creationId xmlns:a16="http://schemas.microsoft.com/office/drawing/2014/main" id="{02CDF874-6617-192D-7FBF-DFCDF050DE8B}"/>
+      <p:sp>
+        <p:nvSpPr>
+          <p:cNvPr id="13" name="Rectangle : coins arrondis 12">
+            <a:extLst>
+              <a:ext uri="{FF2B5EF4-FFF2-40B4-BE49-F238E27FC236}">
+                <a16:creationId xmlns:a16="http://schemas.microsoft.com/office/drawing/2014/main" id="{286E557E-9D2D-E39E-7BAA-470B8AA24E84}"/>
               </a:ext>
             </a:extLst>
           </p:cNvPr>
@@ -8366,8 +7901,8 @@
         </p:nvSpPr>
         <p:spPr>
           <a:xfrm>
-            <a:off x="8858733" y="2401822"/>
-            <a:ext cx="3040144" cy="1540322"/>
+            <a:off x="9030787" y="2914738"/>
+            <a:ext cx="2621281" cy="1137502"/>
           </a:xfrm>
           <a:prstGeom prst="roundRect">
             <a:avLst/>
@@ -8402,23 +7937,20 @@
           <a:lstStyle/>
           <a:p>
             <a:pPr algn="ctr"/>
-            <a:r>
-              <a:rPr lang="fr-FR" sz="2400" dirty="0">
-                <a:solidFill>
-                  <a:schemeClr val="bg1"/>
-                </a:solidFill>
-              </a:rPr>
-              <a:t>function « fibonacci » instance 2</a:t>
-            </a:r>
+            <a:endParaRPr lang="fr-FR" sz="4000">
+              <a:solidFill>
+                <a:schemeClr val="bg1"/>
+              </a:solidFill>
+            </a:endParaRPr>
           </a:p>
         </p:txBody>
       </p:sp>
       <p:pic>
         <p:nvPicPr>
-          <p:cNvPr id="24" name="Picture 2" descr="Afficher l’image source">
-            <a:extLst>
-              <a:ext uri="{FF2B5EF4-FFF2-40B4-BE49-F238E27FC236}">
-                <a16:creationId xmlns:a16="http://schemas.microsoft.com/office/drawing/2014/main" id="{6367FF6E-BE42-9237-982C-7249BC298201}"/>
+          <p:cNvPr id="15" name="Picture 2" descr="Afficher l’image source">
+            <a:extLst>
+              <a:ext uri="{FF2B5EF4-FFF2-40B4-BE49-F238E27FC236}">
+                <a16:creationId xmlns:a16="http://schemas.microsoft.com/office/drawing/2014/main" id="{88ED471D-D11B-63C5-CD2D-4DECE1E35849}"/>
               </a:ext>
             </a:extLst>
           </p:cNvPr>
@@ -8428,7 +7960,7 @@
           <p:nvPr/>
         </p:nvPicPr>
         <p:blipFill>
-          <a:blip r:embed="rId4">
+          <a:blip r:embed="rId2">
             <a:extLst>
               <a:ext uri="{28A0092B-C50C-407E-A947-70E740481C1C}">
                 <a14:useLocalDpi xmlns:a14="http://schemas.microsoft.com/office/drawing/2010/main" val="0"/>
@@ -8442,8 +7974,8 @@
         </p:blipFill>
         <p:spPr bwMode="auto">
           <a:xfrm>
-            <a:off x="8799603" y="2111546"/>
-            <a:ext cx="588793" cy="572693"/>
+            <a:off x="11380692" y="2754723"/>
+            <a:ext cx="421692" cy="410161"/>
           </a:xfrm>
           <a:prstGeom prst="rect">
             <a:avLst/>
@@ -8460,60 +7992,12 @@
           </a:extLst>
         </p:spPr>
       </p:pic>
-      <p:cxnSp>
-        <p:nvCxnSpPr>
-          <p:cNvPr id="25" name="Connecteur droit avec flèche 24">
-            <a:extLst>
-              <a:ext uri="{FF2B5EF4-FFF2-40B4-BE49-F238E27FC236}">
-                <a16:creationId xmlns:a16="http://schemas.microsoft.com/office/drawing/2014/main" id="{47CCB34C-BDE9-83E6-DBE9-369CE229F27F}"/>
-              </a:ext>
-            </a:extLst>
-          </p:cNvPr>
-          <p:cNvCxnSpPr>
-            <a:cxnSpLocks/>
-            <a:stCxn id="6" idx="3"/>
-            <a:endCxn id="23" idx="1"/>
-          </p:cNvCxnSpPr>
-          <p:nvPr/>
-        </p:nvCxnSpPr>
-        <p:spPr>
-          <a:xfrm flipV="1">
-            <a:off x="6520406" y="3171983"/>
-            <a:ext cx="2338327" cy="175858"/>
-          </a:xfrm>
-          <a:prstGeom prst="straightConnector1">
-            <a:avLst/>
-          </a:prstGeom>
-          <a:ln w="127000">
-            <a:solidFill>
-              <a:schemeClr val="accent6">
-                <a:lumMod val="75000"/>
-              </a:schemeClr>
-            </a:solidFill>
-            <a:tailEnd type="triangle"/>
-          </a:ln>
-        </p:spPr>
-        <p:style>
-          <a:lnRef idx="1">
-            <a:schemeClr val="accent1"/>
-          </a:lnRef>
-          <a:fillRef idx="0">
-            <a:schemeClr val="accent1"/>
-          </a:fillRef>
-          <a:effectRef idx="0">
-            <a:schemeClr val="accent1"/>
-          </a:effectRef>
-          <a:fontRef idx="minor">
-            <a:schemeClr val="tx1"/>
-          </a:fontRef>
-        </p:style>
-      </p:cxnSp>
-      <p:sp>
-        <p:nvSpPr>
-          <p:cNvPr id="28" name="Rounded Rectangle 45">
-            <a:extLst>
-              <a:ext uri="{FF2B5EF4-FFF2-40B4-BE49-F238E27FC236}">
-                <a16:creationId xmlns:a16="http://schemas.microsoft.com/office/drawing/2014/main" id="{38FF5A4C-559C-1D52-9476-314AAD56BECB}"/>
+      <p:sp>
+        <p:nvSpPr>
+          <p:cNvPr id="17" name="Rectangle : coins arrondis 16">
+            <a:extLst>
+              <a:ext uri="{FF2B5EF4-FFF2-40B4-BE49-F238E27FC236}">
+                <a16:creationId xmlns:a16="http://schemas.microsoft.com/office/drawing/2014/main" id="{FA892C96-9746-CAD2-5A8F-2877A3233167}"/>
               </a:ext>
             </a:extLst>
           </p:cNvPr>
@@ -8522,8 +8006,8 @@
         </p:nvSpPr>
         <p:spPr>
           <a:xfrm>
-            <a:off x="8822212" y="4493355"/>
-            <a:ext cx="3040144" cy="1540322"/>
+            <a:off x="6337568" y="1231306"/>
+            <a:ext cx="2621281" cy="1137502"/>
           </a:xfrm>
           <a:prstGeom prst="roundRect">
             <a:avLst/>
@@ -8558,23 +8042,77 @@
           <a:lstStyle/>
           <a:p>
             <a:pPr algn="ctr"/>
-            <a:r>
-              <a:rPr lang="fr-FR" sz="2400" dirty="0">
+            <a:endParaRPr lang="fr-FR" sz="4000">
+              <a:solidFill>
+                <a:schemeClr val="bg1"/>
+              </a:solidFill>
+            </a:endParaRPr>
+          </a:p>
+        </p:txBody>
+      </p:sp>
+      <p:sp>
+        <p:nvSpPr>
+          <p:cNvPr id="18" name="Rounded Rectangle 44">
+            <a:extLst>
+              <a:ext uri="{FF2B5EF4-FFF2-40B4-BE49-F238E27FC236}">
+                <a16:creationId xmlns:a16="http://schemas.microsoft.com/office/drawing/2014/main" id="{2AD36C36-BFA5-B972-A126-EDA1BAD396E0}"/>
+              </a:ext>
+            </a:extLst>
+          </p:cNvPr>
+          <p:cNvSpPr/>
+          <p:nvPr/>
+        </p:nvSpPr>
+        <p:spPr>
+          <a:xfrm>
+            <a:off x="6656105" y="1423364"/>
+            <a:ext cx="1863194" cy="776491"/>
+          </a:xfrm>
+          <a:prstGeom prst="roundRect">
+            <a:avLst/>
+          </a:prstGeom>
+          <a:noFill/>
+          <a:ln>
+            <a:noFill/>
+          </a:ln>
+        </p:spPr>
+        <p:style>
+          <a:lnRef idx="2">
+            <a:schemeClr val="accent1">
+              <a:shade val="50000"/>
+            </a:schemeClr>
+          </a:lnRef>
+          <a:fillRef idx="1">
+            <a:schemeClr val="accent1"/>
+          </a:fillRef>
+          <a:effectRef idx="0">
+            <a:schemeClr val="accent1"/>
+          </a:effectRef>
+          <a:fontRef idx="minor">
+            <a:schemeClr val="lt1"/>
+          </a:fontRef>
+        </p:style>
+        <p:txBody>
+          <a:bodyPr rtlCol="0" anchor="ctr"/>
+          <a:lstStyle/>
+          <a:p>
+            <a:pPr algn="ctr"/>
+            <a:r>
+              <a:rPr lang="en-US" sz="1400" dirty="0">
                 <a:solidFill>
                   <a:schemeClr val="bg1"/>
                 </a:solidFill>
               </a:rPr>
-              <a:t>function « fibonacci » instance 3</a:t>
+              <a:t>SlimFaas</a:t>
             </a:r>
           </a:p>
         </p:txBody>
       </p:sp>
       <p:pic>
         <p:nvPicPr>
-          <p:cNvPr id="29" name="Picture 2" descr="Afficher l’image source">
-            <a:extLst>
-              <a:ext uri="{FF2B5EF4-FFF2-40B4-BE49-F238E27FC236}">
-                <a16:creationId xmlns:a16="http://schemas.microsoft.com/office/drawing/2014/main" id="{5C2C929B-DD3A-D402-D3D0-47B59BB4F807}"/>
+          <p:cNvPr id="19" name="Picture 2" descr="Afficher l’image source">
+            <a:extLst>
+              <a:ext uri="{FF2B5EF4-FFF2-40B4-BE49-F238E27FC236}">
+                <a16:creationId xmlns:a16="http://schemas.microsoft.com/office/drawing/2014/main" id="{A69EEC02-815C-3D73-8D5E-E235B608C8FA}"/>
               </a:ext>
             </a:extLst>
           </p:cNvPr>
@@ -8584,7 +8122,7 @@
           <p:nvPr/>
         </p:nvPicPr>
         <p:blipFill>
-          <a:blip r:embed="rId4">
+          <a:blip r:embed="rId2">
             <a:extLst>
               <a:ext uri="{28A0092B-C50C-407E-A947-70E740481C1C}">
                 <a14:useLocalDpi xmlns:a14="http://schemas.microsoft.com/office/drawing/2010/main" val="0"/>
@@ -8598,8 +8136,8 @@
         </p:blipFill>
         <p:spPr bwMode="auto">
           <a:xfrm>
-            <a:off x="8753203" y="4252319"/>
-            <a:ext cx="588793" cy="572693"/>
+            <a:off x="8687473" y="1071291"/>
+            <a:ext cx="421692" cy="410161"/>
           </a:xfrm>
           <a:prstGeom prst="rect">
             <a:avLst/>
@@ -8616,243 +8154,12 @@
           </a:extLst>
         </p:spPr>
       </p:pic>
-      <p:cxnSp>
-        <p:nvCxnSpPr>
-          <p:cNvPr id="30" name="Connecteur droit avec flèche 29">
-            <a:extLst>
-              <a:ext uri="{FF2B5EF4-FFF2-40B4-BE49-F238E27FC236}">
-                <a16:creationId xmlns:a16="http://schemas.microsoft.com/office/drawing/2014/main" id="{3C17D7D9-AD0C-3CB9-E9C2-8FE52952EA0A}"/>
-              </a:ext>
-            </a:extLst>
-          </p:cNvPr>
-          <p:cNvCxnSpPr>
-            <a:cxnSpLocks/>
-            <a:stCxn id="6" idx="3"/>
-            <a:endCxn id="28" idx="1"/>
-          </p:cNvCxnSpPr>
-          <p:nvPr/>
-        </p:nvCxnSpPr>
-        <p:spPr>
-          <a:xfrm>
-            <a:off x="6520406" y="3347841"/>
-            <a:ext cx="2301806" cy="1915675"/>
-          </a:xfrm>
-          <a:prstGeom prst="straightConnector1">
-            <a:avLst/>
-          </a:prstGeom>
-          <a:ln w="127000">
-            <a:solidFill>
-              <a:schemeClr val="accent6">
-                <a:lumMod val="75000"/>
-              </a:schemeClr>
-            </a:solidFill>
-            <a:tailEnd type="triangle"/>
-          </a:ln>
-        </p:spPr>
-        <p:style>
-          <a:lnRef idx="1">
-            <a:schemeClr val="accent1"/>
-          </a:lnRef>
-          <a:fillRef idx="0">
-            <a:schemeClr val="accent1"/>
-          </a:fillRef>
-          <a:effectRef idx="0">
-            <a:schemeClr val="accent1"/>
-          </a:effectRef>
-          <a:fontRef idx="minor">
-            <a:schemeClr val="tx1"/>
-          </a:fontRef>
-        </p:style>
-      </p:cxnSp>
-      <p:sp>
-        <p:nvSpPr>
-          <p:cNvPr id="38" name="ZoneTexte 37">
-            <a:extLst>
-              <a:ext uri="{FF2B5EF4-FFF2-40B4-BE49-F238E27FC236}">
-                <a16:creationId xmlns:a16="http://schemas.microsoft.com/office/drawing/2014/main" id="{3E51368A-C3EC-DCF9-2D42-54C522F99A21}"/>
-              </a:ext>
-            </a:extLst>
-          </p:cNvPr>
-          <p:cNvSpPr txBox="1"/>
-          <p:nvPr/>
-        </p:nvSpPr>
-        <p:spPr>
-          <a:xfrm>
-            <a:off x="7218978" y="5412088"/>
-            <a:ext cx="1659171" cy="830997"/>
-          </a:xfrm>
-          <a:prstGeom prst="rect">
-            <a:avLst/>
-          </a:prstGeom>
-          <a:noFill/>
-        </p:spPr>
-        <p:txBody>
-          <a:bodyPr wrap="square" rtlCol="0">
-            <a:spAutoFit/>
-          </a:bodyPr>
-          <a:lstStyle/>
-          <a:p>
-            <a:r>
-              <a:rPr lang="fr-FR" sz="1600" dirty="0"/>
-              <a:t>HTTP POST</a:t>
-            </a:r>
-          </a:p>
-          <a:p>
-            <a:r>
-              <a:rPr lang="fr-FR" sz="1600" dirty="0">
-                <a:hlinkClick r:id="rId3"/>
-              </a:rPr>
-              <a:t>http://fibonacci</a:t>
-            </a:r>
-            <a:r>
-              <a:rPr lang="fr-FR" sz="1600" dirty="0"/>
-              <a:t> </a:t>
-            </a:r>
-            <a:br>
-              <a:rPr lang="fr-FR" sz="1600" dirty="0"/>
-            </a:br>
-            <a:r>
-              <a:rPr lang="fr-FR" sz="1600" dirty="0"/>
-              <a:t>{</a:t>
-            </a:r>
-            <a:r>
-              <a:rPr lang="fr-FR" sz="1600" b="0" i="0" dirty="0">
-                <a:effectLst/>
-                <a:latin typeface="-apple-system"/>
-              </a:rPr>
-              <a:t>"</a:t>
-            </a:r>
-            <a:r>
-              <a:rPr lang="fr-FR" sz="1600" dirty="0"/>
-              <a:t>input</a:t>
-            </a:r>
-            <a:r>
-              <a:rPr lang="fr-FR" sz="1600" b="0" i="0" dirty="0">
-                <a:effectLst/>
-                <a:latin typeface="-apple-system"/>
-              </a:rPr>
-              <a:t>"</a:t>
-            </a:r>
-            <a:r>
-              <a:rPr lang="fr-FR" sz="1600" dirty="0"/>
-              <a:t>:42}</a:t>
-            </a:r>
-          </a:p>
-        </p:txBody>
-      </p:sp>
-      <p:pic>
-        <p:nvPicPr>
-          <p:cNvPr id="5" name="Picture 2" descr="Afficher l’image source">
-            <a:extLst>
-              <a:ext uri="{FF2B5EF4-FFF2-40B4-BE49-F238E27FC236}">
-                <a16:creationId xmlns:a16="http://schemas.microsoft.com/office/drawing/2014/main" id="{9CF92849-9C7F-61C9-32C2-F99F37E01F43}"/>
-              </a:ext>
-            </a:extLst>
-          </p:cNvPr>
-          <p:cNvPicPr>
-            <a:picLocks noChangeAspect="1" noChangeArrowheads="1"/>
-          </p:cNvPicPr>
-          <p:nvPr/>
-        </p:nvPicPr>
-        <p:blipFill>
-          <a:blip r:embed="rId4">
-            <a:extLst>
-              <a:ext uri="{28A0092B-C50C-407E-A947-70E740481C1C}">
-                <a14:useLocalDpi xmlns:a14="http://schemas.microsoft.com/office/drawing/2010/main" val="0"/>
-              </a:ext>
-            </a:extLst>
-          </a:blip>
-          <a:srcRect/>
-          <a:stretch>
-            <a:fillRect/>
-          </a:stretch>
-        </p:blipFill>
-        <p:spPr bwMode="auto">
-          <a:xfrm>
-            <a:off x="4066798" y="2514707"/>
-            <a:ext cx="588793" cy="572693"/>
-          </a:xfrm>
-          <a:prstGeom prst="rect">
-            <a:avLst/>
-          </a:prstGeom>
-          <a:noFill/>
-          <a:extLst>
-            <a:ext uri="{909E8E84-426E-40DD-AFC4-6F175D3DCCD1}">
-              <a14:hiddenFill xmlns:a14="http://schemas.microsoft.com/office/drawing/2010/main">
-                <a:solidFill>
-                  <a:srgbClr val="FFFFFF"/>
-                </a:solidFill>
-              </a14:hiddenFill>
-            </a:ext>
-          </a:extLst>
-        </p:spPr>
-      </p:pic>
-    </p:spTree>
-    <p:extLst>
-      <p:ext uri="{BB962C8B-B14F-4D97-AF65-F5344CB8AC3E}">
-        <p14:creationId xmlns:p14="http://schemas.microsoft.com/office/powerpoint/2010/main" val="1816212992"/>
-      </p:ext>
-    </p:extLst>
-  </p:cSld>
-  <p:clrMapOvr>
-    <a:masterClrMapping/>
-  </p:clrMapOvr>
-</p:sld>
-</file>
-
-<file path=ppt/slides/slide5.xml><?xml version="1.0" encoding="utf-8"?>
-<p:sld xmlns:a="http://schemas.openxmlformats.org/drawingml/2006/main" xmlns:r="http://schemas.openxmlformats.org/officeDocument/2006/relationships" xmlns:p="http://schemas.openxmlformats.org/presentationml/2006/main">
-  <p:cSld>
-    <p:spTree>
-      <p:nvGrpSpPr>
-        <p:cNvPr id="1" name=""/>
-        <p:cNvGrpSpPr/>
-        <p:nvPr/>
-      </p:nvGrpSpPr>
-      <p:grpSpPr>
-        <a:xfrm>
-          <a:off x="0" y="0"/>
-          <a:ext cx="0" cy="0"/>
-          <a:chOff x="0" y="0"/>
-          <a:chExt cx="0" cy="0"/>
-        </a:xfrm>
-      </p:grpSpPr>
-      <p:sp>
-        <p:nvSpPr>
-          <p:cNvPr id="3" name="Espace réservé du contenu 2">
-            <a:extLst>
-              <a:ext uri="{FF2B5EF4-FFF2-40B4-BE49-F238E27FC236}">
-                <a16:creationId xmlns:a16="http://schemas.microsoft.com/office/drawing/2014/main" id="{F808C092-CC0D-57C7-0901-F8EB72559CF1}"/>
-              </a:ext>
-            </a:extLst>
-          </p:cNvPr>
-          <p:cNvSpPr>
-            <a:spLocks noGrp="1"/>
-          </p:cNvSpPr>
-          <p:nvPr>
-            <p:ph idx="1"/>
-          </p:nvPr>
-        </p:nvSpPr>
-        <p:spPr>
-          <a:xfrm>
-            <a:off x="0" y="6301962"/>
-            <a:ext cx="12192000" cy="556038"/>
-          </a:xfrm>
-        </p:spPr>
-        <p:txBody>
-          <a:bodyPr/>
-          <a:lstStyle/>
-          <a:p>
-            <a:endParaRPr lang="fr-FR"/>
-          </a:p>
-        </p:txBody>
-      </p:sp>
-      <p:sp>
-        <p:nvSpPr>
-          <p:cNvPr id="4" name="Rectangle : coins arrondis 3">
-            <a:extLst>
-              <a:ext uri="{FF2B5EF4-FFF2-40B4-BE49-F238E27FC236}">
-                <a16:creationId xmlns:a16="http://schemas.microsoft.com/office/drawing/2014/main" id="{F9FDB491-B3FC-051D-11E0-E5F1546F9A17}"/>
+      <p:sp>
+        <p:nvSpPr>
+          <p:cNvPr id="20" name="Cylindre 19">
+            <a:extLst>
+              <a:ext uri="{FF2B5EF4-FFF2-40B4-BE49-F238E27FC236}">
+                <a16:creationId xmlns:a16="http://schemas.microsoft.com/office/drawing/2014/main" id="{9AA8AB1F-9667-FC25-A1EA-CE17557BDC77}"/>
               </a:ext>
             </a:extLst>
           </p:cNvPr>
@@ -8861,172 +8168,8 @@
         </p:nvSpPr>
         <p:spPr>
           <a:xfrm>
-            <a:off x="6487884" y="4781006"/>
-            <a:ext cx="2621281" cy="1137502"/>
-          </a:xfrm>
-          <a:prstGeom prst="roundRect">
-            <a:avLst/>
-          </a:prstGeom>
-          <a:solidFill>
-            <a:schemeClr val="bg2">
-              <a:lumMod val="25000"/>
-            </a:schemeClr>
-          </a:solidFill>
-          <a:ln>
-            <a:noFill/>
-          </a:ln>
-        </p:spPr>
-        <p:style>
-          <a:lnRef idx="2">
-            <a:schemeClr val="accent1">
-              <a:shade val="50000"/>
-            </a:schemeClr>
-          </a:lnRef>
-          <a:fillRef idx="1">
-            <a:schemeClr val="accent1"/>
-          </a:fillRef>
-          <a:effectRef idx="0">
-            <a:schemeClr val="accent1"/>
-          </a:effectRef>
-          <a:fontRef idx="minor">
-            <a:schemeClr val="lt1"/>
-          </a:fontRef>
-        </p:style>
-        <p:txBody>
-          <a:bodyPr rtlCol="0" anchor="ctr"/>
-          <a:lstStyle/>
-          <a:p>
-            <a:pPr algn="ctr"/>
-            <a:endParaRPr lang="fr-FR" sz="4000">
-              <a:solidFill>
-                <a:schemeClr val="bg1"/>
-              </a:solidFill>
-            </a:endParaRPr>
-          </a:p>
-        </p:txBody>
-      </p:sp>
-      <p:sp>
-        <p:nvSpPr>
-          <p:cNvPr id="5" name="Rounded Rectangle 44">
-            <a:extLst>
-              <a:ext uri="{FF2B5EF4-FFF2-40B4-BE49-F238E27FC236}">
-                <a16:creationId xmlns:a16="http://schemas.microsoft.com/office/drawing/2014/main" id="{1CA3DB76-45FF-F2C4-05A6-2001F38BCAFA}"/>
-              </a:ext>
-            </a:extLst>
-          </p:cNvPr>
-          <p:cNvSpPr/>
-          <p:nvPr/>
-        </p:nvSpPr>
-        <p:spPr>
-          <a:xfrm>
-            <a:off x="6751655" y="5250742"/>
-            <a:ext cx="1103476" cy="344358"/>
-          </a:xfrm>
-          <a:prstGeom prst="roundRect">
-            <a:avLst/>
-          </a:prstGeom>
-          <a:solidFill>
-            <a:srgbClr val="7030A0"/>
-          </a:solidFill>
-          <a:ln>
-            <a:noFill/>
-          </a:ln>
-        </p:spPr>
-        <p:style>
-          <a:lnRef idx="2">
-            <a:schemeClr val="accent1">
-              <a:shade val="50000"/>
-            </a:schemeClr>
-          </a:lnRef>
-          <a:fillRef idx="1">
-            <a:schemeClr val="accent1"/>
-          </a:fillRef>
-          <a:effectRef idx="0">
-            <a:schemeClr val="accent1"/>
-          </a:effectRef>
-          <a:fontRef idx="minor">
-            <a:schemeClr val="lt1"/>
-          </a:fontRef>
-        </p:style>
-        <p:txBody>
-          <a:bodyPr rtlCol="0" anchor="ctr"/>
-          <a:lstStyle/>
-          <a:p>
-            <a:pPr algn="ctr"/>
-            <a:r>
-              <a:rPr lang="en-US" sz="1400" dirty="0">
-                <a:solidFill>
-                  <a:schemeClr val="bg1"/>
-                </a:solidFill>
-              </a:rPr>
-              <a:t>SlimFaas</a:t>
-            </a:r>
-          </a:p>
-        </p:txBody>
-      </p:sp>
-      <p:pic>
-        <p:nvPicPr>
-          <p:cNvPr id="6" name="Picture 2" descr="Afficher l’image source">
-            <a:extLst>
-              <a:ext uri="{FF2B5EF4-FFF2-40B4-BE49-F238E27FC236}">
-                <a16:creationId xmlns:a16="http://schemas.microsoft.com/office/drawing/2014/main" id="{86FC0B2B-0EA9-9828-9A73-E62E8C8C11FB}"/>
-              </a:ext>
-            </a:extLst>
-          </p:cNvPr>
-          <p:cNvPicPr>
-            <a:picLocks noChangeAspect="1" noChangeArrowheads="1"/>
-          </p:cNvPicPr>
-          <p:nvPr/>
-        </p:nvPicPr>
-        <p:blipFill>
-          <a:blip r:embed="rId2">
-            <a:extLst>
-              <a:ext uri="{28A0092B-C50C-407E-A947-70E740481C1C}">
-                <a14:useLocalDpi xmlns:a14="http://schemas.microsoft.com/office/drawing/2010/main" val="0"/>
-              </a:ext>
-            </a:extLst>
-          </a:blip>
-          <a:srcRect/>
-          <a:stretch>
-            <a:fillRect/>
-          </a:stretch>
-        </p:blipFill>
-        <p:spPr bwMode="auto">
-          <a:xfrm>
-            <a:off x="8837789" y="4620991"/>
-            <a:ext cx="421692" cy="410161"/>
-          </a:xfrm>
-          <a:prstGeom prst="rect">
-            <a:avLst/>
-          </a:prstGeom>
-          <a:noFill/>
-          <a:extLst>
-            <a:ext uri="{909E8E84-426E-40DD-AFC4-6F175D3DCCD1}">
-              <a14:hiddenFill xmlns:a14="http://schemas.microsoft.com/office/drawing/2010/main">
-                <a:solidFill>
-                  <a:srgbClr val="FFFFFF"/>
-                </a:solidFill>
-              </a14:hiddenFill>
-            </a:ext>
-          </a:extLst>
-        </p:spPr>
-      </p:pic>
-      <p:sp>
-        <p:nvSpPr>
-          <p:cNvPr id="7" name="Cylindre 6">
-            <a:extLst>
-              <a:ext uri="{FF2B5EF4-FFF2-40B4-BE49-F238E27FC236}">
-                <a16:creationId xmlns:a16="http://schemas.microsoft.com/office/drawing/2014/main" id="{9734965A-C108-A6DD-1AA6-E711131D6227}"/>
-              </a:ext>
-            </a:extLst>
-          </p:cNvPr>
-          <p:cNvSpPr/>
-          <p:nvPr/>
-        </p:nvSpPr>
-        <p:spPr>
-          <a:xfrm>
-            <a:off x="7953437" y="5111992"/>
-            <a:ext cx="884352" cy="621858"/>
+            <a:off x="7988617" y="1577639"/>
+            <a:ext cx="444247" cy="545343"/>
           </a:xfrm>
           <a:prstGeom prst="can">
             <a:avLst/>
@@ -9052,434 +8195,10 @@
           <a:p>
             <a:pPr algn="ctr"/>
             <a:r>
-              <a:rPr lang="fr-FR" sz="1400" dirty="0"/>
+              <a:rPr lang="fr-FR" sz="900" dirty="0"/>
               <a:t>SlimData</a:t>
             </a:r>
-            <a:endParaRPr lang="fr-FR" sz="1050" dirty="0"/>
-          </a:p>
-        </p:txBody>
-      </p:sp>
-      <p:sp>
-        <p:nvSpPr>
-          <p:cNvPr id="13" name="Rectangle : coins arrondis 12">
-            <a:extLst>
-              <a:ext uri="{FF2B5EF4-FFF2-40B4-BE49-F238E27FC236}">
-                <a16:creationId xmlns:a16="http://schemas.microsoft.com/office/drawing/2014/main" id="{286E557E-9D2D-E39E-7BAA-470B8AA24E84}"/>
-              </a:ext>
-            </a:extLst>
-          </p:cNvPr>
-          <p:cNvSpPr/>
-          <p:nvPr/>
-        </p:nvSpPr>
-        <p:spPr>
-          <a:xfrm>
-            <a:off x="9030787" y="2914738"/>
-            <a:ext cx="2621281" cy="1137502"/>
-          </a:xfrm>
-          <a:prstGeom prst="roundRect">
-            <a:avLst/>
-          </a:prstGeom>
-          <a:solidFill>
-            <a:schemeClr val="bg2">
-              <a:lumMod val="25000"/>
-            </a:schemeClr>
-          </a:solidFill>
-          <a:ln>
-            <a:noFill/>
-          </a:ln>
-        </p:spPr>
-        <p:style>
-          <a:lnRef idx="2">
-            <a:schemeClr val="accent1">
-              <a:shade val="50000"/>
-            </a:schemeClr>
-          </a:lnRef>
-          <a:fillRef idx="1">
-            <a:schemeClr val="accent1"/>
-          </a:fillRef>
-          <a:effectRef idx="0">
-            <a:schemeClr val="accent1"/>
-          </a:effectRef>
-          <a:fontRef idx="minor">
-            <a:schemeClr val="lt1"/>
-          </a:fontRef>
-        </p:style>
-        <p:txBody>
-          <a:bodyPr rtlCol="0" anchor="ctr"/>
-          <a:lstStyle/>
-          <a:p>
-            <a:pPr algn="ctr"/>
-            <a:endParaRPr lang="fr-FR" sz="4000">
-              <a:solidFill>
-                <a:schemeClr val="bg1"/>
-              </a:solidFill>
-            </a:endParaRPr>
-          </a:p>
-        </p:txBody>
-      </p:sp>
-      <p:sp>
-        <p:nvSpPr>
-          <p:cNvPr id="14" name="Rounded Rectangle 44">
-            <a:extLst>
-              <a:ext uri="{FF2B5EF4-FFF2-40B4-BE49-F238E27FC236}">
-                <a16:creationId xmlns:a16="http://schemas.microsoft.com/office/drawing/2014/main" id="{6E477DDA-1E6D-9A03-7191-54FABBE60642}"/>
-              </a:ext>
-            </a:extLst>
-          </p:cNvPr>
-          <p:cNvSpPr/>
-          <p:nvPr/>
-        </p:nvSpPr>
-        <p:spPr>
-          <a:xfrm>
-            <a:off x="9294558" y="3384474"/>
-            <a:ext cx="1103476" cy="344358"/>
-          </a:xfrm>
-          <a:prstGeom prst="roundRect">
-            <a:avLst/>
-          </a:prstGeom>
-          <a:solidFill>
-            <a:srgbClr val="7030A0"/>
-          </a:solidFill>
-          <a:ln>
-            <a:noFill/>
-          </a:ln>
-        </p:spPr>
-        <p:style>
-          <a:lnRef idx="2">
-            <a:schemeClr val="accent1">
-              <a:shade val="50000"/>
-            </a:schemeClr>
-          </a:lnRef>
-          <a:fillRef idx="1">
-            <a:schemeClr val="accent1"/>
-          </a:fillRef>
-          <a:effectRef idx="0">
-            <a:schemeClr val="accent1"/>
-          </a:effectRef>
-          <a:fontRef idx="minor">
-            <a:schemeClr val="lt1"/>
-          </a:fontRef>
-        </p:style>
-        <p:txBody>
-          <a:bodyPr rtlCol="0" anchor="ctr"/>
-          <a:lstStyle/>
-          <a:p>
-            <a:pPr algn="ctr"/>
-            <a:r>
-              <a:rPr lang="en-US" sz="1400" dirty="0">
-                <a:solidFill>
-                  <a:schemeClr val="bg1"/>
-                </a:solidFill>
-              </a:rPr>
-              <a:t>SlimFaas</a:t>
-            </a:r>
-          </a:p>
-        </p:txBody>
-      </p:sp>
-      <p:pic>
-        <p:nvPicPr>
-          <p:cNvPr id="15" name="Picture 2" descr="Afficher l’image source">
-            <a:extLst>
-              <a:ext uri="{FF2B5EF4-FFF2-40B4-BE49-F238E27FC236}">
-                <a16:creationId xmlns:a16="http://schemas.microsoft.com/office/drawing/2014/main" id="{88ED471D-D11B-63C5-CD2D-4DECE1E35849}"/>
-              </a:ext>
-            </a:extLst>
-          </p:cNvPr>
-          <p:cNvPicPr>
-            <a:picLocks noChangeAspect="1" noChangeArrowheads="1"/>
-          </p:cNvPicPr>
-          <p:nvPr/>
-        </p:nvPicPr>
-        <p:blipFill>
-          <a:blip r:embed="rId2">
-            <a:extLst>
-              <a:ext uri="{28A0092B-C50C-407E-A947-70E740481C1C}">
-                <a14:useLocalDpi xmlns:a14="http://schemas.microsoft.com/office/drawing/2010/main" val="0"/>
-              </a:ext>
-            </a:extLst>
-          </a:blip>
-          <a:srcRect/>
-          <a:stretch>
-            <a:fillRect/>
-          </a:stretch>
-        </p:blipFill>
-        <p:spPr bwMode="auto">
-          <a:xfrm>
-            <a:off x="11380692" y="2754723"/>
-            <a:ext cx="421692" cy="410161"/>
-          </a:xfrm>
-          <a:prstGeom prst="rect">
-            <a:avLst/>
-          </a:prstGeom>
-          <a:noFill/>
-          <a:extLst>
-            <a:ext uri="{909E8E84-426E-40DD-AFC4-6F175D3DCCD1}">
-              <a14:hiddenFill xmlns:a14="http://schemas.microsoft.com/office/drawing/2010/main">
-                <a:solidFill>
-                  <a:srgbClr val="FFFFFF"/>
-                </a:solidFill>
-              </a14:hiddenFill>
-            </a:ext>
-          </a:extLst>
-        </p:spPr>
-      </p:pic>
-      <p:sp>
-        <p:nvSpPr>
-          <p:cNvPr id="16" name="Cylindre 15">
-            <a:extLst>
-              <a:ext uri="{FF2B5EF4-FFF2-40B4-BE49-F238E27FC236}">
-                <a16:creationId xmlns:a16="http://schemas.microsoft.com/office/drawing/2014/main" id="{36C1722F-F481-386A-71BC-DA17893D6A1E}"/>
-              </a:ext>
-            </a:extLst>
-          </p:cNvPr>
-          <p:cNvSpPr/>
-          <p:nvPr/>
-        </p:nvSpPr>
-        <p:spPr>
-          <a:xfrm>
-            <a:off x="10496340" y="3245724"/>
-            <a:ext cx="884352" cy="621858"/>
-          </a:xfrm>
-          <a:prstGeom prst="can">
-            <a:avLst/>
-          </a:prstGeom>
-        </p:spPr>
-        <p:style>
-          <a:lnRef idx="0">
-            <a:schemeClr val="accent5"/>
-          </a:lnRef>
-          <a:fillRef idx="3">
-            <a:schemeClr val="accent5"/>
-          </a:fillRef>
-          <a:effectRef idx="3">
-            <a:schemeClr val="accent5"/>
-          </a:effectRef>
-          <a:fontRef idx="minor">
-            <a:schemeClr val="lt1"/>
-          </a:fontRef>
-        </p:style>
-        <p:txBody>
-          <a:bodyPr rtlCol="0" anchor="b"/>
-          <a:lstStyle/>
-          <a:p>
-            <a:pPr algn="ctr"/>
-            <a:r>
-              <a:rPr lang="fr-FR" sz="1400" dirty="0"/>
-              <a:t>SlimData</a:t>
-            </a:r>
-            <a:endParaRPr lang="fr-FR" sz="1050" dirty="0"/>
-          </a:p>
-        </p:txBody>
-      </p:sp>
-      <p:sp>
-        <p:nvSpPr>
-          <p:cNvPr id="17" name="Rectangle : coins arrondis 16">
-            <a:extLst>
-              <a:ext uri="{FF2B5EF4-FFF2-40B4-BE49-F238E27FC236}">
-                <a16:creationId xmlns:a16="http://schemas.microsoft.com/office/drawing/2014/main" id="{FA892C96-9746-CAD2-5A8F-2877A3233167}"/>
-              </a:ext>
-            </a:extLst>
-          </p:cNvPr>
-          <p:cNvSpPr/>
-          <p:nvPr/>
-        </p:nvSpPr>
-        <p:spPr>
-          <a:xfrm>
-            <a:off x="6337568" y="1231306"/>
-            <a:ext cx="2621281" cy="1137502"/>
-          </a:xfrm>
-          <a:prstGeom prst="roundRect">
-            <a:avLst/>
-          </a:prstGeom>
-          <a:solidFill>
-            <a:schemeClr val="bg2">
-              <a:lumMod val="25000"/>
-            </a:schemeClr>
-          </a:solidFill>
-          <a:ln>
-            <a:noFill/>
-          </a:ln>
-        </p:spPr>
-        <p:style>
-          <a:lnRef idx="2">
-            <a:schemeClr val="accent1">
-              <a:shade val="50000"/>
-            </a:schemeClr>
-          </a:lnRef>
-          <a:fillRef idx="1">
-            <a:schemeClr val="accent1"/>
-          </a:fillRef>
-          <a:effectRef idx="0">
-            <a:schemeClr val="accent1"/>
-          </a:effectRef>
-          <a:fontRef idx="minor">
-            <a:schemeClr val="lt1"/>
-          </a:fontRef>
-        </p:style>
-        <p:txBody>
-          <a:bodyPr rtlCol="0" anchor="ctr"/>
-          <a:lstStyle/>
-          <a:p>
-            <a:pPr algn="ctr"/>
-            <a:endParaRPr lang="fr-FR" sz="4000">
-              <a:solidFill>
-                <a:schemeClr val="bg1"/>
-              </a:solidFill>
-            </a:endParaRPr>
-          </a:p>
-        </p:txBody>
-      </p:sp>
-      <p:sp>
-        <p:nvSpPr>
-          <p:cNvPr id="18" name="Rounded Rectangle 44">
-            <a:extLst>
-              <a:ext uri="{FF2B5EF4-FFF2-40B4-BE49-F238E27FC236}">
-                <a16:creationId xmlns:a16="http://schemas.microsoft.com/office/drawing/2014/main" id="{2AD36C36-BFA5-B972-A126-EDA1BAD396E0}"/>
-              </a:ext>
-            </a:extLst>
-          </p:cNvPr>
-          <p:cNvSpPr/>
-          <p:nvPr/>
-        </p:nvSpPr>
-        <p:spPr>
-          <a:xfrm>
-            <a:off x="6601339" y="1701042"/>
-            <a:ext cx="1103476" cy="344358"/>
-          </a:xfrm>
-          <a:prstGeom prst="roundRect">
-            <a:avLst/>
-          </a:prstGeom>
-          <a:solidFill>
-            <a:srgbClr val="7030A0"/>
-          </a:solidFill>
-          <a:ln>
-            <a:noFill/>
-          </a:ln>
-        </p:spPr>
-        <p:style>
-          <a:lnRef idx="2">
-            <a:schemeClr val="accent1">
-              <a:shade val="50000"/>
-            </a:schemeClr>
-          </a:lnRef>
-          <a:fillRef idx="1">
-            <a:schemeClr val="accent1"/>
-          </a:fillRef>
-          <a:effectRef idx="0">
-            <a:schemeClr val="accent1"/>
-          </a:effectRef>
-          <a:fontRef idx="minor">
-            <a:schemeClr val="lt1"/>
-          </a:fontRef>
-        </p:style>
-        <p:txBody>
-          <a:bodyPr rtlCol="0" anchor="ctr"/>
-          <a:lstStyle/>
-          <a:p>
-            <a:pPr algn="ctr"/>
-            <a:r>
-              <a:rPr lang="en-US" sz="1400" dirty="0">
-                <a:solidFill>
-                  <a:schemeClr val="bg1"/>
-                </a:solidFill>
-              </a:rPr>
-              <a:t>SlimFaas</a:t>
-            </a:r>
-          </a:p>
-        </p:txBody>
-      </p:sp>
-      <p:pic>
-        <p:nvPicPr>
-          <p:cNvPr id="19" name="Picture 2" descr="Afficher l’image source">
-            <a:extLst>
-              <a:ext uri="{FF2B5EF4-FFF2-40B4-BE49-F238E27FC236}">
-                <a16:creationId xmlns:a16="http://schemas.microsoft.com/office/drawing/2014/main" id="{A69EEC02-815C-3D73-8D5E-E235B608C8FA}"/>
-              </a:ext>
-            </a:extLst>
-          </p:cNvPr>
-          <p:cNvPicPr>
-            <a:picLocks noChangeAspect="1" noChangeArrowheads="1"/>
-          </p:cNvPicPr>
-          <p:nvPr/>
-        </p:nvPicPr>
-        <p:blipFill>
-          <a:blip r:embed="rId2">
-            <a:extLst>
-              <a:ext uri="{28A0092B-C50C-407E-A947-70E740481C1C}">
-                <a14:useLocalDpi xmlns:a14="http://schemas.microsoft.com/office/drawing/2010/main" val="0"/>
-              </a:ext>
-            </a:extLst>
-          </a:blip>
-          <a:srcRect/>
-          <a:stretch>
-            <a:fillRect/>
-          </a:stretch>
-        </p:blipFill>
-        <p:spPr bwMode="auto">
-          <a:xfrm>
-            <a:off x="8687473" y="1071291"/>
-            <a:ext cx="421692" cy="410161"/>
-          </a:xfrm>
-          <a:prstGeom prst="rect">
-            <a:avLst/>
-          </a:prstGeom>
-          <a:noFill/>
-          <a:extLst>
-            <a:ext uri="{909E8E84-426E-40DD-AFC4-6F175D3DCCD1}">
-              <a14:hiddenFill xmlns:a14="http://schemas.microsoft.com/office/drawing/2010/main">
-                <a:solidFill>
-                  <a:srgbClr val="FFFFFF"/>
-                </a:solidFill>
-              </a14:hiddenFill>
-            </a:ext>
-          </a:extLst>
-        </p:spPr>
-      </p:pic>
-      <p:sp>
-        <p:nvSpPr>
-          <p:cNvPr id="20" name="Cylindre 19">
-            <a:extLst>
-              <a:ext uri="{FF2B5EF4-FFF2-40B4-BE49-F238E27FC236}">
-                <a16:creationId xmlns:a16="http://schemas.microsoft.com/office/drawing/2014/main" id="{9AA8AB1F-9667-FC25-A1EA-CE17557BDC77}"/>
-              </a:ext>
-            </a:extLst>
-          </p:cNvPr>
-          <p:cNvSpPr/>
-          <p:nvPr/>
-        </p:nvSpPr>
-        <p:spPr>
-          <a:xfrm>
-            <a:off x="7803121" y="1562292"/>
-            <a:ext cx="884352" cy="621858"/>
-          </a:xfrm>
-          <a:prstGeom prst="can">
-            <a:avLst/>
-          </a:prstGeom>
-        </p:spPr>
-        <p:style>
-          <a:lnRef idx="0">
-            <a:schemeClr val="accent5"/>
-          </a:lnRef>
-          <a:fillRef idx="3">
-            <a:schemeClr val="accent5"/>
-          </a:fillRef>
-          <a:effectRef idx="3">
-            <a:schemeClr val="accent5"/>
-          </a:effectRef>
-          <a:fontRef idx="minor">
-            <a:schemeClr val="lt1"/>
-          </a:fontRef>
-        </p:style>
-        <p:txBody>
-          <a:bodyPr rtlCol="0" anchor="b"/>
-          <a:lstStyle/>
-          <a:p>
-            <a:pPr algn="ctr"/>
-            <a:r>
-              <a:rPr lang="fr-FR" sz="1400" dirty="0"/>
-              <a:t>SlimData</a:t>
-            </a:r>
-            <a:endParaRPr lang="fr-FR" sz="1050" dirty="0"/>
+            <a:endParaRPr lang="fr-FR" sz="600" dirty="0"/>
           </a:p>
         </p:txBody>
       </p:sp>
@@ -9876,7 +8595,7 @@
         <p:spPr>
           <a:xfrm>
             <a:off x="165249" y="3204084"/>
-            <a:ext cx="4223206" cy="1323439"/>
+            <a:ext cx="4566166" cy="923330"/>
           </a:xfrm>
           <a:prstGeom prst="rect">
             <a:avLst/>
@@ -9890,44 +8609,44 @@
           <a:lstStyle/>
           <a:p>
             <a:r>
-              <a:rPr lang="fr-FR" sz="2000" dirty="0"/>
+              <a:rPr lang="fr-FR" dirty="0"/>
               <a:t>HTTP POST</a:t>
             </a:r>
           </a:p>
           <a:p>
             <a:r>
-              <a:rPr lang="fr-FR" sz="2000" dirty="0">
+              <a:rPr lang="fr-FR" dirty="0">
                 <a:hlinkClick r:id="rId3"/>
               </a:rPr>
-              <a:t>http://slimfaas/async-function/fibonacci/hello/guillaume</a:t>
-            </a:r>
-            <a:endParaRPr lang="fr-FR" sz="2000" dirty="0"/>
-          </a:p>
-          <a:p>
-            <a:r>
-              <a:rPr lang="fr-FR" sz="2000" dirty="0"/>
+              <a:t>http://slimfaas/function/fibonacci/compute</a:t>
+            </a:r>
+            <a:br>
+              <a:rPr lang="fr-FR" dirty="0"/>
+            </a:br>
+            <a:r>
+              <a:rPr lang="fr-FR" dirty="0"/>
               <a:t>{</a:t>
             </a:r>
             <a:r>
-              <a:rPr lang="fr-FR" sz="2000" b="0" i="0" dirty="0">
+              <a:rPr lang="fr-FR" b="0" i="0" dirty="0">
                 <a:effectLst/>
                 <a:latin typeface="-apple-system"/>
               </a:rPr>
               <a:t>"</a:t>
             </a:r>
             <a:r>
-              <a:rPr lang="fr-FR" sz="2000" dirty="0"/>
+              <a:rPr lang="fr-FR" dirty="0"/>
               <a:t>input</a:t>
             </a:r>
             <a:r>
-              <a:rPr lang="fr-FR" sz="2000" b="0" i="0" dirty="0">
+              <a:rPr lang="fr-FR" b="0" i="0" dirty="0">
                 <a:effectLst/>
                 <a:latin typeface="-apple-system"/>
               </a:rPr>
               <a:t>"</a:t>
             </a:r>
             <a:r>
-              <a:rPr lang="fr-FR" sz="2000" dirty="0"/>
+              <a:rPr lang="fr-FR" dirty="0"/>
               <a:t>:42}</a:t>
             </a:r>
           </a:p>
@@ -9951,8 +8670,8 @@
         </p:nvCxnSpPr>
         <p:spPr>
           <a:xfrm>
-            <a:off x="4388455" y="3865804"/>
-            <a:ext cx="2343550" cy="879029"/>
+            <a:off x="4731415" y="3665749"/>
+            <a:ext cx="2000590" cy="1079084"/>
           </a:xfrm>
           <a:prstGeom prst="straightConnector1">
             <a:avLst/>
@@ -10053,7 +8772,7 @@
         </p:nvSpPr>
         <p:spPr>
           <a:xfrm>
-            <a:off x="6673963" y="2307595"/>
+            <a:off x="6767414" y="2287570"/>
             <a:ext cx="150316" cy="162476"/>
           </a:xfrm>
           <a:prstGeom prst="ellipse">
@@ -10171,7 +8890,7 @@
         </p:nvSpPr>
         <p:spPr bwMode="auto">
           <a:xfrm>
-            <a:off x="5151898" y="3686005"/>
+            <a:off x="5386735" y="3645793"/>
             <a:ext cx="1784118" cy="369332"/>
           </a:xfrm>
           <a:prstGeom prst="rect">
@@ -10243,6 +8962,216 @@
               <a:effectLst/>
               <a:latin typeface="Arial" panose="020B0604020202020204" pitchFamily="34" charset="0"/>
             </a:endParaRPr>
+          </a:p>
+        </p:txBody>
+      </p:sp>
+      <p:sp>
+        <p:nvSpPr>
+          <p:cNvPr id="2" name="Rounded Rectangle 44">
+            <a:extLst>
+              <a:ext uri="{FF2B5EF4-FFF2-40B4-BE49-F238E27FC236}">
+                <a16:creationId xmlns:a16="http://schemas.microsoft.com/office/drawing/2014/main" id="{EB6F871C-647F-F69F-6CFD-258B44007885}"/>
+              </a:ext>
+            </a:extLst>
+          </p:cNvPr>
+          <p:cNvSpPr/>
+          <p:nvPr/>
+        </p:nvSpPr>
+        <p:spPr>
+          <a:xfrm>
+            <a:off x="9457623" y="3105876"/>
+            <a:ext cx="1824665" cy="820493"/>
+          </a:xfrm>
+          <a:prstGeom prst="roundRect">
+            <a:avLst/>
+          </a:prstGeom>
+          <a:noFill/>
+          <a:ln>
+            <a:noFill/>
+          </a:ln>
+        </p:spPr>
+        <p:style>
+          <a:lnRef idx="2">
+            <a:schemeClr val="accent1">
+              <a:shade val="50000"/>
+            </a:schemeClr>
+          </a:lnRef>
+          <a:fillRef idx="1">
+            <a:schemeClr val="accent1"/>
+          </a:fillRef>
+          <a:effectRef idx="0">
+            <a:schemeClr val="accent1"/>
+          </a:effectRef>
+          <a:fontRef idx="minor">
+            <a:schemeClr val="lt1"/>
+          </a:fontRef>
+        </p:style>
+        <p:txBody>
+          <a:bodyPr rtlCol="0" anchor="ctr"/>
+          <a:lstStyle/>
+          <a:p>
+            <a:pPr algn="ctr"/>
+            <a:r>
+              <a:rPr lang="en-US" sz="1400" dirty="0">
+                <a:solidFill>
+                  <a:schemeClr val="bg1"/>
+                </a:solidFill>
+              </a:rPr>
+              <a:t>SlimFaas</a:t>
+            </a:r>
+          </a:p>
+        </p:txBody>
+      </p:sp>
+      <p:sp>
+        <p:nvSpPr>
+          <p:cNvPr id="8" name="Cylindre 7">
+            <a:extLst>
+              <a:ext uri="{FF2B5EF4-FFF2-40B4-BE49-F238E27FC236}">
+                <a16:creationId xmlns:a16="http://schemas.microsoft.com/office/drawing/2014/main" id="{B1813FE3-8FB8-536C-87B7-BC11FD12A7C5}"/>
+              </a:ext>
+            </a:extLst>
+          </p:cNvPr>
+          <p:cNvSpPr/>
+          <p:nvPr/>
+        </p:nvSpPr>
+        <p:spPr>
+          <a:xfrm>
+            <a:off x="10772121" y="3341808"/>
+            <a:ext cx="444247" cy="545343"/>
+          </a:xfrm>
+          <a:prstGeom prst="can">
+            <a:avLst/>
+          </a:prstGeom>
+        </p:spPr>
+        <p:style>
+          <a:lnRef idx="0">
+            <a:schemeClr val="accent5"/>
+          </a:lnRef>
+          <a:fillRef idx="3">
+            <a:schemeClr val="accent5"/>
+          </a:fillRef>
+          <a:effectRef idx="3">
+            <a:schemeClr val="accent5"/>
+          </a:effectRef>
+          <a:fontRef idx="minor">
+            <a:schemeClr val="lt1"/>
+          </a:fontRef>
+        </p:style>
+        <p:txBody>
+          <a:bodyPr rtlCol="0" anchor="b"/>
+          <a:lstStyle/>
+          <a:p>
+            <a:pPr algn="ctr"/>
+            <a:r>
+              <a:rPr lang="fr-FR" sz="900" dirty="0"/>
+              <a:t>SlimData</a:t>
+            </a:r>
+            <a:endParaRPr lang="fr-FR" sz="600" dirty="0"/>
+          </a:p>
+        </p:txBody>
+      </p:sp>
+      <p:sp>
+        <p:nvSpPr>
+          <p:cNvPr id="9" name="Rounded Rectangle 44">
+            <a:extLst>
+              <a:ext uri="{FF2B5EF4-FFF2-40B4-BE49-F238E27FC236}">
+                <a16:creationId xmlns:a16="http://schemas.microsoft.com/office/drawing/2014/main" id="{94DCC847-92CB-463E-B9AF-4D70DC6D3222}"/>
+              </a:ext>
+            </a:extLst>
+          </p:cNvPr>
+          <p:cNvSpPr/>
+          <p:nvPr/>
+        </p:nvSpPr>
+        <p:spPr>
+          <a:xfrm>
+            <a:off x="6871794" y="4927635"/>
+            <a:ext cx="1901773" cy="853887"/>
+          </a:xfrm>
+          <a:prstGeom prst="roundRect">
+            <a:avLst/>
+          </a:prstGeom>
+          <a:noFill/>
+          <a:ln>
+            <a:noFill/>
+          </a:ln>
+        </p:spPr>
+        <p:style>
+          <a:lnRef idx="2">
+            <a:schemeClr val="accent1">
+              <a:shade val="50000"/>
+            </a:schemeClr>
+          </a:lnRef>
+          <a:fillRef idx="1">
+            <a:schemeClr val="accent1"/>
+          </a:fillRef>
+          <a:effectRef idx="0">
+            <a:schemeClr val="accent1"/>
+          </a:effectRef>
+          <a:fontRef idx="minor">
+            <a:schemeClr val="lt1"/>
+          </a:fontRef>
+        </p:style>
+        <p:txBody>
+          <a:bodyPr rtlCol="0" anchor="ctr"/>
+          <a:lstStyle/>
+          <a:p>
+            <a:pPr algn="ctr"/>
+            <a:r>
+              <a:rPr lang="en-US" sz="1400" dirty="0">
+                <a:solidFill>
+                  <a:schemeClr val="bg1"/>
+                </a:solidFill>
+              </a:rPr>
+              <a:t>SlimFaas</a:t>
+            </a:r>
+          </a:p>
+        </p:txBody>
+      </p:sp>
+      <p:sp>
+        <p:nvSpPr>
+          <p:cNvPr id="10" name="Cylindre 9">
+            <a:extLst>
+              <a:ext uri="{FF2B5EF4-FFF2-40B4-BE49-F238E27FC236}">
+                <a16:creationId xmlns:a16="http://schemas.microsoft.com/office/drawing/2014/main" id="{98F476E5-BF1A-D89D-9F69-BB3437C7EBE6}"/>
+              </a:ext>
+            </a:extLst>
+          </p:cNvPr>
+          <p:cNvSpPr/>
+          <p:nvPr/>
+        </p:nvSpPr>
+        <p:spPr>
+          <a:xfrm>
+            <a:off x="8228646" y="5158522"/>
+            <a:ext cx="444247" cy="545343"/>
+          </a:xfrm>
+          <a:prstGeom prst="can">
+            <a:avLst/>
+          </a:prstGeom>
+        </p:spPr>
+        <p:style>
+          <a:lnRef idx="0">
+            <a:schemeClr val="accent5"/>
+          </a:lnRef>
+          <a:fillRef idx="3">
+            <a:schemeClr val="accent5"/>
+          </a:fillRef>
+          <a:effectRef idx="3">
+            <a:schemeClr val="accent5"/>
+          </a:effectRef>
+          <a:fontRef idx="minor">
+            <a:schemeClr val="lt1"/>
+          </a:fontRef>
+        </p:style>
+        <p:txBody>
+          <a:bodyPr rtlCol="0" anchor="b"/>
+          <a:lstStyle/>
+          <a:p>
+            <a:pPr algn="ctr"/>
+            <a:r>
+              <a:rPr lang="fr-FR" sz="900" dirty="0"/>
+              <a:t>SlimData</a:t>
+            </a:r>
+            <a:endParaRPr lang="fr-FR" sz="600" dirty="0"/>
           </a:p>
         </p:txBody>
       </p:sp>

</xml_diff>